<commit_message>
Completed first draft of M4.
</commit_message>
<xml_diff>
--- a/M4_Seurat_CellType/M4_Seurat_CellType.pptx
+++ b/M4_Seurat_CellType/M4_Seurat_CellType.pptx
@@ -5,7 +5,7 @@
     <p:sldMasterId id="2147483656" r:id="rId1"/>
   </p:sldMasterIdLst>
   <p:notesMasterIdLst>
-    <p:notesMasterId r:id="rId10"/>
+    <p:notesMasterId r:id="rId11"/>
   </p:notesMasterIdLst>
   <p:sldIdLst>
     <p:sldId id="256" r:id="rId2"/>
@@ -14,8 +14,9 @@
     <p:sldId id="263" r:id="rId5"/>
     <p:sldId id="264" r:id="rId6"/>
     <p:sldId id="265" r:id="rId7"/>
-    <p:sldId id="266" r:id="rId8"/>
-    <p:sldId id="267" r:id="rId9"/>
+    <p:sldId id="268" r:id="rId8"/>
+    <p:sldId id="266" r:id="rId9"/>
+    <p:sldId id="267" r:id="rId10"/>
   </p:sldIdLst>
   <p:sldSz cx="12192000" cy="6858000"/>
   <p:notesSz cx="6858000" cy="9144000"/>
@@ -204,7 +205,7 @@
           <a:p>
             <a:fld id="{FF40CFF0-3E11-4AF6-9747-7919C58FBC48}" type="datetimeFigureOut">
               <a:rPr lang="en-US" smtClean="0"/>
-              <a:t>2/2/2024</a:t>
+              <a:t>2/4/2024</a:t>
             </a:fld>
             <a:endParaRPr lang="en-US"/>
           </a:p>
@@ -750,7 +751,7 @@
           <a:p>
             <a:fld id="{9F69634C-F75C-45F7-A87A-C5E2AF3ECA41}" type="datetimeFigureOut">
               <a:rPr lang="en-US" smtClean="0"/>
-              <a:t>2/2/2024</a:t>
+              <a:t>2/4/2024</a:t>
             </a:fld>
             <a:endParaRPr lang="en-US"/>
           </a:p>
@@ -915,7 +916,7 @@
           <a:p>
             <a:fld id="{9F69634C-F75C-45F7-A87A-C5E2AF3ECA41}" type="datetimeFigureOut">
               <a:rPr lang="en-US" smtClean="0"/>
-              <a:t>2/2/2024</a:t>
+              <a:t>2/4/2024</a:t>
             </a:fld>
             <a:endParaRPr lang="en-US"/>
           </a:p>
@@ -1118,7 +1119,7 @@
           <a:p>
             <a:fld id="{9F69634C-F75C-45F7-A87A-C5E2AF3ECA41}" type="datetimeFigureOut">
               <a:rPr lang="en-US" smtClean="0"/>
-              <a:t>2/2/2024</a:t>
+              <a:t>2/4/2024</a:t>
             </a:fld>
             <a:endParaRPr lang="en-US"/>
           </a:p>
@@ -1383,7 +1384,7 @@
           <a:p>
             <a:fld id="{9F69634C-F75C-45F7-A87A-C5E2AF3ECA41}" type="datetimeFigureOut">
               <a:rPr lang="en-US" smtClean="0"/>
-              <a:t>2/2/2024</a:t>
+              <a:t>2/4/2024</a:t>
             </a:fld>
             <a:endParaRPr lang="en-US"/>
           </a:p>
@@ -1496,7 +1497,7 @@
           <a:p>
             <a:fld id="{9F69634C-F75C-45F7-A87A-C5E2AF3ECA41}" type="datetimeFigureOut">
               <a:rPr lang="en-US" smtClean="0"/>
-              <a:t>2/2/2024</a:t>
+              <a:t>2/4/2024</a:t>
             </a:fld>
             <a:endParaRPr lang="en-US"/>
           </a:p>
@@ -1738,7 +1739,7 @@
           <a:p>
             <a:fld id="{9F69634C-F75C-45F7-A87A-C5E2AF3ECA41}" type="datetimeFigureOut">
               <a:rPr lang="en-US" smtClean="0"/>
-              <a:t>2/2/2024</a:t>
+              <a:t>2/4/2024</a:t>
             </a:fld>
             <a:endParaRPr lang="en-US"/>
           </a:p>
@@ -3690,7 +3691,7 @@
         </p:blipFill>
         <p:spPr>
           <a:xfrm>
-            <a:off x="6096000" y="751219"/>
+            <a:off x="5913622" y="710615"/>
             <a:ext cx="5486400" cy="3884406"/>
           </a:xfrm>
           <a:prstGeom prst="rect">
@@ -3720,8 +3721,8 @@
         </p:blipFill>
         <p:spPr>
           <a:xfrm>
-            <a:off x="6536675" y="4676464"/>
-            <a:ext cx="3004507" cy="2166967"/>
+            <a:off x="5819676" y="3085170"/>
+            <a:ext cx="5171412" cy="3729823"/>
           </a:xfrm>
           <a:prstGeom prst="rect">
             <a:avLst/>
@@ -4133,6 +4134,81 @@
   <p:clrMapOvr>
     <a:masterClrMapping/>
   </p:clrMapOvr>
+  <p:timing>
+    <p:tnLst>
+      <p:par>
+        <p:cTn id="1" dur="indefinite" restart="never" nodeType="tmRoot">
+          <p:childTnLst>
+            <p:seq concurrent="1" nextAc="seek">
+              <p:cTn id="2" dur="indefinite" nodeType="mainSeq">
+                <p:childTnLst>
+                  <p:par>
+                    <p:cTn id="3" fill="hold">
+                      <p:stCondLst>
+                        <p:cond delay="indefinite"/>
+                      </p:stCondLst>
+                      <p:childTnLst>
+                        <p:par>
+                          <p:cTn id="4" fill="hold">
+                            <p:stCondLst>
+                              <p:cond delay="0"/>
+                            </p:stCondLst>
+                            <p:childTnLst>
+                              <p:par>
+                                <p:cTn id="5" presetID="1" presetClass="entr" presetSubtype="0" fill="hold" nodeType="clickEffect">
+                                  <p:stCondLst>
+                                    <p:cond delay="0"/>
+                                  </p:stCondLst>
+                                  <p:childTnLst>
+                                    <p:set>
+                                      <p:cBhvr>
+                                        <p:cTn id="6" dur="1" fill="hold">
+                                          <p:stCondLst>
+                                            <p:cond delay="0"/>
+                                          </p:stCondLst>
+                                        </p:cTn>
+                                        <p:tgtEl>
+                                          <p:spTgt spid="18"/>
+                                        </p:tgtEl>
+                                        <p:attrNameLst>
+                                          <p:attrName>style.visibility</p:attrName>
+                                        </p:attrNameLst>
+                                      </p:cBhvr>
+                                      <p:to>
+                                        <p:strVal val="visible"/>
+                                      </p:to>
+                                    </p:set>
+                                  </p:childTnLst>
+                                </p:cTn>
+                              </p:par>
+                            </p:childTnLst>
+                          </p:cTn>
+                        </p:par>
+                      </p:childTnLst>
+                    </p:cTn>
+                  </p:par>
+                </p:childTnLst>
+              </p:cTn>
+              <p:prevCondLst>
+                <p:cond evt="onPrev" delay="0">
+                  <p:tgtEl>
+                    <p:sldTgt/>
+                  </p:tgtEl>
+                </p:cond>
+              </p:prevCondLst>
+              <p:nextCondLst>
+                <p:cond evt="onNext" delay="0">
+                  <p:tgtEl>
+                    <p:sldTgt/>
+                  </p:tgtEl>
+                </p:cond>
+              </p:nextCondLst>
+            </p:seq>
+          </p:childTnLst>
+        </p:cTn>
+      </p:par>
+    </p:tnLst>
+  </p:timing>
 </p:sld>
 </file>
 
@@ -4158,7 +4234,7 @@
           <p:cNvPr id="2" name="Title 1">
             <a:extLst>
               <a:ext uri="{FF2B5EF4-FFF2-40B4-BE49-F238E27FC236}">
-                <a16:creationId xmlns:a16="http://schemas.microsoft.com/office/drawing/2014/main" id="{16A6C89E-64F5-F3C7-8FB8-4B03FDC5B489}"/>
+                <a16:creationId xmlns:a16="http://schemas.microsoft.com/office/drawing/2014/main" id="{4B9B733D-AA85-3582-42D9-0955A32E00FE}"/>
               </a:ext>
             </a:extLst>
           </p:cNvPr>
@@ -4175,16 +4251,12 @@
           <a:lstStyle/>
           <a:p>
             <a:r>
+              <a:rPr lang="en-US" dirty="0" err="1"/>
+              <a:t>SingleR</a:t>
+            </a:r>
+            <a:r>
               <a:rPr lang="en-US" dirty="0"/>
-              <a:t>Classification Based: </a:t>
-            </a:r>
-            <a:r>
-              <a:rPr lang="en-US" dirty="0" err="1"/>
-              <a:t>scAnnoteR</a:t>
-            </a:r>
-            <a:r>
-              <a:rPr lang="en-US" dirty="0"/>
-              <a:t>, default model</a:t>
+              <a:t>: Correlation Based Annotation</a:t>
             </a:r>
           </a:p>
         </p:txBody>
@@ -4194,7 +4266,7 @@
           <p:cNvPr id="4" name="Picture 3">
             <a:extLst>
               <a:ext uri="{FF2B5EF4-FFF2-40B4-BE49-F238E27FC236}">
-                <a16:creationId xmlns:a16="http://schemas.microsoft.com/office/drawing/2014/main" id="{C7A34AC9-61F6-1BE2-44A3-C37236665A70}"/>
+                <a16:creationId xmlns:a16="http://schemas.microsoft.com/office/drawing/2014/main" id="{47FA1686-35CF-8F34-8E6F-A30C30D11232}"/>
               </a:ext>
             </a:extLst>
           </p:cNvPr>
@@ -4211,8 +4283,8 @@
         </p:blipFill>
         <p:spPr>
           <a:xfrm>
-            <a:off x="364862" y="1001156"/>
-            <a:ext cx="4677428" cy="1600423"/>
+            <a:off x="7114120" y="980733"/>
+            <a:ext cx="4326853" cy="2659072"/>
           </a:xfrm>
           <a:prstGeom prst="rect">
             <a:avLst/>
@@ -4221,57 +4293,40 @@
       </p:pic>
       <p:pic>
         <p:nvPicPr>
-          <p:cNvPr id="1026" name="Picture 2" descr="Workflow of scAnnotate on a dataset with at most one rare cell population (at most one cell population less than 100 cells). The vertical grey dashed line separates training data (left) and test data (right) information">
-            <a:extLst>
-              <a:ext uri="{FF2B5EF4-FFF2-40B4-BE49-F238E27FC236}">
-                <a16:creationId xmlns:a16="http://schemas.microsoft.com/office/drawing/2014/main" id="{C275E2A4-1C90-16FF-A85A-599C42832AE9}"/>
+          <p:cNvPr id="6" name="Picture 5">
+            <a:extLst>
+              <a:ext uri="{FF2B5EF4-FFF2-40B4-BE49-F238E27FC236}">
+                <a16:creationId xmlns:a16="http://schemas.microsoft.com/office/drawing/2014/main" id="{022FEB95-D2AF-B7D3-0111-D0BE595C1A71}"/>
               </a:ext>
             </a:extLst>
           </p:cNvPr>
           <p:cNvPicPr>
-            <a:picLocks noChangeAspect="1" noChangeArrowheads="1"/>
+            <a:picLocks noChangeAspect="1"/>
           </p:cNvPicPr>
           <p:nvPr/>
         </p:nvPicPr>
         <p:blipFill>
-          <a:blip r:embed="rId3">
-            <a:extLst>
-              <a:ext uri="{28A0092B-C50C-407E-A947-70E740481C1C}">
-                <a14:useLocalDpi xmlns:a14="http://schemas.microsoft.com/office/drawing/2010/main" val="0"/>
-              </a:ext>
-            </a:extLst>
-          </a:blip>
-          <a:srcRect/>
+          <a:blip r:embed="rId3"/>
           <a:stretch>
             <a:fillRect/>
           </a:stretch>
         </p:blipFill>
-        <p:spPr bwMode="auto">
-          <a:xfrm>
-            <a:off x="8284464" y="822960"/>
-            <a:ext cx="3674669" cy="5377564"/>
+        <p:spPr>
+          <a:xfrm>
+            <a:off x="515354" y="980733"/>
+            <a:ext cx="6106377" cy="2448267"/>
           </a:xfrm>
           <a:prstGeom prst="rect">
             <a:avLst/>
           </a:prstGeom>
-          <a:noFill/>
-          <a:extLst>
-            <a:ext uri="{909E8E84-426E-40DD-AFC4-6F175D3DCCD1}">
-              <a14:hiddenFill xmlns:a14="http://schemas.microsoft.com/office/drawing/2010/main">
-                <a:solidFill>
-                  <a:srgbClr val="FFFFFF"/>
-                </a:solidFill>
-              </a14:hiddenFill>
-            </a:ext>
-          </a:extLst>
         </p:spPr>
       </p:pic>
       <p:pic>
         <p:nvPicPr>
-          <p:cNvPr id="6" name="Picture 5">
-            <a:extLst>
-              <a:ext uri="{FF2B5EF4-FFF2-40B4-BE49-F238E27FC236}">
-                <a16:creationId xmlns:a16="http://schemas.microsoft.com/office/drawing/2014/main" id="{AAB948B5-7973-4C00-2CFC-8D9D38FB981E}"/>
+          <p:cNvPr id="10" name="Picture 9">
+            <a:extLst>
+              <a:ext uri="{FF2B5EF4-FFF2-40B4-BE49-F238E27FC236}">
+                <a16:creationId xmlns:a16="http://schemas.microsoft.com/office/drawing/2014/main" id="{A7E4442F-4EE8-F881-9B1B-E8B29755BDBD}"/>
               </a:ext>
             </a:extLst>
           </p:cNvPr>
@@ -4288,18 +4343,88 @@
         </p:blipFill>
         <p:spPr>
           <a:xfrm>
-            <a:off x="1786913" y="2973562"/>
-            <a:ext cx="4419210" cy="3417084"/>
+            <a:off x="7255280" y="4113691"/>
+            <a:ext cx="4435289" cy="2376047"/>
           </a:xfrm>
           <a:prstGeom prst="rect">
             <a:avLst/>
           </a:prstGeom>
         </p:spPr>
       </p:pic>
+      <p:sp>
+        <p:nvSpPr>
+          <p:cNvPr id="11" name="TextBox 10">
+            <a:extLst>
+              <a:ext uri="{FF2B5EF4-FFF2-40B4-BE49-F238E27FC236}">
+                <a16:creationId xmlns:a16="http://schemas.microsoft.com/office/drawing/2014/main" id="{90168B75-BF86-2D36-58ED-0D40355E94B8}"/>
+              </a:ext>
+            </a:extLst>
+          </p:cNvPr>
+          <p:cNvSpPr txBox="1"/>
+          <p:nvPr/>
+        </p:nvSpPr>
+        <p:spPr>
+          <a:xfrm>
+            <a:off x="10296177" y="3769488"/>
+            <a:ext cx="1236236" cy="369332"/>
+          </a:xfrm>
+          <a:prstGeom prst="rect">
+            <a:avLst/>
+          </a:prstGeom>
+          <a:noFill/>
+        </p:spPr>
+        <p:txBody>
+          <a:bodyPr wrap="none" rtlCol="0">
+            <a:spAutoFit/>
+          </a:bodyPr>
+          <a:lstStyle/>
+          <a:p>
+            <a:r>
+              <a:rPr lang="en-US" b="1" dirty="0"/>
+              <a:t>Fine Labels</a:t>
+            </a:r>
+          </a:p>
+        </p:txBody>
+      </p:sp>
+      <p:sp>
+        <p:nvSpPr>
+          <p:cNvPr id="12" name="TextBox 11">
+            <a:extLst>
+              <a:ext uri="{FF2B5EF4-FFF2-40B4-BE49-F238E27FC236}">
+                <a16:creationId xmlns:a16="http://schemas.microsoft.com/office/drawing/2014/main" id="{765A24B6-1711-E454-9E3B-C71A3860076F}"/>
+              </a:ext>
+            </a:extLst>
+          </p:cNvPr>
+          <p:cNvSpPr txBox="1"/>
+          <p:nvPr/>
+        </p:nvSpPr>
+        <p:spPr>
+          <a:xfrm>
+            <a:off x="10592930" y="1556285"/>
+            <a:ext cx="1340432" cy="338554"/>
+          </a:xfrm>
+          <a:prstGeom prst="rect">
+            <a:avLst/>
+          </a:prstGeom>
+          <a:noFill/>
+        </p:spPr>
+        <p:txBody>
+          <a:bodyPr wrap="none" rtlCol="0">
+            <a:spAutoFit/>
+          </a:bodyPr>
+          <a:lstStyle/>
+          <a:p>
+            <a:r>
+              <a:rPr lang="en-US" sz="1600" b="1" dirty="0"/>
+              <a:t>Simple Labels</a:t>
+            </a:r>
+          </a:p>
+        </p:txBody>
+      </p:sp>
     </p:spTree>
     <p:extLst>
       <p:ext uri="{BB962C8B-B14F-4D97-AF65-F5344CB8AC3E}">
-        <p14:creationId xmlns:p14="http://schemas.microsoft.com/office/powerpoint/2010/main" val="2041570772"/>
+        <p14:creationId xmlns:p14="http://schemas.microsoft.com/office/powerpoint/2010/main" val="1977982267"/>
       </p:ext>
     </p:extLst>
   </p:cSld>
@@ -4331,7 +4456,7 @@
           <p:cNvPr id="2" name="Title 1">
             <a:extLst>
               <a:ext uri="{FF2B5EF4-FFF2-40B4-BE49-F238E27FC236}">
-                <a16:creationId xmlns:a16="http://schemas.microsoft.com/office/drawing/2014/main" id="{B64BC24A-6320-ACAE-D16F-90D79769B63C}"/>
+                <a16:creationId xmlns:a16="http://schemas.microsoft.com/office/drawing/2014/main" id="{16A6C89E-64F5-F3C7-8FB8-4B03FDC5B489}"/>
               </a:ext>
             </a:extLst>
           </p:cNvPr>
@@ -4347,41 +4472,315 @@
           <a:bodyPr/>
           <a:lstStyle/>
           <a:p>
-            <a:endParaRPr lang="en-US"/>
-          </a:p>
-        </p:txBody>
-      </p:sp>
-      <p:sp>
-        <p:nvSpPr>
-          <p:cNvPr id="4" name="TextBox 3">
-            <a:extLst>
-              <a:ext uri="{FF2B5EF4-FFF2-40B4-BE49-F238E27FC236}">
-                <a16:creationId xmlns:a16="http://schemas.microsoft.com/office/drawing/2014/main" id="{46A6E8BC-4D53-4C8D-B87D-DE4AD32ED679}"/>
-              </a:ext>
-            </a:extLst>
-          </p:cNvPr>
-          <p:cNvSpPr txBox="1"/>
+            <a:r>
+              <a:rPr lang="en-US" dirty="0"/>
+              <a:t>Classification Based: </a:t>
+            </a:r>
+            <a:r>
+              <a:rPr lang="en-US" dirty="0" err="1"/>
+              <a:t>scAnnoteR</a:t>
+            </a:r>
+            <a:r>
+              <a:rPr lang="en-US" dirty="0"/>
+              <a:t>, default model</a:t>
+            </a:r>
+          </a:p>
+        </p:txBody>
+      </p:sp>
+      <p:pic>
+        <p:nvPicPr>
+          <p:cNvPr id="4" name="Picture 3">
+            <a:extLst>
+              <a:ext uri="{FF2B5EF4-FFF2-40B4-BE49-F238E27FC236}">
+                <a16:creationId xmlns:a16="http://schemas.microsoft.com/office/drawing/2014/main" id="{C7A34AC9-61F6-1BE2-44A3-C37236665A70}"/>
+              </a:ext>
+            </a:extLst>
+          </p:cNvPr>
+          <p:cNvPicPr>
+            <a:picLocks noChangeAspect="1"/>
+          </p:cNvPicPr>
           <p:nvPr/>
-        </p:nvSpPr>
+        </p:nvPicPr>
+        <p:blipFill>
+          <a:blip r:embed="rId2"/>
+          <a:stretch>
+            <a:fillRect/>
+          </a:stretch>
+        </p:blipFill>
         <p:spPr>
           <a:xfrm>
-            <a:off x="2322576" y="3429000"/>
-            <a:ext cx="6199632" cy="646331"/>
+            <a:off x="364862" y="1001156"/>
+            <a:ext cx="4677428" cy="1600423"/>
+          </a:xfrm>
+          <a:prstGeom prst="rect">
+            <a:avLst/>
+          </a:prstGeom>
+        </p:spPr>
+      </p:pic>
+      <p:pic>
+        <p:nvPicPr>
+          <p:cNvPr id="1026" name="Picture 2" descr="Workflow of scAnnotate on a dataset with at most one rare cell population (at most one cell population less than 100 cells). The vertical grey dashed line separates training data (left) and test data (right) information">
+            <a:extLst>
+              <a:ext uri="{FF2B5EF4-FFF2-40B4-BE49-F238E27FC236}">
+                <a16:creationId xmlns:a16="http://schemas.microsoft.com/office/drawing/2014/main" id="{C275E2A4-1C90-16FF-A85A-599C42832AE9}"/>
+              </a:ext>
+            </a:extLst>
+          </p:cNvPr>
+          <p:cNvPicPr>
+            <a:picLocks noChangeAspect="1" noChangeArrowheads="1"/>
+          </p:cNvPicPr>
+          <p:nvPr/>
+        </p:nvPicPr>
+        <p:blipFill>
+          <a:blip r:embed="rId3">
+            <a:extLst>
+              <a:ext uri="{28A0092B-C50C-407E-A947-70E740481C1C}">
+                <a14:useLocalDpi xmlns:a14="http://schemas.microsoft.com/office/drawing/2010/main" val="0"/>
+              </a:ext>
+            </a:extLst>
+          </a:blip>
+          <a:srcRect/>
+          <a:stretch>
+            <a:fillRect/>
+          </a:stretch>
+        </p:blipFill>
+        <p:spPr bwMode="auto">
+          <a:xfrm>
+            <a:off x="8284464" y="822960"/>
+            <a:ext cx="3674669" cy="5377564"/>
           </a:xfrm>
           <a:prstGeom prst="rect">
             <a:avLst/>
           </a:prstGeom>
           <a:noFill/>
-        </p:spPr>
-        <p:txBody>
-          <a:bodyPr wrap="square">
+          <a:extLst>
+            <a:ext uri="{909E8E84-426E-40DD-AFC4-6F175D3DCCD1}">
+              <a14:hiddenFill xmlns:a14="http://schemas.microsoft.com/office/drawing/2010/main">
+                <a:solidFill>
+                  <a:srgbClr val="FFFFFF"/>
+                </a:solidFill>
+              </a14:hiddenFill>
+            </a:ext>
+          </a:extLst>
+        </p:spPr>
+      </p:pic>
+      <p:pic>
+        <p:nvPicPr>
+          <p:cNvPr id="6" name="Picture 5">
+            <a:extLst>
+              <a:ext uri="{FF2B5EF4-FFF2-40B4-BE49-F238E27FC236}">
+                <a16:creationId xmlns:a16="http://schemas.microsoft.com/office/drawing/2014/main" id="{AAB948B5-7973-4C00-2CFC-8D9D38FB981E}"/>
+              </a:ext>
+            </a:extLst>
+          </p:cNvPr>
+          <p:cNvPicPr>
+            <a:picLocks noChangeAspect="1"/>
+          </p:cNvPicPr>
+          <p:nvPr/>
+        </p:nvPicPr>
+        <p:blipFill>
+          <a:blip r:embed="rId4"/>
+          <a:stretch>
+            <a:fillRect/>
+          </a:stretch>
+        </p:blipFill>
+        <p:spPr>
+          <a:xfrm>
+            <a:off x="3206496" y="2973562"/>
+            <a:ext cx="4419210" cy="3417084"/>
+          </a:xfrm>
+          <a:prstGeom prst="rect">
+            <a:avLst/>
+          </a:prstGeom>
+        </p:spPr>
+      </p:pic>
+    </p:spTree>
+    <p:extLst>
+      <p:ext uri="{BB962C8B-B14F-4D97-AF65-F5344CB8AC3E}">
+        <p14:creationId xmlns:p14="http://schemas.microsoft.com/office/powerpoint/2010/main" val="2041570772"/>
+      </p:ext>
+    </p:extLst>
+  </p:cSld>
+  <p:clrMapOvr>
+    <a:masterClrMapping/>
+  </p:clrMapOvr>
+</p:sld>
+</file>
+
+<file path=ppt/slides/slide9.xml><?xml version="1.0" encoding="utf-8"?>
+<p:sld xmlns:a="http://schemas.openxmlformats.org/drawingml/2006/main" xmlns:r="http://schemas.openxmlformats.org/officeDocument/2006/relationships" xmlns:p="http://schemas.openxmlformats.org/presentationml/2006/main">
+  <p:cSld>
+    <p:spTree>
+      <p:nvGrpSpPr>
+        <p:cNvPr id="1" name=""/>
+        <p:cNvGrpSpPr/>
+        <p:nvPr/>
+      </p:nvGrpSpPr>
+      <p:grpSpPr>
+        <a:xfrm>
+          <a:off x="0" y="0"/>
+          <a:ext cx="0" cy="0"/>
+          <a:chOff x="0" y="0"/>
+          <a:chExt cx="0" cy="0"/>
+        </a:xfrm>
+      </p:grpSpPr>
+      <p:sp>
+        <p:nvSpPr>
+          <p:cNvPr id="2" name="Title 1">
+            <a:extLst>
+              <a:ext uri="{FF2B5EF4-FFF2-40B4-BE49-F238E27FC236}">
+                <a16:creationId xmlns:a16="http://schemas.microsoft.com/office/drawing/2014/main" id="{B64BC24A-6320-ACAE-D16F-90D79769B63C}"/>
+              </a:ext>
+            </a:extLst>
+          </p:cNvPr>
+          <p:cNvSpPr>
+            <a:spLocks noGrp="1"/>
+          </p:cNvSpPr>
+          <p:nvPr>
+            <p:ph type="title"/>
+          </p:nvPr>
+        </p:nvSpPr>
+        <p:spPr/>
+        <p:txBody>
+          <a:bodyPr/>
+          <a:lstStyle/>
+          <a:p>
+            <a:r>
+              <a:rPr lang="en-US" dirty="0"/>
+              <a:t>Classification Based: </a:t>
+            </a:r>
+            <a:r>
+              <a:rPr lang="en-US" dirty="0" err="1"/>
+              <a:t>scPred</a:t>
+            </a:r>
+            <a:r>
+              <a:rPr lang="en-US" dirty="0"/>
+              <a:t> with Trained Reference</a:t>
+            </a:r>
+          </a:p>
+        </p:txBody>
+      </p:sp>
+      <p:pic>
+        <p:nvPicPr>
+          <p:cNvPr id="5" name="Picture 4">
+            <a:extLst>
+              <a:ext uri="{FF2B5EF4-FFF2-40B4-BE49-F238E27FC236}">
+                <a16:creationId xmlns:a16="http://schemas.microsoft.com/office/drawing/2014/main" id="{B512517D-6901-E5F0-7504-54D2112C11FC}"/>
+              </a:ext>
+            </a:extLst>
+          </p:cNvPr>
+          <p:cNvPicPr>
+            <a:picLocks noChangeAspect="1"/>
+          </p:cNvPicPr>
+          <p:nvPr/>
+        </p:nvPicPr>
+        <p:blipFill>
+          <a:blip r:embed="rId2"/>
+          <a:stretch>
+            <a:fillRect/>
+          </a:stretch>
+        </p:blipFill>
+        <p:spPr>
+          <a:xfrm>
+            <a:off x="6580489" y="878633"/>
+            <a:ext cx="4443844" cy="2623054"/>
+          </a:xfrm>
+          <a:prstGeom prst="rect">
+            <a:avLst/>
+          </a:prstGeom>
+        </p:spPr>
+      </p:pic>
+      <p:pic>
+        <p:nvPicPr>
+          <p:cNvPr id="7" name="Picture 6">
+            <a:extLst>
+              <a:ext uri="{FF2B5EF4-FFF2-40B4-BE49-F238E27FC236}">
+                <a16:creationId xmlns:a16="http://schemas.microsoft.com/office/drawing/2014/main" id="{D3980AE6-4993-8831-6444-633133C66BEB}"/>
+              </a:ext>
+            </a:extLst>
+          </p:cNvPr>
+          <p:cNvPicPr>
+            <a:picLocks noChangeAspect="1"/>
+          </p:cNvPicPr>
+          <p:nvPr/>
+        </p:nvPicPr>
+        <p:blipFill>
+          <a:blip r:embed="rId3"/>
+          <a:stretch>
+            <a:fillRect/>
+          </a:stretch>
+        </p:blipFill>
+        <p:spPr>
+          <a:xfrm>
+            <a:off x="6864097" y="4144340"/>
+            <a:ext cx="4620594" cy="2639233"/>
+          </a:xfrm>
+          <a:prstGeom prst="rect">
+            <a:avLst/>
+          </a:prstGeom>
+        </p:spPr>
+      </p:pic>
+      <p:pic>
+        <p:nvPicPr>
+          <p:cNvPr id="9" name="Picture 8">
+            <a:extLst>
+              <a:ext uri="{FF2B5EF4-FFF2-40B4-BE49-F238E27FC236}">
+                <a16:creationId xmlns:a16="http://schemas.microsoft.com/office/drawing/2014/main" id="{1F7FF9BF-0170-E135-3AA4-D8D881640F43}"/>
+              </a:ext>
+            </a:extLst>
+          </p:cNvPr>
+          <p:cNvPicPr>
+            <a:picLocks noChangeAspect="1"/>
+          </p:cNvPicPr>
+          <p:nvPr/>
+        </p:nvPicPr>
+        <p:blipFill>
+          <a:blip r:embed="rId4"/>
+          <a:stretch>
+            <a:fillRect/>
+          </a:stretch>
+        </p:blipFill>
+        <p:spPr>
+          <a:xfrm>
+            <a:off x="207265" y="786840"/>
+            <a:ext cx="6144482" cy="4201111"/>
+          </a:xfrm>
+          <a:prstGeom prst="rect">
+            <a:avLst/>
+          </a:prstGeom>
+        </p:spPr>
+      </p:pic>
+      <p:sp>
+        <p:nvSpPr>
+          <p:cNvPr id="10" name="TextBox 9">
+            <a:extLst>
+              <a:ext uri="{FF2B5EF4-FFF2-40B4-BE49-F238E27FC236}">
+                <a16:creationId xmlns:a16="http://schemas.microsoft.com/office/drawing/2014/main" id="{73D7C881-92F5-D120-8A72-5F141F326C4A}"/>
+              </a:ext>
+            </a:extLst>
+          </p:cNvPr>
+          <p:cNvSpPr txBox="1"/>
+          <p:nvPr/>
+        </p:nvSpPr>
+        <p:spPr>
+          <a:xfrm>
+            <a:off x="207265" y="5614416"/>
+            <a:ext cx="5120640" cy="646331"/>
+          </a:xfrm>
+          <a:prstGeom prst="rect">
+            <a:avLst/>
+          </a:prstGeom>
+          <a:noFill/>
+        </p:spPr>
+        <p:txBody>
+          <a:bodyPr wrap="square" rtlCol="0">
             <a:spAutoFit/>
           </a:bodyPr>
           <a:lstStyle/>
           <a:p>
             <a:r>
-              <a:rPr lang="en-US" dirty="0"/>
-              <a:t>https://bioconductor.org/packages/release/bioc/vignettes/scAnnotatR/inst/doc/training-basic-model.html</a:t>
+              <a:rPr lang="en-US" i="1" dirty="0"/>
+              <a:t>Note: updates are required for this package to function with Seurat V5</a:t>
             </a:r>
           </a:p>
         </p:txBody>

</xml_diff>

<commit_message>
Updates M0, M3, M4, M5, and M6.
</commit_message>
<xml_diff>
--- a/M4_Seurat_CellType/M4_Seurat_CellType.pptx
+++ b/M4_Seurat_CellType/M4_Seurat_CellType.pptx
@@ -205,7 +205,7 @@
           <a:p>
             <a:fld id="{FF40CFF0-3E11-4AF6-9747-7919C58FBC48}" type="datetimeFigureOut">
               <a:rPr lang="en-US" smtClean="0"/>
-              <a:t>2/4/2024</a:t>
+              <a:t>4/1/2024</a:t>
             </a:fld>
             <a:endParaRPr lang="en-US"/>
           </a:p>
@@ -751,7 +751,7 @@
           <a:p>
             <a:fld id="{9F69634C-F75C-45F7-A87A-C5E2AF3ECA41}" type="datetimeFigureOut">
               <a:rPr lang="en-US" smtClean="0"/>
-              <a:t>2/4/2024</a:t>
+              <a:t>4/1/2024</a:t>
             </a:fld>
             <a:endParaRPr lang="en-US"/>
           </a:p>
@@ -916,7 +916,7 @@
           <a:p>
             <a:fld id="{9F69634C-F75C-45F7-A87A-C5E2AF3ECA41}" type="datetimeFigureOut">
               <a:rPr lang="en-US" smtClean="0"/>
-              <a:t>2/4/2024</a:t>
+              <a:t>4/1/2024</a:t>
             </a:fld>
             <a:endParaRPr lang="en-US"/>
           </a:p>
@@ -1119,7 +1119,7 @@
           <a:p>
             <a:fld id="{9F69634C-F75C-45F7-A87A-C5E2AF3ECA41}" type="datetimeFigureOut">
               <a:rPr lang="en-US" smtClean="0"/>
-              <a:t>2/4/2024</a:t>
+              <a:t>4/1/2024</a:t>
             </a:fld>
             <a:endParaRPr lang="en-US"/>
           </a:p>
@@ -1384,7 +1384,7 @@
           <a:p>
             <a:fld id="{9F69634C-F75C-45F7-A87A-C5E2AF3ECA41}" type="datetimeFigureOut">
               <a:rPr lang="en-US" smtClean="0"/>
-              <a:t>2/4/2024</a:t>
+              <a:t>4/1/2024</a:t>
             </a:fld>
             <a:endParaRPr lang="en-US"/>
           </a:p>
@@ -1497,7 +1497,7 @@
           <a:p>
             <a:fld id="{9F69634C-F75C-45F7-A87A-C5E2AF3ECA41}" type="datetimeFigureOut">
               <a:rPr lang="en-US" smtClean="0"/>
-              <a:t>2/4/2024</a:t>
+              <a:t>4/1/2024</a:t>
             </a:fld>
             <a:endParaRPr lang="en-US"/>
           </a:p>
@@ -1739,7 +1739,7 @@
           <a:p>
             <a:fld id="{9F69634C-F75C-45F7-A87A-C5E2AF3ECA41}" type="datetimeFigureOut">
               <a:rPr lang="en-US" smtClean="0"/>
-              <a:t>2/4/2024</a:t>
+              <a:t>4/1/2024</a:t>
             </a:fld>
             <a:endParaRPr lang="en-US"/>
           </a:p>
@@ -4283,7 +4283,7 @@
         </p:blipFill>
         <p:spPr>
           <a:xfrm>
-            <a:off x="7114120" y="980733"/>
+            <a:off x="1731950" y="3780560"/>
             <a:ext cx="4326853" cy="2659072"/>
           </a:xfrm>
           <a:prstGeom prst="rect">
@@ -4343,7 +4343,7 @@
         </p:blipFill>
         <p:spPr>
           <a:xfrm>
-            <a:off x="7255280" y="4113691"/>
+            <a:off x="6551192" y="1968993"/>
             <a:ext cx="4435289" cy="2376047"/>
           </a:xfrm>
           <a:prstGeom prst="rect">
@@ -4365,7 +4365,7 @@
         </p:nvSpPr>
         <p:spPr>
           <a:xfrm>
-            <a:off x="10296177" y="3769488"/>
+            <a:off x="9592089" y="1624790"/>
             <a:ext cx="1236236" cy="369332"/>
           </a:xfrm>
           <a:prstGeom prst="rect">
@@ -4400,7 +4400,7 @@
         </p:nvSpPr>
         <p:spPr>
           <a:xfrm>
-            <a:off x="10592930" y="1556285"/>
+            <a:off x="5210760" y="4356112"/>
             <a:ext cx="1340432" cy="338554"/>
           </a:xfrm>
           <a:prstGeom prst="rect">
@@ -4546,7 +4546,7 @@
         </p:blipFill>
         <p:spPr bwMode="auto">
           <a:xfrm>
-            <a:off x="8284464" y="822960"/>
+            <a:off x="7370064" y="804672"/>
             <a:ext cx="3674669" cy="5377564"/>
           </a:xfrm>
           <a:prstGeom prst="rect">
@@ -4586,7 +4586,7 @@
         </p:blipFill>
         <p:spPr>
           <a:xfrm>
-            <a:off x="3206496" y="2973562"/>
+            <a:off x="2008632" y="2973562"/>
             <a:ext cx="4419210" cy="3417084"/>
           </a:xfrm>
           <a:prstGeom prst="rect">

</xml_diff>

<commit_message>
Updates to most slides.
</commit_message>
<xml_diff>
--- a/M4_Seurat_CellType/M4_Seurat_CellType.pptx
+++ b/M4_Seurat_CellType/M4_Seurat_CellType.pptx
@@ -5,7 +5,7 @@
     <p:sldMasterId id="2147483656" r:id="rId1"/>
   </p:sldMasterIdLst>
   <p:notesMasterIdLst>
-    <p:notesMasterId r:id="rId11"/>
+    <p:notesMasterId r:id="rId12"/>
   </p:notesMasterIdLst>
   <p:sldIdLst>
     <p:sldId id="256" r:id="rId2"/>
@@ -17,6 +17,7 @@
     <p:sldId id="268" r:id="rId8"/>
     <p:sldId id="266" r:id="rId9"/>
     <p:sldId id="267" r:id="rId10"/>
+    <p:sldId id="269" r:id="rId11"/>
   </p:sldIdLst>
   <p:sldSz cx="12192000" cy="6858000"/>
   <p:notesSz cx="6858000" cy="9144000"/>
@@ -205,7 +206,7 @@
           <a:p>
             <a:fld id="{FF40CFF0-3E11-4AF6-9747-7919C58FBC48}" type="datetimeFigureOut">
               <a:rPr lang="en-US" smtClean="0"/>
-              <a:t>4/4/24</a:t>
+              <a:t>4/5/2024</a:t>
             </a:fld>
             <a:endParaRPr lang="en-US"/>
           </a:p>
@@ -751,7 +752,7 @@
           <a:p>
             <a:fld id="{9F69634C-F75C-45F7-A87A-C5E2AF3ECA41}" type="datetimeFigureOut">
               <a:rPr lang="en-US" smtClean="0"/>
-              <a:t>4/4/24</a:t>
+              <a:t>4/5/2024</a:t>
             </a:fld>
             <a:endParaRPr lang="en-US"/>
           </a:p>
@@ -916,7 +917,7 @@
           <a:p>
             <a:fld id="{9F69634C-F75C-45F7-A87A-C5E2AF3ECA41}" type="datetimeFigureOut">
               <a:rPr lang="en-US" smtClean="0"/>
-              <a:t>4/4/24</a:t>
+              <a:t>4/5/2024</a:t>
             </a:fld>
             <a:endParaRPr lang="en-US"/>
           </a:p>
@@ -1119,7 +1120,7 @@
           <a:p>
             <a:fld id="{9F69634C-F75C-45F7-A87A-C5E2AF3ECA41}" type="datetimeFigureOut">
               <a:rPr lang="en-US" smtClean="0"/>
-              <a:t>4/4/24</a:t>
+              <a:t>4/5/2024</a:t>
             </a:fld>
             <a:endParaRPr lang="en-US"/>
           </a:p>
@@ -1384,7 +1385,7 @@
           <a:p>
             <a:fld id="{9F69634C-F75C-45F7-A87A-C5E2AF3ECA41}" type="datetimeFigureOut">
               <a:rPr lang="en-US" smtClean="0"/>
-              <a:t>4/4/24</a:t>
+              <a:t>4/5/2024</a:t>
             </a:fld>
             <a:endParaRPr lang="en-US"/>
           </a:p>
@@ -1497,7 +1498,7 @@
           <a:p>
             <a:fld id="{9F69634C-F75C-45F7-A87A-C5E2AF3ECA41}" type="datetimeFigureOut">
               <a:rPr lang="en-US" smtClean="0"/>
-              <a:t>4/4/24</a:t>
+              <a:t>4/5/2024</a:t>
             </a:fld>
             <a:endParaRPr lang="en-US"/>
           </a:p>
@@ -1739,7 +1740,7 @@
           <a:p>
             <a:fld id="{9F69634C-F75C-45F7-A87A-C5E2AF3ECA41}" type="datetimeFigureOut">
               <a:rPr lang="en-US" smtClean="0"/>
-              <a:t>4/4/24</a:t>
+              <a:t>4/5/2024</a:t>
             </a:fld>
             <a:endParaRPr lang="en-US"/>
           </a:p>
@@ -2610,6 +2611,546 @@
     <p:extLst>
       <p:ext uri="{BB962C8B-B14F-4D97-AF65-F5344CB8AC3E}">
         <p14:creationId xmlns:p14="http://schemas.microsoft.com/office/powerpoint/2010/main" val="2380909950"/>
+      </p:ext>
+    </p:extLst>
+  </p:cSld>
+  <p:clrMapOvr>
+    <a:masterClrMapping/>
+  </p:clrMapOvr>
+</p:sld>
+</file>
+
+<file path=ppt/slides/slide10.xml><?xml version="1.0" encoding="utf-8"?>
+<p:sld xmlns:a="http://schemas.openxmlformats.org/drawingml/2006/main" xmlns:r="http://schemas.openxmlformats.org/officeDocument/2006/relationships" xmlns:p="http://schemas.openxmlformats.org/presentationml/2006/main">
+  <p:cSld>
+    <p:spTree>
+      <p:nvGrpSpPr>
+        <p:cNvPr id="1" name=""/>
+        <p:cNvGrpSpPr/>
+        <p:nvPr/>
+      </p:nvGrpSpPr>
+      <p:grpSpPr>
+        <a:xfrm>
+          <a:off x="0" y="0"/>
+          <a:ext cx="0" cy="0"/>
+          <a:chOff x="0" y="0"/>
+          <a:chExt cx="0" cy="0"/>
+        </a:xfrm>
+      </p:grpSpPr>
+      <p:grpSp>
+        <p:nvGrpSpPr>
+          <p:cNvPr id="13" name="Group 12">
+            <a:extLst>
+              <a:ext uri="{FF2B5EF4-FFF2-40B4-BE49-F238E27FC236}">
+                <a16:creationId xmlns:a16="http://schemas.microsoft.com/office/drawing/2014/main" id="{2896BDB1-5BE6-4EA2-E515-66CCF8852990}"/>
+              </a:ext>
+            </a:extLst>
+          </p:cNvPr>
+          <p:cNvGrpSpPr>
+            <a:grpSpLocks noChangeAspect="1"/>
+          </p:cNvGrpSpPr>
+          <p:nvPr/>
+        </p:nvGrpSpPr>
+        <p:grpSpPr>
+          <a:xfrm>
+            <a:off x="218742" y="810125"/>
+            <a:ext cx="7325058" cy="1699532"/>
+            <a:chOff x="434780" y="1103624"/>
+            <a:chExt cx="6796771" cy="1576962"/>
+          </a:xfrm>
+        </p:grpSpPr>
+        <p:pic>
+          <p:nvPicPr>
+            <p:cNvPr id="4" name="Picture 3">
+              <a:extLst>
+                <a:ext uri="{FF2B5EF4-FFF2-40B4-BE49-F238E27FC236}">
+                  <a16:creationId xmlns:a16="http://schemas.microsoft.com/office/drawing/2014/main" id="{D13F34B3-F82C-1FB6-211C-E1170695862F}"/>
+                </a:ext>
+              </a:extLst>
+            </p:cNvPr>
+            <p:cNvPicPr>
+              <a:picLocks noChangeAspect="1"/>
+            </p:cNvPicPr>
+            <p:nvPr/>
+          </p:nvPicPr>
+          <p:blipFill>
+            <a:blip r:embed="rId2"/>
+            <a:stretch>
+              <a:fillRect/>
+            </a:stretch>
+          </p:blipFill>
+          <p:spPr>
+            <a:xfrm>
+              <a:off x="698659" y="1650762"/>
+              <a:ext cx="3734039" cy="1029824"/>
+            </a:xfrm>
+            <a:prstGeom prst="rect">
+              <a:avLst/>
+            </a:prstGeom>
+          </p:spPr>
+        </p:pic>
+        <p:pic>
+          <p:nvPicPr>
+            <p:cNvPr id="10" name="Picture 9">
+              <a:extLst>
+                <a:ext uri="{FF2B5EF4-FFF2-40B4-BE49-F238E27FC236}">
+                  <a16:creationId xmlns:a16="http://schemas.microsoft.com/office/drawing/2014/main" id="{DFDFAA16-B102-DE0B-1CA1-D7C3ED9ECFC5}"/>
+                </a:ext>
+              </a:extLst>
+            </p:cNvPr>
+            <p:cNvPicPr>
+              <a:picLocks noChangeAspect="1"/>
+            </p:cNvPicPr>
+            <p:nvPr/>
+          </p:nvPicPr>
+          <p:blipFill>
+            <a:blip r:embed="rId3"/>
+            <a:stretch>
+              <a:fillRect/>
+            </a:stretch>
+          </p:blipFill>
+          <p:spPr>
+            <a:xfrm>
+              <a:off x="4370832" y="1103624"/>
+              <a:ext cx="2860719" cy="1576962"/>
+            </a:xfrm>
+            <a:prstGeom prst="rect">
+              <a:avLst/>
+            </a:prstGeom>
+          </p:spPr>
+        </p:pic>
+        <p:pic>
+          <p:nvPicPr>
+            <p:cNvPr id="12" name="Picture 11">
+              <a:extLst>
+                <a:ext uri="{FF2B5EF4-FFF2-40B4-BE49-F238E27FC236}">
+                  <a16:creationId xmlns:a16="http://schemas.microsoft.com/office/drawing/2014/main" id="{6ECBCB47-98FB-4009-539D-41D91E764170}"/>
+                </a:ext>
+              </a:extLst>
+            </p:cNvPr>
+            <p:cNvPicPr>
+              <a:picLocks noChangeAspect="1"/>
+            </p:cNvPicPr>
+            <p:nvPr/>
+          </p:nvPicPr>
+          <p:blipFill>
+            <a:blip r:embed="rId4"/>
+            <a:stretch>
+              <a:fillRect/>
+            </a:stretch>
+          </p:blipFill>
+          <p:spPr>
+            <a:xfrm>
+              <a:off x="434780" y="1165701"/>
+              <a:ext cx="3734039" cy="436446"/>
+            </a:xfrm>
+            <a:prstGeom prst="rect">
+              <a:avLst/>
+            </a:prstGeom>
+          </p:spPr>
+        </p:pic>
+      </p:grpSp>
+      <p:sp>
+        <p:nvSpPr>
+          <p:cNvPr id="35" name="Rectangle 34">
+            <a:extLst>
+              <a:ext uri="{FF2B5EF4-FFF2-40B4-BE49-F238E27FC236}">
+                <a16:creationId xmlns:a16="http://schemas.microsoft.com/office/drawing/2014/main" id="{B38FFBE4-DD5F-ABA6-9C1A-36BC0E10A0DF}"/>
+              </a:ext>
+            </a:extLst>
+          </p:cNvPr>
+          <p:cNvSpPr/>
+          <p:nvPr/>
+        </p:nvSpPr>
+        <p:spPr>
+          <a:xfrm>
+            <a:off x="4460728" y="2186940"/>
+            <a:ext cx="7036119" cy="445234"/>
+          </a:xfrm>
+          <a:prstGeom prst="rect">
+            <a:avLst/>
+          </a:prstGeom>
+          <a:solidFill>
+            <a:schemeClr val="bg1"/>
+          </a:solidFill>
+          <a:ln>
+            <a:noFill/>
+          </a:ln>
+        </p:spPr>
+        <p:style>
+          <a:lnRef idx="2">
+            <a:schemeClr val="accent1">
+              <a:shade val="15000"/>
+            </a:schemeClr>
+          </a:lnRef>
+          <a:fillRef idx="1">
+            <a:schemeClr val="accent1"/>
+          </a:fillRef>
+          <a:effectRef idx="0">
+            <a:schemeClr val="accent1"/>
+          </a:effectRef>
+          <a:fontRef idx="minor">
+            <a:schemeClr val="lt1"/>
+          </a:fontRef>
+        </p:style>
+        <p:txBody>
+          <a:bodyPr rtlCol="0" anchor="ctr"/>
+          <a:lstStyle/>
+          <a:p>
+            <a:pPr algn="ctr"/>
+            <a:endParaRPr lang="en-US"/>
+          </a:p>
+        </p:txBody>
+      </p:sp>
+      <p:sp>
+        <p:nvSpPr>
+          <p:cNvPr id="2" name="Title 1">
+            <a:extLst>
+              <a:ext uri="{FF2B5EF4-FFF2-40B4-BE49-F238E27FC236}">
+                <a16:creationId xmlns:a16="http://schemas.microsoft.com/office/drawing/2014/main" id="{FC8EEA55-6B96-183C-34FB-5060ABC85E70}"/>
+              </a:ext>
+            </a:extLst>
+          </p:cNvPr>
+          <p:cNvSpPr>
+            <a:spLocks noGrp="1"/>
+          </p:cNvSpPr>
+          <p:nvPr>
+            <p:ph type="title"/>
+          </p:nvPr>
+        </p:nvSpPr>
+        <p:spPr/>
+        <p:txBody>
+          <a:bodyPr/>
+          <a:lstStyle/>
+          <a:p>
+            <a:r>
+              <a:rPr lang="en-US"/>
+              <a:t>Questions?</a:t>
+            </a:r>
+            <a:endParaRPr lang="en-US" dirty="0"/>
+          </a:p>
+        </p:txBody>
+      </p:sp>
+      <p:grpSp>
+        <p:nvGrpSpPr>
+          <p:cNvPr id="27" name="Group 26">
+            <a:extLst>
+              <a:ext uri="{FF2B5EF4-FFF2-40B4-BE49-F238E27FC236}">
+                <a16:creationId xmlns:a16="http://schemas.microsoft.com/office/drawing/2014/main" id="{4E046237-CD70-B57E-8280-A47780088423}"/>
+              </a:ext>
+            </a:extLst>
+          </p:cNvPr>
+          <p:cNvGrpSpPr>
+            <a:grpSpLocks noChangeAspect="1"/>
+          </p:cNvGrpSpPr>
+          <p:nvPr/>
+        </p:nvGrpSpPr>
+        <p:grpSpPr>
+          <a:xfrm>
+            <a:off x="4460728" y="2285562"/>
+            <a:ext cx="7036119" cy="2826696"/>
+            <a:chOff x="6308800" y="2527381"/>
+            <a:chExt cx="5683814" cy="2283420"/>
+          </a:xfrm>
+        </p:grpSpPr>
+        <p:pic>
+          <p:nvPicPr>
+            <p:cNvPr id="24" name="Picture 23">
+              <a:extLst>
+                <a:ext uri="{FF2B5EF4-FFF2-40B4-BE49-F238E27FC236}">
+                  <a16:creationId xmlns:a16="http://schemas.microsoft.com/office/drawing/2014/main" id="{3D96EA21-7E70-D1F4-ECB8-01D779CE549E}"/>
+                </a:ext>
+              </a:extLst>
+            </p:cNvPr>
+            <p:cNvPicPr>
+              <a:picLocks noChangeAspect="1"/>
+            </p:cNvPicPr>
+            <p:nvPr/>
+          </p:nvPicPr>
+          <p:blipFill>
+            <a:blip r:embed="rId5"/>
+            <a:stretch>
+              <a:fillRect/>
+            </a:stretch>
+          </p:blipFill>
+          <p:spPr>
+            <a:xfrm>
+              <a:off x="6308800" y="2868574"/>
+              <a:ext cx="5683814" cy="1942227"/>
+            </a:xfrm>
+            <a:prstGeom prst="rect">
+              <a:avLst/>
+            </a:prstGeom>
+          </p:spPr>
+        </p:pic>
+        <p:pic>
+          <p:nvPicPr>
+            <p:cNvPr id="26" name="Picture 25">
+              <a:extLst>
+                <a:ext uri="{FF2B5EF4-FFF2-40B4-BE49-F238E27FC236}">
+                  <a16:creationId xmlns:a16="http://schemas.microsoft.com/office/drawing/2014/main" id="{E84283DC-C21D-6740-3308-8A13CCCB8D46}"/>
+                </a:ext>
+              </a:extLst>
+            </p:cNvPr>
+            <p:cNvPicPr>
+              <a:picLocks noChangeAspect="1"/>
+            </p:cNvPicPr>
+            <p:nvPr/>
+          </p:nvPicPr>
+          <p:blipFill>
+            <a:blip r:embed="rId6"/>
+            <a:stretch>
+              <a:fillRect/>
+            </a:stretch>
+          </p:blipFill>
+          <p:spPr>
+            <a:xfrm>
+              <a:off x="6370356" y="2527381"/>
+              <a:ext cx="5340507" cy="335038"/>
+            </a:xfrm>
+            <a:prstGeom prst="rect">
+              <a:avLst/>
+            </a:prstGeom>
+          </p:spPr>
+        </p:pic>
+      </p:grpSp>
+      <p:grpSp>
+        <p:nvGrpSpPr>
+          <p:cNvPr id="34" name="Group 33">
+            <a:extLst>
+              <a:ext uri="{FF2B5EF4-FFF2-40B4-BE49-F238E27FC236}">
+                <a16:creationId xmlns:a16="http://schemas.microsoft.com/office/drawing/2014/main" id="{B4AB3F2C-1D12-9154-8464-71100F166C60}"/>
+              </a:ext>
+            </a:extLst>
+          </p:cNvPr>
+          <p:cNvGrpSpPr>
+            <a:grpSpLocks noChangeAspect="1"/>
+          </p:cNvGrpSpPr>
+          <p:nvPr/>
+        </p:nvGrpSpPr>
+        <p:grpSpPr>
+          <a:xfrm>
+            <a:off x="333965" y="4436292"/>
+            <a:ext cx="7693930" cy="2287719"/>
+            <a:chOff x="297390" y="4588996"/>
+            <a:chExt cx="6535795" cy="1943358"/>
+          </a:xfrm>
+        </p:grpSpPr>
+        <p:sp>
+          <p:nvSpPr>
+            <p:cNvPr id="28" name="Rectangle 27">
+              <a:extLst>
+                <a:ext uri="{FF2B5EF4-FFF2-40B4-BE49-F238E27FC236}">
+                  <a16:creationId xmlns:a16="http://schemas.microsoft.com/office/drawing/2014/main" id="{B53ADC2D-2ACA-5DC7-3FD8-9C45373A0634}"/>
+                </a:ext>
+              </a:extLst>
+            </p:cNvPr>
+            <p:cNvSpPr/>
+            <p:nvPr/>
+          </p:nvSpPr>
+          <p:spPr>
+            <a:xfrm>
+              <a:off x="297391" y="4588996"/>
+              <a:ext cx="6525915" cy="1943358"/>
+            </a:xfrm>
+            <a:prstGeom prst="rect">
+              <a:avLst/>
+            </a:prstGeom>
+            <a:solidFill>
+              <a:schemeClr val="bg1"/>
+            </a:solidFill>
+            <a:ln>
+              <a:solidFill>
+                <a:srgbClr val="FFFFFF"/>
+              </a:solidFill>
+            </a:ln>
+          </p:spPr>
+          <p:style>
+            <a:lnRef idx="2">
+              <a:schemeClr val="accent1">
+                <a:shade val="15000"/>
+              </a:schemeClr>
+            </a:lnRef>
+            <a:fillRef idx="1">
+              <a:schemeClr val="accent1"/>
+            </a:fillRef>
+            <a:effectRef idx="0">
+              <a:schemeClr val="accent1"/>
+            </a:effectRef>
+            <a:fontRef idx="minor">
+              <a:schemeClr val="lt1"/>
+            </a:fontRef>
+          </p:style>
+          <p:txBody>
+            <a:bodyPr rtlCol="0" anchor="ctr"/>
+            <a:lstStyle/>
+            <a:p>
+              <a:pPr algn="ctr"/>
+              <a:endParaRPr lang="en-US" dirty="0"/>
+            </a:p>
+          </p:txBody>
+        </p:sp>
+        <p:pic>
+          <p:nvPicPr>
+            <p:cNvPr id="17" name="Picture 16">
+              <a:extLst>
+                <a:ext uri="{FF2B5EF4-FFF2-40B4-BE49-F238E27FC236}">
+                  <a16:creationId xmlns:a16="http://schemas.microsoft.com/office/drawing/2014/main" id="{28607718-9C28-E96B-878A-35D23306B6C0}"/>
+                </a:ext>
+              </a:extLst>
+            </p:cNvPr>
+            <p:cNvPicPr>
+              <a:picLocks noChangeAspect="1"/>
+            </p:cNvPicPr>
+            <p:nvPr/>
+          </p:nvPicPr>
+          <p:blipFill>
+            <a:blip r:embed="rId7"/>
+            <a:stretch>
+              <a:fillRect/>
+            </a:stretch>
+          </p:blipFill>
+          <p:spPr>
+            <a:xfrm>
+              <a:off x="340254" y="5143953"/>
+              <a:ext cx="2760554" cy="1362052"/>
+            </a:xfrm>
+            <a:prstGeom prst="rect">
+              <a:avLst/>
+            </a:prstGeom>
+          </p:spPr>
+        </p:pic>
+        <p:pic>
+          <p:nvPicPr>
+            <p:cNvPr id="32" name="Picture 31">
+              <a:extLst>
+                <a:ext uri="{FF2B5EF4-FFF2-40B4-BE49-F238E27FC236}">
+                  <a16:creationId xmlns:a16="http://schemas.microsoft.com/office/drawing/2014/main" id="{85F611A3-0792-9D64-552E-9557E0B376F3}"/>
+                </a:ext>
+              </a:extLst>
+            </p:cNvPr>
+            <p:cNvPicPr>
+              <a:picLocks noChangeAspect="1"/>
+            </p:cNvPicPr>
+            <p:nvPr/>
+          </p:nvPicPr>
+          <p:blipFill rotWithShape="1">
+            <a:blip r:embed="rId8"/>
+            <a:srcRect b="16918"/>
+            <a:stretch/>
+          </p:blipFill>
+          <p:spPr>
+            <a:xfrm>
+              <a:off x="297390" y="4626178"/>
+              <a:ext cx="5635210" cy="462647"/>
+            </a:xfrm>
+            <a:prstGeom prst="rect">
+              <a:avLst/>
+            </a:prstGeom>
+          </p:spPr>
+        </p:pic>
+        <p:sp>
+          <p:nvSpPr>
+            <p:cNvPr id="33" name="Rectangle 32">
+              <a:extLst>
+                <a:ext uri="{FF2B5EF4-FFF2-40B4-BE49-F238E27FC236}">
+                  <a16:creationId xmlns:a16="http://schemas.microsoft.com/office/drawing/2014/main" id="{AB722F23-BD85-9BBC-9E84-D1E0FAEB53C8}"/>
+                </a:ext>
+              </a:extLst>
+            </p:cNvPr>
+            <p:cNvSpPr/>
+            <p:nvPr/>
+          </p:nvSpPr>
+          <p:spPr>
+            <a:xfrm>
+              <a:off x="3086100" y="5143953"/>
+              <a:ext cx="3747085" cy="1371147"/>
+            </a:xfrm>
+            <a:prstGeom prst="rect">
+              <a:avLst/>
+            </a:prstGeom>
+            <a:solidFill>
+              <a:srgbClr val="990000"/>
+            </a:solidFill>
+            <a:ln>
+              <a:noFill/>
+            </a:ln>
+          </p:spPr>
+          <p:style>
+            <a:lnRef idx="2">
+              <a:schemeClr val="accent1">
+                <a:shade val="15000"/>
+              </a:schemeClr>
+            </a:lnRef>
+            <a:fillRef idx="1">
+              <a:schemeClr val="accent1"/>
+            </a:fillRef>
+            <a:effectRef idx="0">
+              <a:schemeClr val="accent1"/>
+            </a:effectRef>
+            <a:fontRef idx="minor">
+              <a:schemeClr val="lt1"/>
+            </a:fontRef>
+          </p:style>
+          <p:txBody>
+            <a:bodyPr rtlCol="0" anchor="ctr"/>
+            <a:lstStyle/>
+            <a:p>
+              <a:pPr algn="ctr"/>
+              <a:endParaRPr lang="en-US" dirty="0"/>
+            </a:p>
+          </p:txBody>
+        </p:sp>
+        <p:sp>
+          <p:nvSpPr>
+            <p:cNvPr id="19" name="TextBox 18">
+              <a:extLst>
+                <a:ext uri="{FF2B5EF4-FFF2-40B4-BE49-F238E27FC236}">
+                  <a16:creationId xmlns:a16="http://schemas.microsoft.com/office/drawing/2014/main" id="{EB472841-3576-5E49-D96B-D028C0857E48}"/>
+                </a:ext>
+              </a:extLst>
+            </p:cNvPr>
+            <p:cNvSpPr txBox="1"/>
+            <p:nvPr/>
+          </p:nvSpPr>
+          <p:spPr>
+            <a:xfrm>
+              <a:off x="3163090" y="5172230"/>
+              <a:ext cx="3546689" cy="1323439"/>
+            </a:xfrm>
+            <a:prstGeom prst="rect">
+              <a:avLst/>
+            </a:prstGeom>
+            <a:noFill/>
+          </p:spPr>
+          <p:txBody>
+            <a:bodyPr wrap="square">
+              <a:spAutoFit/>
+            </a:bodyPr>
+            <a:lstStyle/>
+            <a:p>
+              <a:r>
+                <a:rPr lang="en-US" sz="2400" b="1" dirty="0">
+                  <a:solidFill>
+                    <a:schemeClr val="bg1"/>
+                  </a:solidFill>
+                  <a:latin typeface="Open Sans" panose="020B0606030504020204" pitchFamily="34" charset="0"/>
+                </a:rPr>
+                <a:t>Bridging biological research and data science for the next generation of scientific discoveries.</a:t>
+              </a:r>
+              <a:endParaRPr lang="en-US" sz="2400" b="1" dirty="0">
+                <a:solidFill>
+                  <a:schemeClr val="bg1"/>
+                </a:solidFill>
+              </a:endParaRPr>
+            </a:p>
+          </p:txBody>
+        </p:sp>
+      </p:grpSp>
+    </p:spTree>
+    <p:extLst>
+      <p:ext uri="{BB962C8B-B14F-4D97-AF65-F5344CB8AC3E}">
+        <p14:creationId xmlns:p14="http://schemas.microsoft.com/office/powerpoint/2010/main" val="2785229109"/>
       </p:ext>
     </p:extLst>
   </p:cSld>

</xml_diff>

<commit_message>
Updates most module slides.
</commit_message>
<xml_diff>
--- a/M4_Seurat_CellType/M4_Seurat_CellType.pptx
+++ b/M4_Seurat_CellType/M4_Seurat_CellType.pptx
@@ -3494,7 +3494,10 @@
           <a:bodyPr/>
           <a:lstStyle/>
           <a:p>
-            <a:endParaRPr lang="en-US" dirty="0"/>
+            <a:r>
+              <a:rPr lang="en-US" dirty="0"/>
+              <a:t>Additional Pipeline Summaries</a:t>
+            </a:r>
           </a:p>
         </p:txBody>
       </p:sp>
@@ -3856,7 +3859,10 @@
           <a:bodyPr/>
           <a:lstStyle/>
           <a:p>
-            <a:endParaRPr lang="en-US"/>
+            <a:r>
+              <a:rPr lang="en-US" dirty="0"/>
+              <a:t>Types of DGE</a:t>
+            </a:r>
           </a:p>
         </p:txBody>
       </p:sp>
@@ -3874,8 +3880,8 @@
         </p:nvSpPr>
         <p:spPr>
           <a:xfrm>
-            <a:off x="689991" y="1244727"/>
-            <a:ext cx="8577072" cy="4524315"/>
+            <a:off x="671703" y="889843"/>
+            <a:ext cx="8577072" cy="4801314"/>
           </a:xfrm>
           <a:prstGeom prst="rect">
             <a:avLst/>
@@ -3897,14 +3903,47 @@
                 <a:effectLst/>
                 <a:latin typeface="Open Sans" panose="020B0606030504020204" pitchFamily="34" charset="0"/>
               </a:rPr>
-              <a:t>Identification of all markers for each cluster:</a:t>
+              <a:t> Identification of all markers for each cluster:</a:t>
             </a:r>
             <a:r>
               <a:rPr lang="en-US" b="0" i="0" dirty="0">
                 <a:effectLst/>
                 <a:latin typeface="Open Sans" panose="020B0606030504020204" pitchFamily="34" charset="0"/>
               </a:rPr>
-              <a:t> this analysis compares each cluster against all others and outputs the genes that are differentially expressed/present.</a:t>
+              <a:t> this analysis compares each cluster against all others and outputs the genes that are differentially </a:t>
+            </a:r>
+            <a:r>
+              <a:rPr lang="en-US" b="0" i="0">
+                <a:effectLst/>
+                <a:latin typeface="Open Sans" panose="020B0606030504020204" pitchFamily="34" charset="0"/>
+              </a:rPr>
+              <a:t>expressed.</a:t>
+            </a:r>
+            <a:r>
+              <a:rPr lang="en-US">
+                <a:latin typeface="Open Sans" panose="020B0606030504020204" pitchFamily="34" charset="0"/>
+              </a:rPr>
+              <a:t> </a:t>
+            </a:r>
+            <a:r>
+              <a:rPr lang="en-US" dirty="0">
+                <a:latin typeface="Open Sans" panose="020B0606030504020204" pitchFamily="34" charset="0"/>
+              </a:rPr>
+              <a:t> </a:t>
+            </a:r>
+            <a:r>
+              <a:rPr lang="en-US" b="0" i="1">
+                <a:effectLst/>
+                <a:latin typeface="Open Sans" panose="020B0606030504020204" pitchFamily="34" charset="0"/>
+              </a:rPr>
+              <a:t>Useful </a:t>
+            </a:r>
+            <a:r>
+              <a:rPr lang="en-US" b="0" i="1" dirty="0">
+                <a:effectLst/>
+                <a:latin typeface="Open Sans" panose="020B0606030504020204" pitchFamily="34" charset="0"/>
+              </a:rPr>
+              <a:t>for identifying unknown clusters and improving confidence in hypothesized cell types.</a:t>
             </a:r>
           </a:p>
           <a:p>
@@ -3912,13 +3951,6 @@
               <a:buFont typeface="+mj-lt"/>
               <a:buAutoNum type="arabicPeriod"/>
             </a:pPr>
-            <a:r>
-              <a:rPr lang="en-US" b="0" i="1" dirty="0">
-                <a:effectLst/>
-                <a:latin typeface="Open Sans" panose="020B0606030504020204" pitchFamily="34" charset="0"/>
-              </a:rPr>
-              <a:t>Useful for identifying unknown clusters and improving confidence in hypothesized cell types.</a:t>
-            </a:r>
             <a:endParaRPr lang="en-US" b="0" i="0" dirty="0">
               <a:effectLst/>
               <a:latin typeface="Open Sans" panose="020B0606030504020204" pitchFamily="34" charset="0"/>
@@ -3934,7 +3966,7 @@
                 <a:effectLst/>
                 <a:latin typeface="Open Sans" panose="020B0606030504020204" pitchFamily="34" charset="0"/>
               </a:rPr>
-              <a:t>Identification of conserved markers for each cluster:</a:t>
+              <a:t> Identification of conserved markers for each cluster:</a:t>
             </a:r>
             <a:r>
               <a:rPr lang="en-US" b="0" i="0" dirty="0">
@@ -3956,6 +3988,12 @@
               </a:rPr>
               <a:t>Useful with more than one condition to identify cell type markers that are conserved across conditions.</a:t>
             </a:r>
+          </a:p>
+          <a:p>
+            <a:pPr marL="742950" lvl="1" indent="-285750" algn="l">
+              <a:buFont typeface="+mj-lt"/>
+              <a:buAutoNum type="arabicPeriod"/>
+            </a:pPr>
             <a:endParaRPr lang="en-US" b="0" i="0" dirty="0">
               <a:effectLst/>
               <a:latin typeface="Open Sans" panose="020B0606030504020204" pitchFamily="34" charset="0"/>
@@ -3971,7 +4009,7 @@
                 <a:effectLst/>
                 <a:latin typeface="Open Sans" panose="020B0606030504020204" pitchFamily="34" charset="0"/>
               </a:rPr>
-              <a:t>Marker identification between specific clusters:</a:t>
+              <a:t> Marker identification between specific clusters:</a:t>
             </a:r>
             <a:r>
               <a:rPr lang="en-US" b="0" i="0" dirty="0">
@@ -4144,7 +4182,7 @@
         </p:blipFill>
         <p:spPr>
           <a:xfrm>
-            <a:off x="124706" y="2036051"/>
+            <a:off x="188714" y="2036051"/>
             <a:ext cx="5486400" cy="596348"/>
           </a:xfrm>
           <a:prstGeom prst="rect">
@@ -4173,7 +4211,7 @@
         </p:blipFill>
         <p:spPr>
           <a:xfrm>
-            <a:off x="81405" y="2772862"/>
+            <a:off x="145413" y="2772862"/>
             <a:ext cx="5467354" cy="2119938"/>
           </a:xfrm>
           <a:prstGeom prst="rect">
@@ -4203,7 +4241,7 @@
         </p:blipFill>
         <p:spPr>
           <a:xfrm>
-            <a:off x="124706" y="5104652"/>
+            <a:off x="188714" y="5104652"/>
             <a:ext cx="5486400" cy="1550504"/>
           </a:xfrm>
           <a:prstGeom prst="rect">
@@ -4263,8 +4301,8 @@
         </p:blipFill>
         <p:spPr>
           <a:xfrm>
-            <a:off x="5819676" y="3085170"/>
-            <a:ext cx="5171412" cy="3729823"/>
+            <a:off x="5813784" y="3308588"/>
+            <a:ext cx="4921272" cy="3549412"/>
           </a:xfrm>
           <a:prstGeom prst="rect">
             <a:avLst/>
@@ -4825,8 +4863,8 @@
         </p:blipFill>
         <p:spPr>
           <a:xfrm>
-            <a:off x="1731950" y="3780560"/>
-            <a:ext cx="4326853" cy="2659072"/>
+            <a:off x="1461343" y="3720120"/>
+            <a:ext cx="4735242" cy="2910048"/>
           </a:xfrm>
           <a:prstGeom prst="rect">
             <a:avLst/>
@@ -4885,8 +4923,8 @@
         </p:blipFill>
         <p:spPr>
           <a:xfrm>
-            <a:off x="6551192" y="1968993"/>
-            <a:ext cx="4435289" cy="2376047"/>
+            <a:off x="6403116" y="1716207"/>
+            <a:ext cx="4754521" cy="2547064"/>
           </a:xfrm>
           <a:prstGeom prst="rect">
             <a:avLst/>
@@ -5015,16 +5053,12 @@
           <a:lstStyle/>
           <a:p>
             <a:r>
-              <a:rPr lang="en-US" dirty="0"/>
-              <a:t>Classification Based: </a:t>
-            </a:r>
-            <a:r>
               <a:rPr lang="en-US" dirty="0" err="1"/>
               <a:t>scAnnoteR</a:t>
             </a:r>
             <a:r>
               <a:rPr lang="en-US" dirty="0"/>
-              <a:t>, default model</a:t>
+              <a:t>: Classification Based (default model)</a:t>
             </a:r>
           </a:p>
         </p:txBody>
@@ -5088,7 +5122,7 @@
         </p:blipFill>
         <p:spPr bwMode="auto">
           <a:xfrm>
-            <a:off x="7370064" y="804672"/>
+            <a:off x="7324344" y="896112"/>
             <a:ext cx="3674669" cy="5377564"/>
           </a:xfrm>
           <a:prstGeom prst="rect">

</xml_diff>

<commit_message>
Updates to test code, slides.
</commit_message>
<xml_diff>
--- a/M4_Seurat_CellType/M4_Seurat_CellType.pptx
+++ b/M4_Seurat_CellType/M4_Seurat_CellType.pptx
@@ -5,19 +5,18 @@
     <p:sldMasterId id="2147483656" r:id="rId1"/>
   </p:sldMasterIdLst>
   <p:notesMasterIdLst>
-    <p:notesMasterId r:id="rId12"/>
+    <p:notesMasterId r:id="rId11"/>
   </p:notesMasterIdLst>
   <p:sldIdLst>
     <p:sldId id="256" r:id="rId2"/>
     <p:sldId id="262" r:id="rId3"/>
     <p:sldId id="261" r:id="rId4"/>
     <p:sldId id="263" r:id="rId5"/>
-    <p:sldId id="264" r:id="rId6"/>
-    <p:sldId id="265" r:id="rId7"/>
-    <p:sldId id="268" r:id="rId8"/>
-    <p:sldId id="266" r:id="rId9"/>
-    <p:sldId id="267" r:id="rId10"/>
-    <p:sldId id="269" r:id="rId11"/>
+    <p:sldId id="265" r:id="rId6"/>
+    <p:sldId id="268" r:id="rId7"/>
+    <p:sldId id="266" r:id="rId8"/>
+    <p:sldId id="267" r:id="rId9"/>
+    <p:sldId id="269" r:id="rId10"/>
   </p:sldIdLst>
   <p:sldSz cx="12192000" cy="6858000"/>
   <p:notesSz cx="6858000" cy="9144000"/>
@@ -2559,7 +2558,7 @@
           <a:p>
             <a:r>
               <a:rPr lang="en-US" dirty="0"/>
-              <a:t>Module 4: Cell Type Identification</a:t>
+              <a:t>Module 4: Initial Cell Type Identification</a:t>
             </a:r>
           </a:p>
         </p:txBody>
@@ -2620,7 +2619,1963 @@
 </p:sld>
 </file>
 
-<file path=ppt/slides/slide10.xml><?xml version="1.0" encoding="utf-8"?>
+<file path=ppt/slides/slide2.xml><?xml version="1.0" encoding="utf-8"?>
+<p:sld xmlns:a="http://schemas.openxmlformats.org/drawingml/2006/main" xmlns:r="http://schemas.openxmlformats.org/officeDocument/2006/relationships" xmlns:p="http://schemas.openxmlformats.org/presentationml/2006/main">
+  <p:cSld>
+    <p:spTree>
+      <p:nvGrpSpPr>
+        <p:cNvPr id="1" name=""/>
+        <p:cNvGrpSpPr/>
+        <p:nvPr/>
+      </p:nvGrpSpPr>
+      <p:grpSpPr>
+        <a:xfrm>
+          <a:off x="0" y="0"/>
+          <a:ext cx="0" cy="0"/>
+          <a:chOff x="0" y="0"/>
+          <a:chExt cx="0" cy="0"/>
+        </a:xfrm>
+      </p:grpSpPr>
+      <p:sp>
+        <p:nvSpPr>
+          <p:cNvPr id="2" name="Title 1">
+            <a:extLst>
+              <a:ext uri="{FF2B5EF4-FFF2-40B4-BE49-F238E27FC236}">
+                <a16:creationId xmlns:a16="http://schemas.microsoft.com/office/drawing/2014/main" id="{ED0C5D33-6C3E-91C9-0986-E01DD15C1EAB}"/>
+              </a:ext>
+            </a:extLst>
+          </p:cNvPr>
+          <p:cNvSpPr>
+            <a:spLocks noGrp="1"/>
+          </p:cNvSpPr>
+          <p:nvPr>
+            <p:ph type="title"/>
+          </p:nvPr>
+        </p:nvSpPr>
+        <p:spPr/>
+        <p:txBody>
+          <a:bodyPr/>
+          <a:lstStyle/>
+          <a:p>
+            <a:r>
+              <a:rPr lang="en-US" dirty="0"/>
+              <a:t>Primary Methods of Cell Type Annotation</a:t>
+            </a:r>
+          </a:p>
+        </p:txBody>
+      </p:sp>
+      <p:pic>
+        <p:nvPicPr>
+          <p:cNvPr id="1026" name="Picture 2" descr="Figure thumbnail gr1">
+            <a:extLst>
+              <a:ext uri="{FF2B5EF4-FFF2-40B4-BE49-F238E27FC236}">
+                <a16:creationId xmlns:a16="http://schemas.microsoft.com/office/drawing/2014/main" id="{7006FC17-FA48-81FC-4678-61ABBB1E338A}"/>
+              </a:ext>
+            </a:extLst>
+          </p:cNvPr>
+          <p:cNvPicPr>
+            <a:picLocks noChangeAspect="1" noChangeArrowheads="1"/>
+          </p:cNvPicPr>
+          <p:nvPr/>
+        </p:nvPicPr>
+        <p:blipFill>
+          <a:blip r:embed="rId2">
+            <a:extLst>
+              <a:ext uri="{28A0092B-C50C-407E-A947-70E740481C1C}">
+                <a14:useLocalDpi xmlns:a14="http://schemas.microsoft.com/office/drawing/2010/main"/>
+              </a:ext>
+            </a:extLst>
+          </a:blip>
+          <a:srcRect/>
+          <a:stretch>
+            <a:fillRect/>
+          </a:stretch>
+        </p:blipFill>
+        <p:spPr bwMode="auto">
+          <a:xfrm>
+            <a:off x="450723" y="1312303"/>
+            <a:ext cx="6715125" cy="4751706"/>
+          </a:xfrm>
+          <a:prstGeom prst="rect">
+            <a:avLst/>
+          </a:prstGeom>
+          <a:noFill/>
+          <a:extLst>
+            <a:ext uri="{909E8E84-426E-40DD-AFC4-6F175D3DCCD1}">
+              <a14:hiddenFill xmlns:a14="http://schemas.microsoft.com/office/drawing/2010/main">
+                <a:solidFill>
+                  <a:srgbClr val="FFFFFF"/>
+                </a:solidFill>
+              </a14:hiddenFill>
+            </a:ext>
+          </a:extLst>
+        </p:spPr>
+      </p:pic>
+      <p:sp>
+        <p:nvSpPr>
+          <p:cNvPr id="4" name="TextBox 3">
+            <a:extLst>
+              <a:ext uri="{FF2B5EF4-FFF2-40B4-BE49-F238E27FC236}">
+                <a16:creationId xmlns:a16="http://schemas.microsoft.com/office/drawing/2014/main" id="{20557737-3B72-0ED7-B7C1-6068D7419E33}"/>
+              </a:ext>
+            </a:extLst>
+          </p:cNvPr>
+          <p:cNvSpPr txBox="1"/>
+          <p:nvPr/>
+        </p:nvSpPr>
+        <p:spPr>
+          <a:xfrm>
+            <a:off x="-137160" y="6627168"/>
+            <a:ext cx="2834640" cy="230832"/>
+          </a:xfrm>
+          <a:prstGeom prst="rect">
+            <a:avLst/>
+          </a:prstGeom>
+          <a:noFill/>
+        </p:spPr>
+        <p:txBody>
+          <a:bodyPr wrap="square">
+            <a:spAutoFit/>
+          </a:bodyPr>
+          <a:lstStyle/>
+          <a:p>
+            <a:pPr algn="r"/>
+            <a:r>
+              <a:rPr lang="en-US" sz="900" i="1" dirty="0"/>
+              <a:t> </a:t>
+            </a:r>
+            <a:r>
+              <a:rPr lang="en-US" sz="900" i="1" dirty="0" err="1"/>
+              <a:t>Pasquini</a:t>
+            </a:r>
+            <a:r>
+              <a:rPr lang="en-US" sz="900" i="1" dirty="0"/>
+              <a:t>. Comp. and Str. Biotech. J. (2021). 19:961-969.</a:t>
+            </a:r>
+          </a:p>
+        </p:txBody>
+      </p:sp>
+      <p:sp>
+        <p:nvSpPr>
+          <p:cNvPr id="6" name="Arrow: Right 5">
+            <a:extLst>
+              <a:ext uri="{FF2B5EF4-FFF2-40B4-BE49-F238E27FC236}">
+                <a16:creationId xmlns:a16="http://schemas.microsoft.com/office/drawing/2014/main" id="{65E0762D-3AB4-8D40-EB91-34ADF12DBA29}"/>
+              </a:ext>
+            </a:extLst>
+          </p:cNvPr>
+          <p:cNvSpPr/>
+          <p:nvPr/>
+        </p:nvSpPr>
+        <p:spPr>
+          <a:xfrm rot="5400000">
+            <a:off x="8993004" y="3229346"/>
+            <a:ext cx="474665" cy="683482"/>
+          </a:xfrm>
+          <a:prstGeom prst="rightArrow">
+            <a:avLst/>
+          </a:prstGeom>
+          <a:solidFill>
+            <a:srgbClr val="CBCBCB"/>
+          </a:solidFill>
+          <a:ln>
+            <a:noFill/>
+          </a:ln>
+        </p:spPr>
+        <p:style>
+          <a:lnRef idx="2">
+            <a:schemeClr val="accent1">
+              <a:shade val="15000"/>
+            </a:schemeClr>
+          </a:lnRef>
+          <a:fillRef idx="1">
+            <a:schemeClr val="accent1"/>
+          </a:fillRef>
+          <a:effectRef idx="0">
+            <a:schemeClr val="accent1"/>
+          </a:effectRef>
+          <a:fontRef idx="minor">
+            <a:schemeClr val="lt1"/>
+          </a:fontRef>
+        </p:style>
+        <p:txBody>
+          <a:bodyPr rtlCol="0" anchor="ctr"/>
+          <a:lstStyle/>
+          <a:p>
+            <a:pPr algn="ctr"/>
+            <a:endParaRPr lang="en-US" dirty="0"/>
+          </a:p>
+        </p:txBody>
+      </p:sp>
+      <p:sp>
+        <p:nvSpPr>
+          <p:cNvPr id="7" name="TextBox 6">
+            <a:extLst>
+              <a:ext uri="{FF2B5EF4-FFF2-40B4-BE49-F238E27FC236}">
+                <a16:creationId xmlns:a16="http://schemas.microsoft.com/office/drawing/2014/main" id="{EA27556E-E936-2125-8D29-523C4FC0DB89}"/>
+              </a:ext>
+            </a:extLst>
+          </p:cNvPr>
+          <p:cNvSpPr txBox="1"/>
+          <p:nvPr/>
+        </p:nvSpPr>
+        <p:spPr>
+          <a:xfrm>
+            <a:off x="8323711" y="810974"/>
+            <a:ext cx="1764201" cy="276999"/>
+          </a:xfrm>
+          <a:prstGeom prst="rect">
+            <a:avLst/>
+          </a:prstGeom>
+          <a:noFill/>
+        </p:spPr>
+        <p:txBody>
+          <a:bodyPr wrap="none" rtlCol="0">
+            <a:spAutoFit/>
+          </a:bodyPr>
+          <a:lstStyle/>
+          <a:p>
+            <a:r>
+              <a:rPr lang="en-US" sz="1200" b="1" dirty="0"/>
+              <a:t>UMAP Clustering Results</a:t>
+            </a:r>
+          </a:p>
+        </p:txBody>
+      </p:sp>
+      <p:pic>
+        <p:nvPicPr>
+          <p:cNvPr id="10" name="Picture 9">
+            <a:extLst>
+              <a:ext uri="{FF2B5EF4-FFF2-40B4-BE49-F238E27FC236}">
+                <a16:creationId xmlns:a16="http://schemas.microsoft.com/office/drawing/2014/main" id="{700615CE-B1DA-AA96-71C0-CA02DDEE92E2}"/>
+              </a:ext>
+            </a:extLst>
+          </p:cNvPr>
+          <p:cNvPicPr>
+            <a:picLocks noChangeAspect="1"/>
+          </p:cNvPicPr>
+          <p:nvPr/>
+        </p:nvPicPr>
+        <p:blipFill>
+          <a:blip r:embed="rId3"/>
+          <a:stretch>
+            <a:fillRect/>
+          </a:stretch>
+        </p:blipFill>
+        <p:spPr>
+          <a:xfrm>
+            <a:off x="7879393" y="3993959"/>
+            <a:ext cx="3483931" cy="2512747"/>
+          </a:xfrm>
+          <a:prstGeom prst="rect">
+            <a:avLst/>
+          </a:prstGeom>
+        </p:spPr>
+      </p:pic>
+      <p:pic>
+        <p:nvPicPr>
+          <p:cNvPr id="11" name="Picture 10">
+            <a:extLst>
+              <a:ext uri="{FF2B5EF4-FFF2-40B4-BE49-F238E27FC236}">
+                <a16:creationId xmlns:a16="http://schemas.microsoft.com/office/drawing/2014/main" id="{B8C186A1-BDA4-9043-FE8D-D1EB7A06C10C}"/>
+              </a:ext>
+            </a:extLst>
+          </p:cNvPr>
+          <p:cNvPicPr>
+            <a:picLocks noChangeAspect="1"/>
+          </p:cNvPicPr>
+          <p:nvPr/>
+        </p:nvPicPr>
+        <p:blipFill>
+          <a:blip r:embed="rId4"/>
+          <a:stretch>
+            <a:fillRect/>
+          </a:stretch>
+        </p:blipFill>
+        <p:spPr>
+          <a:xfrm>
+            <a:off x="7879393" y="1120937"/>
+            <a:ext cx="2701888" cy="2116733"/>
+          </a:xfrm>
+          <a:prstGeom prst="rect">
+            <a:avLst/>
+          </a:prstGeom>
+        </p:spPr>
+      </p:pic>
+    </p:spTree>
+    <p:extLst>
+      <p:ext uri="{BB962C8B-B14F-4D97-AF65-F5344CB8AC3E}">
+        <p14:creationId xmlns:p14="http://schemas.microsoft.com/office/powerpoint/2010/main" val="2790086309"/>
+      </p:ext>
+    </p:extLst>
+  </p:cSld>
+  <p:clrMapOvr>
+    <a:masterClrMapping/>
+  </p:clrMapOvr>
+</p:sld>
+</file>
+
+<file path=ppt/slides/slide3.xml><?xml version="1.0" encoding="utf-8"?>
+<p:sld xmlns:a="http://schemas.openxmlformats.org/drawingml/2006/main" xmlns:r="http://schemas.openxmlformats.org/officeDocument/2006/relationships" xmlns:p="http://schemas.openxmlformats.org/presentationml/2006/main">
+  <p:cSld>
+    <p:spTree>
+      <p:nvGrpSpPr>
+        <p:cNvPr id="1" name=""/>
+        <p:cNvGrpSpPr/>
+        <p:nvPr/>
+      </p:nvGrpSpPr>
+      <p:grpSpPr>
+        <a:xfrm>
+          <a:off x="0" y="0"/>
+          <a:ext cx="0" cy="0"/>
+          <a:chOff x="0" y="0"/>
+          <a:chExt cx="0" cy="0"/>
+        </a:xfrm>
+      </p:grpSpPr>
+      <p:sp>
+        <p:nvSpPr>
+          <p:cNvPr id="2" name="Title 1">
+            <a:extLst>
+              <a:ext uri="{FF2B5EF4-FFF2-40B4-BE49-F238E27FC236}">
+                <a16:creationId xmlns:a16="http://schemas.microsoft.com/office/drawing/2014/main" id="{ADF8E6B8-8A1F-CBA5-E3BB-A814E8D6E4F7}"/>
+              </a:ext>
+            </a:extLst>
+          </p:cNvPr>
+          <p:cNvSpPr>
+            <a:spLocks noGrp="1"/>
+          </p:cNvSpPr>
+          <p:nvPr>
+            <p:ph type="title"/>
+          </p:nvPr>
+        </p:nvSpPr>
+        <p:spPr/>
+        <p:txBody>
+          <a:bodyPr/>
+          <a:lstStyle/>
+          <a:p>
+            <a:r>
+              <a:rPr lang="en-US" dirty="0"/>
+              <a:t>Additional Pipeline Summaries</a:t>
+            </a:r>
+          </a:p>
+        </p:txBody>
+      </p:sp>
+      <p:pic>
+        <p:nvPicPr>
+          <p:cNvPr id="1026" name="Picture 2">
+            <a:extLst>
+              <a:ext uri="{FF2B5EF4-FFF2-40B4-BE49-F238E27FC236}">
+                <a16:creationId xmlns:a16="http://schemas.microsoft.com/office/drawing/2014/main" id="{8EAAE515-9CB3-AEF0-B466-C2CC88D478F0}"/>
+              </a:ext>
+            </a:extLst>
+          </p:cNvPr>
+          <p:cNvPicPr>
+            <a:picLocks noChangeAspect="1" noChangeArrowheads="1"/>
+          </p:cNvPicPr>
+          <p:nvPr/>
+        </p:nvPicPr>
+        <p:blipFill>
+          <a:blip r:embed="rId3" cstate="hqprint">
+            <a:extLst>
+              <a:ext uri="{28A0092B-C50C-407E-A947-70E740481C1C}">
+                <a14:useLocalDpi xmlns:a14="http://schemas.microsoft.com/office/drawing/2010/main"/>
+              </a:ext>
+            </a:extLst>
+          </a:blip>
+          <a:srcRect/>
+          <a:stretch>
+            <a:fillRect/>
+          </a:stretch>
+        </p:blipFill>
+        <p:spPr bwMode="auto">
+          <a:xfrm>
+            <a:off x="1722120" y="662442"/>
+            <a:ext cx="7118833" cy="6080142"/>
+          </a:xfrm>
+          <a:prstGeom prst="rect">
+            <a:avLst/>
+          </a:prstGeom>
+          <a:noFill/>
+          <a:extLst>
+            <a:ext uri="{909E8E84-426E-40DD-AFC4-6F175D3DCCD1}">
+              <a14:hiddenFill xmlns:a14="http://schemas.microsoft.com/office/drawing/2010/main">
+                <a:solidFill>
+                  <a:srgbClr val="FFFFFF"/>
+                </a:solidFill>
+              </a14:hiddenFill>
+            </a:ext>
+          </a:extLst>
+        </p:spPr>
+      </p:pic>
+      <p:sp>
+        <p:nvSpPr>
+          <p:cNvPr id="4" name="TextBox 3">
+            <a:extLst>
+              <a:ext uri="{FF2B5EF4-FFF2-40B4-BE49-F238E27FC236}">
+                <a16:creationId xmlns:a16="http://schemas.microsoft.com/office/drawing/2014/main" id="{AAAD712B-D70D-1377-6AEE-8C93CF7FB5C6}"/>
+              </a:ext>
+            </a:extLst>
+          </p:cNvPr>
+          <p:cNvSpPr txBox="1"/>
+          <p:nvPr/>
+        </p:nvSpPr>
+        <p:spPr>
+          <a:xfrm>
+            <a:off x="0" y="6627168"/>
+            <a:ext cx="2679192" cy="230832"/>
+          </a:xfrm>
+          <a:prstGeom prst="rect">
+            <a:avLst/>
+          </a:prstGeom>
+          <a:noFill/>
+        </p:spPr>
+        <p:txBody>
+          <a:bodyPr wrap="square">
+            <a:spAutoFit/>
+          </a:bodyPr>
+          <a:lstStyle/>
+          <a:p>
+            <a:pPr algn="r"/>
+            <a:r>
+              <a:rPr lang="fr-FR" sz="900" i="1" dirty="0"/>
+              <a:t>Xie. </a:t>
+            </a:r>
+            <a:r>
+              <a:rPr lang="fr-FR" sz="900" i="1" dirty="0" err="1"/>
+              <a:t>Comp</a:t>
+            </a:r>
+            <a:r>
+              <a:rPr lang="fr-FR" sz="900" i="1" dirty="0"/>
+              <a:t>. And </a:t>
+            </a:r>
+            <a:r>
+              <a:rPr lang="fr-FR" sz="900" i="1" dirty="0" err="1"/>
+              <a:t>Str</a:t>
+            </a:r>
+            <a:r>
+              <a:rPr lang="fr-FR" sz="900" i="1" dirty="0"/>
+              <a:t>. Biotech J. (2021). 19: 5874-5887</a:t>
+            </a:r>
+            <a:endParaRPr lang="en-US" sz="900" i="1" dirty="0"/>
+          </a:p>
+        </p:txBody>
+      </p:sp>
+    </p:spTree>
+    <p:extLst>
+      <p:ext uri="{BB962C8B-B14F-4D97-AF65-F5344CB8AC3E}">
+        <p14:creationId xmlns:p14="http://schemas.microsoft.com/office/powerpoint/2010/main" val="237000122"/>
+      </p:ext>
+    </p:extLst>
+  </p:cSld>
+  <p:clrMapOvr>
+    <a:masterClrMapping/>
+  </p:clrMapOvr>
+</p:sld>
+</file>
+
+<file path=ppt/slides/slide4.xml><?xml version="1.0" encoding="utf-8"?>
+<p:sld xmlns:a="http://schemas.openxmlformats.org/drawingml/2006/main" xmlns:r="http://schemas.openxmlformats.org/officeDocument/2006/relationships" xmlns:p="http://schemas.openxmlformats.org/presentationml/2006/main">
+  <p:cSld>
+    <p:spTree>
+      <p:nvGrpSpPr>
+        <p:cNvPr id="1" name=""/>
+        <p:cNvGrpSpPr/>
+        <p:nvPr/>
+      </p:nvGrpSpPr>
+      <p:grpSpPr>
+        <a:xfrm>
+          <a:off x="0" y="0"/>
+          <a:ext cx="0" cy="0"/>
+          <a:chOff x="0" y="0"/>
+          <a:chExt cx="0" cy="0"/>
+        </a:xfrm>
+      </p:grpSpPr>
+      <p:sp>
+        <p:nvSpPr>
+          <p:cNvPr id="2" name="Title 1">
+            <a:extLst>
+              <a:ext uri="{FF2B5EF4-FFF2-40B4-BE49-F238E27FC236}">
+                <a16:creationId xmlns:a16="http://schemas.microsoft.com/office/drawing/2014/main" id="{DCE24B9F-9985-9B06-0A2B-5D18E6FE8725}"/>
+              </a:ext>
+            </a:extLst>
+          </p:cNvPr>
+          <p:cNvSpPr>
+            <a:spLocks noGrp="1"/>
+          </p:cNvSpPr>
+          <p:nvPr>
+            <p:ph type="title"/>
+          </p:nvPr>
+        </p:nvSpPr>
+        <p:spPr/>
+        <p:txBody>
+          <a:bodyPr/>
+          <a:lstStyle/>
+          <a:p>
+            <a:r>
+              <a:rPr lang="en-US" dirty="0"/>
+              <a:t>Multitude of Packages Available for Cell Type Annotation</a:t>
+            </a:r>
+          </a:p>
+        </p:txBody>
+      </p:sp>
+      <p:pic>
+        <p:nvPicPr>
+          <p:cNvPr id="5" name="Picture 4">
+            <a:extLst>
+              <a:ext uri="{FF2B5EF4-FFF2-40B4-BE49-F238E27FC236}">
+                <a16:creationId xmlns:a16="http://schemas.microsoft.com/office/drawing/2014/main" id="{123C462D-E6E1-594F-477F-DA24D44EFC21}"/>
+              </a:ext>
+            </a:extLst>
+          </p:cNvPr>
+          <p:cNvPicPr>
+            <a:picLocks noChangeAspect="1"/>
+          </p:cNvPicPr>
+          <p:nvPr/>
+        </p:nvPicPr>
+        <p:blipFill>
+          <a:blip r:embed="rId2"/>
+          <a:stretch>
+            <a:fillRect/>
+          </a:stretch>
+        </p:blipFill>
+        <p:spPr>
+          <a:xfrm>
+            <a:off x="222313" y="743521"/>
+            <a:ext cx="6791325" cy="5914454"/>
+          </a:xfrm>
+          <a:prstGeom prst="rect">
+            <a:avLst/>
+          </a:prstGeom>
+        </p:spPr>
+      </p:pic>
+      <p:sp>
+        <p:nvSpPr>
+          <p:cNvPr id="7" name="TextBox 6">
+            <a:extLst>
+              <a:ext uri="{FF2B5EF4-FFF2-40B4-BE49-F238E27FC236}">
+                <a16:creationId xmlns:a16="http://schemas.microsoft.com/office/drawing/2014/main" id="{670AC158-02B7-8D40-5600-BE055BC92744}"/>
+              </a:ext>
+            </a:extLst>
+          </p:cNvPr>
+          <p:cNvSpPr txBox="1"/>
+          <p:nvPr/>
+        </p:nvSpPr>
+        <p:spPr>
+          <a:xfrm>
+            <a:off x="9449717" y="6126956"/>
+            <a:ext cx="2742283" cy="230832"/>
+          </a:xfrm>
+          <a:prstGeom prst="rect">
+            <a:avLst/>
+          </a:prstGeom>
+          <a:noFill/>
+        </p:spPr>
+        <p:txBody>
+          <a:bodyPr wrap="square">
+            <a:spAutoFit/>
+          </a:bodyPr>
+          <a:lstStyle/>
+          <a:p>
+            <a:pPr algn="r"/>
+            <a:r>
+              <a:rPr lang="en-US" sz="900" i="1" dirty="0" err="1"/>
+              <a:t>Pasquini</a:t>
+            </a:r>
+            <a:r>
+              <a:rPr lang="en-US" sz="900" i="1" dirty="0"/>
+              <a:t>. Comp. &amp; Str. Biotech. J. (2021). 19:P961-969.</a:t>
+            </a:r>
+          </a:p>
+        </p:txBody>
+      </p:sp>
+      <p:sp>
+        <p:nvSpPr>
+          <p:cNvPr id="8" name="TextBox 7">
+            <a:extLst>
+              <a:ext uri="{FF2B5EF4-FFF2-40B4-BE49-F238E27FC236}">
+                <a16:creationId xmlns:a16="http://schemas.microsoft.com/office/drawing/2014/main" id="{3900B111-2A85-7E57-3931-941BE78E5176}"/>
+              </a:ext>
+            </a:extLst>
+          </p:cNvPr>
+          <p:cNvSpPr txBox="1"/>
+          <p:nvPr/>
+        </p:nvSpPr>
+        <p:spPr>
+          <a:xfrm>
+            <a:off x="7324709" y="1254406"/>
+            <a:ext cx="4644978" cy="4247317"/>
+          </a:xfrm>
+          <a:prstGeom prst="rect">
+            <a:avLst/>
+          </a:prstGeom>
+          <a:noFill/>
+        </p:spPr>
+        <p:txBody>
+          <a:bodyPr wrap="square" rtlCol="0">
+            <a:spAutoFit/>
+          </a:bodyPr>
+          <a:lstStyle/>
+          <a:p>
+            <a:r>
+              <a:rPr lang="en-US" b="1" dirty="0"/>
+              <a:t>Marker Gene</a:t>
+            </a:r>
+            <a:r>
+              <a:rPr lang="en-US" dirty="0"/>
+              <a:t>: highly expressed genes are identified for each cluster, compare against databases of reference cell type hierarchies and marker lists.</a:t>
+            </a:r>
+          </a:p>
+          <a:p>
+            <a:endParaRPr lang="en-US" dirty="0"/>
+          </a:p>
+          <a:p>
+            <a:endParaRPr lang="en-US" dirty="0"/>
+          </a:p>
+          <a:p>
+            <a:r>
+              <a:rPr lang="en-US" b="1" dirty="0"/>
+              <a:t>Correlation/ Reference</a:t>
+            </a:r>
+            <a:r>
+              <a:rPr lang="en-US" dirty="0"/>
+              <a:t>: uses correlation measures to compare gene expression profiles to reference dataset, uses “average cell” (centroid) for each cluster as a reference point.</a:t>
+            </a:r>
+          </a:p>
+          <a:p>
+            <a:endParaRPr lang="en-US" dirty="0"/>
+          </a:p>
+          <a:p>
+            <a:endParaRPr lang="en-US" dirty="0"/>
+          </a:p>
+          <a:p>
+            <a:r>
+              <a:rPr lang="en-US" b="1" dirty="0"/>
+              <a:t>Supervised Classification</a:t>
+            </a:r>
+            <a:r>
+              <a:rPr lang="en-US" dirty="0"/>
+              <a:t>: uses machine learning techniques to train a classifier based on reference labeled </a:t>
+            </a:r>
+            <a:r>
+              <a:rPr lang="en-US" dirty="0" err="1"/>
+              <a:t>scRNA</a:t>
+            </a:r>
+            <a:r>
+              <a:rPr lang="en-US" dirty="0"/>
+              <a:t>-Seq datasets.</a:t>
+            </a:r>
+          </a:p>
+        </p:txBody>
+      </p:sp>
+    </p:spTree>
+    <p:extLst>
+      <p:ext uri="{BB962C8B-B14F-4D97-AF65-F5344CB8AC3E}">
+        <p14:creationId xmlns:p14="http://schemas.microsoft.com/office/powerpoint/2010/main" val="2805963317"/>
+      </p:ext>
+    </p:extLst>
+  </p:cSld>
+  <p:clrMapOvr>
+    <a:masterClrMapping/>
+  </p:clrMapOvr>
+</p:sld>
+</file>
+
+<file path=ppt/slides/slide5.xml><?xml version="1.0" encoding="utf-8"?>
+<p:sld xmlns:a="http://schemas.openxmlformats.org/drawingml/2006/main" xmlns:r="http://schemas.openxmlformats.org/officeDocument/2006/relationships" xmlns:p="http://schemas.openxmlformats.org/presentationml/2006/main">
+  <p:cSld>
+    <p:spTree>
+      <p:nvGrpSpPr>
+        <p:cNvPr id="1" name=""/>
+        <p:cNvGrpSpPr/>
+        <p:nvPr/>
+      </p:nvGrpSpPr>
+      <p:grpSpPr>
+        <a:xfrm>
+          <a:off x="0" y="0"/>
+          <a:ext cx="0" cy="0"/>
+          <a:chOff x="0" y="0"/>
+          <a:chExt cx="0" cy="0"/>
+        </a:xfrm>
+      </p:grpSpPr>
+      <p:pic>
+        <p:nvPicPr>
+          <p:cNvPr id="20" name="Picture 19">
+            <a:extLst>
+              <a:ext uri="{FF2B5EF4-FFF2-40B4-BE49-F238E27FC236}">
+                <a16:creationId xmlns:a16="http://schemas.microsoft.com/office/drawing/2014/main" id="{A61D144F-C489-3B78-12E3-8F7EB7CC958F}"/>
+              </a:ext>
+            </a:extLst>
+          </p:cNvPr>
+          <p:cNvPicPr>
+            <a:picLocks noChangeAspect="1"/>
+          </p:cNvPicPr>
+          <p:nvPr/>
+        </p:nvPicPr>
+        <p:blipFill rotWithShape="1">
+          <a:blip r:embed="rId2"/>
+          <a:srcRect l="54324" t="41934" r="31539" b="43098"/>
+          <a:stretch/>
+        </p:blipFill>
+        <p:spPr>
+          <a:xfrm>
+            <a:off x="3181967" y="841025"/>
+            <a:ext cx="423863" cy="317868"/>
+          </a:xfrm>
+          <a:prstGeom prst="rect">
+            <a:avLst/>
+          </a:prstGeom>
+        </p:spPr>
+      </p:pic>
+      <p:sp>
+        <p:nvSpPr>
+          <p:cNvPr id="2" name="Title 1">
+            <a:extLst>
+              <a:ext uri="{FF2B5EF4-FFF2-40B4-BE49-F238E27FC236}">
+                <a16:creationId xmlns:a16="http://schemas.microsoft.com/office/drawing/2014/main" id="{93A572DC-EE19-56B7-CDBE-3FA665E3CCD8}"/>
+              </a:ext>
+            </a:extLst>
+          </p:cNvPr>
+          <p:cNvSpPr>
+            <a:spLocks noGrp="1"/>
+          </p:cNvSpPr>
+          <p:nvPr>
+            <p:ph type="title"/>
+          </p:nvPr>
+        </p:nvSpPr>
+        <p:spPr/>
+        <p:txBody>
+          <a:bodyPr>
+            <a:normAutofit/>
+          </a:bodyPr>
+          <a:lstStyle/>
+          <a:p>
+            <a:r>
+              <a:rPr lang="en-US" dirty="0"/>
+              <a:t>Marker Based: </a:t>
+            </a:r>
+            <a:r>
+              <a:rPr lang="en-US" dirty="0" err="1"/>
+              <a:t>ScType</a:t>
+            </a:r>
+            <a:endParaRPr lang="en-US" dirty="0"/>
+          </a:p>
+        </p:txBody>
+      </p:sp>
+      <p:pic>
+        <p:nvPicPr>
+          <p:cNvPr id="9" name="Picture 8">
+            <a:extLst>
+              <a:ext uri="{FF2B5EF4-FFF2-40B4-BE49-F238E27FC236}">
+                <a16:creationId xmlns:a16="http://schemas.microsoft.com/office/drawing/2014/main" id="{CE2D70E3-F916-D873-A43B-320C521CC0DF}"/>
+              </a:ext>
+            </a:extLst>
+          </p:cNvPr>
+          <p:cNvPicPr>
+            <a:picLocks noChangeAspect="1"/>
+          </p:cNvPicPr>
+          <p:nvPr/>
+        </p:nvPicPr>
+        <p:blipFill>
+          <a:blip r:embed="rId3"/>
+          <a:stretch>
+            <a:fillRect/>
+          </a:stretch>
+        </p:blipFill>
+        <p:spPr>
+          <a:xfrm>
+            <a:off x="243578" y="2036051"/>
+            <a:ext cx="5486400" cy="596348"/>
+          </a:xfrm>
+          <a:prstGeom prst="rect">
+            <a:avLst/>
+          </a:prstGeom>
+        </p:spPr>
+      </p:pic>
+      <p:pic>
+        <p:nvPicPr>
+          <p:cNvPr id="13" name="Picture 12">
+            <a:extLst>
+              <a:ext uri="{FF2B5EF4-FFF2-40B4-BE49-F238E27FC236}">
+                <a16:creationId xmlns:a16="http://schemas.microsoft.com/office/drawing/2014/main" id="{6D71AB60-609A-44B6-175F-71F78FFB373B}"/>
+              </a:ext>
+            </a:extLst>
+          </p:cNvPr>
+          <p:cNvPicPr>
+            <a:picLocks noChangeAspect="1"/>
+          </p:cNvPicPr>
+          <p:nvPr/>
+        </p:nvPicPr>
+        <p:blipFill rotWithShape="1">
+          <a:blip r:embed="rId4"/>
+          <a:srcRect l="347"/>
+          <a:stretch/>
+        </p:blipFill>
+        <p:spPr>
+          <a:xfrm>
+            <a:off x="264285" y="2772862"/>
+            <a:ext cx="5467354" cy="2119938"/>
+          </a:xfrm>
+          <a:prstGeom prst="rect">
+            <a:avLst/>
+          </a:prstGeom>
+        </p:spPr>
+      </p:pic>
+      <p:pic>
+        <p:nvPicPr>
+          <p:cNvPr id="15" name="Picture 14">
+            <a:extLst>
+              <a:ext uri="{FF2B5EF4-FFF2-40B4-BE49-F238E27FC236}">
+                <a16:creationId xmlns:a16="http://schemas.microsoft.com/office/drawing/2014/main" id="{D97593AD-DBEE-D584-9B7C-49CBA1EEBDA9}"/>
+              </a:ext>
+            </a:extLst>
+          </p:cNvPr>
+          <p:cNvPicPr>
+            <a:picLocks noChangeAspect="1"/>
+          </p:cNvPicPr>
+          <p:nvPr/>
+        </p:nvPicPr>
+        <p:blipFill>
+          <a:blip r:embed="rId5"/>
+          <a:stretch>
+            <a:fillRect/>
+          </a:stretch>
+        </p:blipFill>
+        <p:spPr>
+          <a:xfrm>
+            <a:off x="289298" y="5104652"/>
+            <a:ext cx="5486400" cy="1550504"/>
+          </a:xfrm>
+          <a:prstGeom prst="rect">
+            <a:avLst/>
+          </a:prstGeom>
+        </p:spPr>
+      </p:pic>
+      <p:pic>
+        <p:nvPicPr>
+          <p:cNvPr id="17" name="Picture 16">
+            <a:extLst>
+              <a:ext uri="{FF2B5EF4-FFF2-40B4-BE49-F238E27FC236}">
+                <a16:creationId xmlns:a16="http://schemas.microsoft.com/office/drawing/2014/main" id="{76F30A2C-80E1-37A1-46A0-E5F21509606F}"/>
+              </a:ext>
+            </a:extLst>
+          </p:cNvPr>
+          <p:cNvPicPr>
+            <a:picLocks noChangeAspect="1"/>
+          </p:cNvPicPr>
+          <p:nvPr/>
+        </p:nvPicPr>
+        <p:blipFill>
+          <a:blip r:embed="rId6"/>
+          <a:stretch>
+            <a:fillRect/>
+          </a:stretch>
+        </p:blipFill>
+        <p:spPr>
+          <a:xfrm>
+            <a:off x="5913622" y="710615"/>
+            <a:ext cx="5486400" cy="3884406"/>
+          </a:xfrm>
+          <a:prstGeom prst="rect">
+            <a:avLst/>
+          </a:prstGeom>
+        </p:spPr>
+      </p:pic>
+      <p:pic>
+        <p:nvPicPr>
+          <p:cNvPr id="18" name="Picture 17">
+            <a:extLst>
+              <a:ext uri="{FF2B5EF4-FFF2-40B4-BE49-F238E27FC236}">
+                <a16:creationId xmlns:a16="http://schemas.microsoft.com/office/drawing/2014/main" id="{5F27AFEF-5F2E-96F6-6CE7-61ADBB0F3202}"/>
+              </a:ext>
+            </a:extLst>
+          </p:cNvPr>
+          <p:cNvPicPr>
+            <a:picLocks noChangeAspect="1"/>
+          </p:cNvPicPr>
+          <p:nvPr/>
+        </p:nvPicPr>
+        <p:blipFill>
+          <a:blip r:embed="rId7"/>
+          <a:stretch>
+            <a:fillRect/>
+          </a:stretch>
+        </p:blipFill>
+        <p:spPr>
+          <a:xfrm>
+            <a:off x="5813784" y="3308588"/>
+            <a:ext cx="4921272" cy="3549412"/>
+          </a:xfrm>
+          <a:prstGeom prst="rect">
+            <a:avLst/>
+          </a:prstGeom>
+        </p:spPr>
+      </p:pic>
+      <p:pic>
+        <p:nvPicPr>
+          <p:cNvPr id="19" name="Picture 18">
+            <a:extLst>
+              <a:ext uri="{FF2B5EF4-FFF2-40B4-BE49-F238E27FC236}">
+                <a16:creationId xmlns:a16="http://schemas.microsoft.com/office/drawing/2014/main" id="{46525A3B-47BC-3A53-91F8-984C5BD3F241}"/>
+              </a:ext>
+            </a:extLst>
+          </p:cNvPr>
+          <p:cNvPicPr>
+            <a:picLocks noChangeAspect="1"/>
+          </p:cNvPicPr>
+          <p:nvPr/>
+        </p:nvPicPr>
+        <p:blipFill rotWithShape="1">
+          <a:blip r:embed="rId2"/>
+          <a:srcRect l="6096" t="59506"/>
+          <a:stretch/>
+        </p:blipFill>
+        <p:spPr>
+          <a:xfrm>
+            <a:off x="2998271" y="1177980"/>
+            <a:ext cx="2815513" cy="859993"/>
+          </a:xfrm>
+          <a:prstGeom prst="rect">
+            <a:avLst/>
+          </a:prstGeom>
+        </p:spPr>
+      </p:pic>
+      <p:sp>
+        <p:nvSpPr>
+          <p:cNvPr id="21" name="Freeform: Shape 20">
+            <a:extLst>
+              <a:ext uri="{FF2B5EF4-FFF2-40B4-BE49-F238E27FC236}">
+                <a16:creationId xmlns:a16="http://schemas.microsoft.com/office/drawing/2014/main" id="{08C07257-D98B-7C61-C737-04604A33C1DB}"/>
+              </a:ext>
+            </a:extLst>
+          </p:cNvPr>
+          <p:cNvSpPr/>
+          <p:nvPr/>
+        </p:nvSpPr>
+        <p:spPr>
+          <a:xfrm>
+            <a:off x="2917031" y="1010198"/>
+            <a:ext cx="302419" cy="20883"/>
+          </a:xfrm>
+          <a:custGeom>
+            <a:avLst/>
+            <a:gdLst>
+              <a:gd name="connsiteX0" fmla="*/ 302419 w 302419"/>
+              <a:gd name="connsiteY0" fmla="*/ 1833 h 20883"/>
+              <a:gd name="connsiteX1" fmla="*/ 128588 w 302419"/>
+              <a:gd name="connsiteY1" fmla="*/ 1833 h 20883"/>
+              <a:gd name="connsiteX2" fmla="*/ 0 w 302419"/>
+              <a:gd name="connsiteY2" fmla="*/ 20883 h 20883"/>
+            </a:gdLst>
+            <a:ahLst/>
+            <a:cxnLst>
+              <a:cxn ang="0">
+                <a:pos x="connsiteX0" y="connsiteY0"/>
+              </a:cxn>
+              <a:cxn ang="0">
+                <a:pos x="connsiteX1" y="connsiteY1"/>
+              </a:cxn>
+              <a:cxn ang="0">
+                <a:pos x="connsiteX2" y="connsiteY2"/>
+              </a:cxn>
+            </a:cxnLst>
+            <a:rect l="l" t="t" r="r" b="b"/>
+            <a:pathLst>
+              <a:path w="302419" h="20883">
+                <a:moveTo>
+                  <a:pt x="302419" y="1833"/>
+                </a:moveTo>
+                <a:cubicBezTo>
+                  <a:pt x="240705" y="245"/>
+                  <a:pt x="178991" y="-1342"/>
+                  <a:pt x="128588" y="1833"/>
+                </a:cubicBezTo>
+                <a:cubicBezTo>
+                  <a:pt x="78185" y="5008"/>
+                  <a:pt x="39092" y="12945"/>
+                  <a:pt x="0" y="20883"/>
+                </a:cubicBezTo>
+              </a:path>
+            </a:pathLst>
+          </a:custGeom>
+          <a:noFill/>
+          <a:ln w="6350"/>
+        </p:spPr>
+        <p:style>
+          <a:lnRef idx="2">
+            <a:schemeClr val="accent1">
+              <a:shade val="15000"/>
+            </a:schemeClr>
+          </a:lnRef>
+          <a:fillRef idx="1">
+            <a:schemeClr val="accent1"/>
+          </a:fillRef>
+          <a:effectRef idx="0">
+            <a:schemeClr val="accent1"/>
+          </a:effectRef>
+          <a:fontRef idx="minor">
+            <a:schemeClr val="lt1"/>
+          </a:fontRef>
+        </p:style>
+        <p:txBody>
+          <a:bodyPr rtlCol="0" anchor="ctr"/>
+          <a:lstStyle/>
+          <a:p>
+            <a:pPr algn="ctr"/>
+            <a:endParaRPr lang="en-US"/>
+          </a:p>
+        </p:txBody>
+      </p:sp>
+      <p:grpSp>
+        <p:nvGrpSpPr>
+          <p:cNvPr id="24" name="Group 23">
+            <a:extLst>
+              <a:ext uri="{FF2B5EF4-FFF2-40B4-BE49-F238E27FC236}">
+                <a16:creationId xmlns:a16="http://schemas.microsoft.com/office/drawing/2014/main" id="{7CA62410-A0F1-22F5-9D9D-94BA90161353}"/>
+              </a:ext>
+            </a:extLst>
+          </p:cNvPr>
+          <p:cNvGrpSpPr/>
+          <p:nvPr/>
+        </p:nvGrpSpPr>
+        <p:grpSpPr>
+          <a:xfrm>
+            <a:off x="0" y="629173"/>
+            <a:ext cx="2998271" cy="1035806"/>
+            <a:chOff x="0" y="629173"/>
+            <a:chExt cx="2998271" cy="1035806"/>
+          </a:xfrm>
+        </p:grpSpPr>
+        <p:pic>
+          <p:nvPicPr>
+            <p:cNvPr id="4" name="Picture 3">
+              <a:extLst>
+                <a:ext uri="{FF2B5EF4-FFF2-40B4-BE49-F238E27FC236}">
+                  <a16:creationId xmlns:a16="http://schemas.microsoft.com/office/drawing/2014/main" id="{06B7ACAC-B034-3107-910A-3CB1994A85AA}"/>
+                </a:ext>
+              </a:extLst>
+            </p:cNvPr>
+            <p:cNvPicPr>
+              <a:picLocks noChangeAspect="1"/>
+            </p:cNvPicPr>
+            <p:nvPr/>
+          </p:nvPicPr>
+          <p:blipFill rotWithShape="1">
+            <a:blip r:embed="rId2"/>
+            <a:srcRect b="54492"/>
+            <a:stretch/>
+          </p:blipFill>
+          <p:spPr>
+            <a:xfrm>
+              <a:off x="0" y="629173"/>
+              <a:ext cx="2998271" cy="966487"/>
+            </a:xfrm>
+            <a:prstGeom prst="rect">
+              <a:avLst/>
+            </a:prstGeom>
+          </p:spPr>
+        </p:pic>
+        <p:sp>
+          <p:nvSpPr>
+            <p:cNvPr id="23" name="Rectangle 22">
+              <a:extLst>
+                <a:ext uri="{FF2B5EF4-FFF2-40B4-BE49-F238E27FC236}">
+                  <a16:creationId xmlns:a16="http://schemas.microsoft.com/office/drawing/2014/main" id="{45C0BB0E-9CF3-F15E-96C0-5D4CF60C2305}"/>
+                </a:ext>
+              </a:extLst>
+            </p:cNvPr>
+            <p:cNvSpPr/>
+            <p:nvPr/>
+          </p:nvSpPr>
+          <p:spPr>
+            <a:xfrm>
+              <a:off x="1606431" y="1488281"/>
+              <a:ext cx="477163" cy="176698"/>
+            </a:xfrm>
+            <a:prstGeom prst="rect">
+              <a:avLst/>
+            </a:prstGeom>
+            <a:solidFill>
+              <a:schemeClr val="bg1"/>
+            </a:solidFill>
+            <a:ln>
+              <a:noFill/>
+            </a:ln>
+          </p:spPr>
+          <p:style>
+            <a:lnRef idx="2">
+              <a:schemeClr val="accent1">
+                <a:shade val="15000"/>
+              </a:schemeClr>
+            </a:lnRef>
+            <a:fillRef idx="1">
+              <a:schemeClr val="accent1"/>
+            </a:fillRef>
+            <a:effectRef idx="0">
+              <a:schemeClr val="accent1"/>
+            </a:effectRef>
+            <a:fontRef idx="minor">
+              <a:schemeClr val="lt1"/>
+            </a:fontRef>
+          </p:style>
+          <p:txBody>
+            <a:bodyPr rtlCol="0" anchor="ctr"/>
+            <a:lstStyle/>
+            <a:p>
+              <a:pPr algn="ctr"/>
+              <a:endParaRPr lang="en-US"/>
+            </a:p>
+          </p:txBody>
+        </p:sp>
+      </p:grpSp>
+      <p:sp>
+        <p:nvSpPr>
+          <p:cNvPr id="25" name="Rectangle 24">
+            <a:extLst>
+              <a:ext uri="{FF2B5EF4-FFF2-40B4-BE49-F238E27FC236}">
+                <a16:creationId xmlns:a16="http://schemas.microsoft.com/office/drawing/2014/main" id="{A41B4AAC-F805-C30E-E806-4CC2E129D4F2}"/>
+              </a:ext>
+            </a:extLst>
+          </p:cNvPr>
+          <p:cNvSpPr/>
+          <p:nvPr/>
+        </p:nvSpPr>
+        <p:spPr>
+          <a:xfrm>
+            <a:off x="3521966" y="962182"/>
+            <a:ext cx="121347" cy="84185"/>
+          </a:xfrm>
+          <a:prstGeom prst="rect">
+            <a:avLst/>
+          </a:prstGeom>
+          <a:solidFill>
+            <a:schemeClr val="bg1"/>
+          </a:solidFill>
+          <a:ln>
+            <a:noFill/>
+          </a:ln>
+        </p:spPr>
+        <p:style>
+          <a:lnRef idx="2">
+            <a:schemeClr val="accent1">
+              <a:shade val="15000"/>
+            </a:schemeClr>
+          </a:lnRef>
+          <a:fillRef idx="1">
+            <a:schemeClr val="accent1"/>
+          </a:fillRef>
+          <a:effectRef idx="0">
+            <a:schemeClr val="accent1"/>
+          </a:effectRef>
+          <a:fontRef idx="minor">
+            <a:schemeClr val="lt1"/>
+          </a:fontRef>
+        </p:style>
+        <p:txBody>
+          <a:bodyPr rtlCol="0" anchor="ctr"/>
+          <a:lstStyle/>
+          <a:p>
+            <a:pPr algn="ctr"/>
+            <a:endParaRPr lang="en-US"/>
+          </a:p>
+        </p:txBody>
+      </p:sp>
+      <p:sp>
+        <p:nvSpPr>
+          <p:cNvPr id="22" name="Freeform: Shape 21">
+            <a:extLst>
+              <a:ext uri="{FF2B5EF4-FFF2-40B4-BE49-F238E27FC236}">
+                <a16:creationId xmlns:a16="http://schemas.microsoft.com/office/drawing/2014/main" id="{45CD23C5-1D9C-EAEE-E55D-16FEC3E281A6}"/>
+              </a:ext>
+            </a:extLst>
+          </p:cNvPr>
+          <p:cNvSpPr/>
+          <p:nvPr/>
+        </p:nvSpPr>
+        <p:spPr>
+          <a:xfrm>
+            <a:off x="3519487" y="1057278"/>
+            <a:ext cx="197643" cy="197644"/>
+          </a:xfrm>
+          <a:custGeom>
+            <a:avLst/>
+            <a:gdLst>
+              <a:gd name="connsiteX0" fmla="*/ 0 w 212108"/>
+              <a:gd name="connsiteY0" fmla="*/ 0 h 208785"/>
+              <a:gd name="connsiteX1" fmla="*/ 197643 w 212108"/>
+              <a:gd name="connsiteY1" fmla="*/ 66675 h 208785"/>
+              <a:gd name="connsiteX2" fmla="*/ 197643 w 212108"/>
+              <a:gd name="connsiteY2" fmla="*/ 197644 h 208785"/>
+              <a:gd name="connsiteX3" fmla="*/ 202406 w 212108"/>
+              <a:gd name="connsiteY3" fmla="*/ 192881 h 208785"/>
+              <a:gd name="connsiteX0" fmla="*/ 0 w 212108"/>
+              <a:gd name="connsiteY0" fmla="*/ 372 h 209157"/>
+              <a:gd name="connsiteX1" fmla="*/ 197643 w 212108"/>
+              <a:gd name="connsiteY1" fmla="*/ 67047 h 209157"/>
+              <a:gd name="connsiteX2" fmla="*/ 197643 w 212108"/>
+              <a:gd name="connsiteY2" fmla="*/ 198016 h 209157"/>
+              <a:gd name="connsiteX3" fmla="*/ 202406 w 212108"/>
+              <a:gd name="connsiteY3" fmla="*/ 193253 h 209157"/>
+              <a:gd name="connsiteX0" fmla="*/ 0 w 212108"/>
+              <a:gd name="connsiteY0" fmla="*/ 0 h 208785"/>
+              <a:gd name="connsiteX1" fmla="*/ 197643 w 212108"/>
+              <a:gd name="connsiteY1" fmla="*/ 66675 h 208785"/>
+              <a:gd name="connsiteX2" fmla="*/ 197643 w 212108"/>
+              <a:gd name="connsiteY2" fmla="*/ 197644 h 208785"/>
+              <a:gd name="connsiteX3" fmla="*/ 202406 w 212108"/>
+              <a:gd name="connsiteY3" fmla="*/ 192881 h 208785"/>
+              <a:gd name="connsiteX0" fmla="*/ 0 w 202406"/>
+              <a:gd name="connsiteY0" fmla="*/ 0 h 208785"/>
+              <a:gd name="connsiteX1" fmla="*/ 161924 w 202406"/>
+              <a:gd name="connsiteY1" fmla="*/ 90487 h 208785"/>
+              <a:gd name="connsiteX2" fmla="*/ 197643 w 202406"/>
+              <a:gd name="connsiteY2" fmla="*/ 197644 h 208785"/>
+              <a:gd name="connsiteX3" fmla="*/ 202406 w 202406"/>
+              <a:gd name="connsiteY3" fmla="*/ 192881 h 208785"/>
+              <a:gd name="connsiteX0" fmla="*/ 0 w 207169"/>
+              <a:gd name="connsiteY0" fmla="*/ 0 h 209614"/>
+              <a:gd name="connsiteX1" fmla="*/ 161924 w 207169"/>
+              <a:gd name="connsiteY1" fmla="*/ 90487 h 209614"/>
+              <a:gd name="connsiteX2" fmla="*/ 197643 w 207169"/>
+              <a:gd name="connsiteY2" fmla="*/ 197644 h 209614"/>
+              <a:gd name="connsiteX3" fmla="*/ 207169 w 207169"/>
+              <a:gd name="connsiteY3" fmla="*/ 195262 h 209614"/>
+              <a:gd name="connsiteX0" fmla="*/ 0 w 197643"/>
+              <a:gd name="connsiteY0" fmla="*/ 0 h 197644"/>
+              <a:gd name="connsiteX1" fmla="*/ 161924 w 197643"/>
+              <a:gd name="connsiteY1" fmla="*/ 90487 h 197644"/>
+              <a:gd name="connsiteX2" fmla="*/ 197643 w 197643"/>
+              <a:gd name="connsiteY2" fmla="*/ 197644 h 197644"/>
+            </a:gdLst>
+            <a:ahLst/>
+            <a:cxnLst>
+              <a:cxn ang="0">
+                <a:pos x="connsiteX0" y="connsiteY0"/>
+              </a:cxn>
+              <a:cxn ang="0">
+                <a:pos x="connsiteX1" y="connsiteY1"/>
+              </a:cxn>
+              <a:cxn ang="0">
+                <a:pos x="connsiteX2" y="connsiteY2"/>
+              </a:cxn>
+            </a:cxnLst>
+            <a:rect l="l" t="t" r="r" b="b"/>
+            <a:pathLst>
+              <a:path w="197643" h="197644">
+                <a:moveTo>
+                  <a:pt x="0" y="0"/>
+                </a:moveTo>
+                <a:cubicBezTo>
+                  <a:pt x="113307" y="43061"/>
+                  <a:pt x="128984" y="57546"/>
+                  <a:pt x="161924" y="90487"/>
+                </a:cubicBezTo>
+                <a:cubicBezTo>
+                  <a:pt x="194864" y="123428"/>
+                  <a:pt x="196849" y="176610"/>
+                  <a:pt x="197643" y="197644"/>
+                </a:cubicBezTo>
+              </a:path>
+            </a:pathLst>
+          </a:custGeom>
+          <a:noFill/>
+          <a:ln w="6350"/>
+        </p:spPr>
+        <p:style>
+          <a:lnRef idx="2">
+            <a:schemeClr val="accent1">
+              <a:shade val="15000"/>
+            </a:schemeClr>
+          </a:lnRef>
+          <a:fillRef idx="1">
+            <a:schemeClr val="accent1"/>
+          </a:fillRef>
+          <a:effectRef idx="0">
+            <a:schemeClr val="accent1"/>
+          </a:effectRef>
+          <a:fontRef idx="minor">
+            <a:schemeClr val="lt1"/>
+          </a:fontRef>
+        </p:style>
+        <p:txBody>
+          <a:bodyPr rtlCol="0" anchor="ctr"/>
+          <a:lstStyle/>
+          <a:p>
+            <a:pPr algn="ctr"/>
+            <a:endParaRPr lang="en-US" dirty="0"/>
+          </a:p>
+        </p:txBody>
+      </p:sp>
+    </p:spTree>
+    <p:extLst>
+      <p:ext uri="{BB962C8B-B14F-4D97-AF65-F5344CB8AC3E}">
+        <p14:creationId xmlns:p14="http://schemas.microsoft.com/office/powerpoint/2010/main" val="1957359433"/>
+      </p:ext>
+    </p:extLst>
+  </p:cSld>
+  <p:clrMapOvr>
+    <a:masterClrMapping/>
+  </p:clrMapOvr>
+  <p:timing>
+    <p:tnLst>
+      <p:par>
+        <p:cTn id="1" dur="indefinite" restart="never" nodeType="tmRoot">
+          <p:childTnLst>
+            <p:seq concurrent="1" nextAc="seek">
+              <p:cTn id="2" dur="indefinite" nodeType="mainSeq">
+                <p:childTnLst>
+                  <p:par>
+                    <p:cTn id="3" fill="hold">
+                      <p:stCondLst>
+                        <p:cond delay="indefinite"/>
+                      </p:stCondLst>
+                      <p:childTnLst>
+                        <p:par>
+                          <p:cTn id="4" fill="hold">
+                            <p:stCondLst>
+                              <p:cond delay="0"/>
+                            </p:stCondLst>
+                            <p:childTnLst>
+                              <p:par>
+                                <p:cTn id="5" presetID="1" presetClass="entr" presetSubtype="0" fill="hold" nodeType="clickEffect">
+                                  <p:stCondLst>
+                                    <p:cond delay="0"/>
+                                  </p:stCondLst>
+                                  <p:childTnLst>
+                                    <p:set>
+                                      <p:cBhvr>
+                                        <p:cTn id="6" dur="1" fill="hold">
+                                          <p:stCondLst>
+                                            <p:cond delay="0"/>
+                                          </p:stCondLst>
+                                        </p:cTn>
+                                        <p:tgtEl>
+                                          <p:spTgt spid="18"/>
+                                        </p:tgtEl>
+                                        <p:attrNameLst>
+                                          <p:attrName>style.visibility</p:attrName>
+                                        </p:attrNameLst>
+                                      </p:cBhvr>
+                                      <p:to>
+                                        <p:strVal val="visible"/>
+                                      </p:to>
+                                    </p:set>
+                                  </p:childTnLst>
+                                </p:cTn>
+                              </p:par>
+                            </p:childTnLst>
+                          </p:cTn>
+                        </p:par>
+                      </p:childTnLst>
+                    </p:cTn>
+                  </p:par>
+                </p:childTnLst>
+              </p:cTn>
+              <p:prevCondLst>
+                <p:cond evt="onPrev" delay="0">
+                  <p:tgtEl>
+                    <p:sldTgt/>
+                  </p:tgtEl>
+                </p:cond>
+              </p:prevCondLst>
+              <p:nextCondLst>
+                <p:cond evt="onNext" delay="0">
+                  <p:tgtEl>
+                    <p:sldTgt/>
+                  </p:tgtEl>
+                </p:cond>
+              </p:nextCondLst>
+            </p:seq>
+          </p:childTnLst>
+        </p:cTn>
+      </p:par>
+    </p:tnLst>
+  </p:timing>
+</p:sld>
+</file>
+
+<file path=ppt/slides/slide6.xml><?xml version="1.0" encoding="utf-8"?>
+<p:sld xmlns:a="http://schemas.openxmlformats.org/drawingml/2006/main" xmlns:r="http://schemas.openxmlformats.org/officeDocument/2006/relationships" xmlns:p="http://schemas.openxmlformats.org/presentationml/2006/main">
+  <p:cSld>
+    <p:spTree>
+      <p:nvGrpSpPr>
+        <p:cNvPr id="1" name=""/>
+        <p:cNvGrpSpPr/>
+        <p:nvPr/>
+      </p:nvGrpSpPr>
+      <p:grpSpPr>
+        <a:xfrm>
+          <a:off x="0" y="0"/>
+          <a:ext cx="0" cy="0"/>
+          <a:chOff x="0" y="0"/>
+          <a:chExt cx="0" cy="0"/>
+        </a:xfrm>
+      </p:grpSpPr>
+      <p:sp>
+        <p:nvSpPr>
+          <p:cNvPr id="2" name="Title 1">
+            <a:extLst>
+              <a:ext uri="{FF2B5EF4-FFF2-40B4-BE49-F238E27FC236}">
+                <a16:creationId xmlns:a16="http://schemas.microsoft.com/office/drawing/2014/main" id="{4B9B733D-AA85-3582-42D9-0955A32E00FE}"/>
+              </a:ext>
+            </a:extLst>
+          </p:cNvPr>
+          <p:cNvSpPr>
+            <a:spLocks noGrp="1"/>
+          </p:cNvSpPr>
+          <p:nvPr>
+            <p:ph type="title"/>
+          </p:nvPr>
+        </p:nvSpPr>
+        <p:spPr/>
+        <p:txBody>
+          <a:bodyPr/>
+          <a:lstStyle/>
+          <a:p>
+            <a:r>
+              <a:rPr lang="en-US" dirty="0" err="1"/>
+              <a:t>SingleR</a:t>
+            </a:r>
+            <a:r>
+              <a:rPr lang="en-US" dirty="0"/>
+              <a:t>: Correlation Based Annotation</a:t>
+            </a:r>
+          </a:p>
+        </p:txBody>
+      </p:sp>
+      <p:pic>
+        <p:nvPicPr>
+          <p:cNvPr id="4" name="Picture 3">
+            <a:extLst>
+              <a:ext uri="{FF2B5EF4-FFF2-40B4-BE49-F238E27FC236}">
+                <a16:creationId xmlns:a16="http://schemas.microsoft.com/office/drawing/2014/main" id="{47FA1686-35CF-8F34-8E6F-A30C30D11232}"/>
+              </a:ext>
+            </a:extLst>
+          </p:cNvPr>
+          <p:cNvPicPr>
+            <a:picLocks noChangeAspect="1"/>
+          </p:cNvPicPr>
+          <p:nvPr/>
+        </p:nvPicPr>
+        <p:blipFill>
+          <a:blip r:embed="rId2"/>
+          <a:stretch>
+            <a:fillRect/>
+          </a:stretch>
+        </p:blipFill>
+        <p:spPr>
+          <a:xfrm>
+            <a:off x="1461343" y="3720120"/>
+            <a:ext cx="4735242" cy="2910048"/>
+          </a:xfrm>
+          <a:prstGeom prst="rect">
+            <a:avLst/>
+          </a:prstGeom>
+        </p:spPr>
+      </p:pic>
+      <p:pic>
+        <p:nvPicPr>
+          <p:cNvPr id="6" name="Picture 5">
+            <a:extLst>
+              <a:ext uri="{FF2B5EF4-FFF2-40B4-BE49-F238E27FC236}">
+                <a16:creationId xmlns:a16="http://schemas.microsoft.com/office/drawing/2014/main" id="{022FEB95-D2AF-B7D3-0111-D0BE595C1A71}"/>
+              </a:ext>
+            </a:extLst>
+          </p:cNvPr>
+          <p:cNvPicPr>
+            <a:picLocks noChangeAspect="1"/>
+          </p:cNvPicPr>
+          <p:nvPr/>
+        </p:nvPicPr>
+        <p:blipFill>
+          <a:blip r:embed="rId3"/>
+          <a:stretch>
+            <a:fillRect/>
+          </a:stretch>
+        </p:blipFill>
+        <p:spPr>
+          <a:xfrm>
+            <a:off x="515354" y="980733"/>
+            <a:ext cx="6106377" cy="2448267"/>
+          </a:xfrm>
+          <a:prstGeom prst="rect">
+            <a:avLst/>
+          </a:prstGeom>
+        </p:spPr>
+      </p:pic>
+      <p:pic>
+        <p:nvPicPr>
+          <p:cNvPr id="10" name="Picture 9">
+            <a:extLst>
+              <a:ext uri="{FF2B5EF4-FFF2-40B4-BE49-F238E27FC236}">
+                <a16:creationId xmlns:a16="http://schemas.microsoft.com/office/drawing/2014/main" id="{A7E4442F-4EE8-F881-9B1B-E8B29755BDBD}"/>
+              </a:ext>
+            </a:extLst>
+          </p:cNvPr>
+          <p:cNvPicPr>
+            <a:picLocks noChangeAspect="1"/>
+          </p:cNvPicPr>
+          <p:nvPr/>
+        </p:nvPicPr>
+        <p:blipFill>
+          <a:blip r:embed="rId4"/>
+          <a:stretch>
+            <a:fillRect/>
+          </a:stretch>
+        </p:blipFill>
+        <p:spPr>
+          <a:xfrm>
+            <a:off x="6403116" y="1716207"/>
+            <a:ext cx="4754521" cy="2547064"/>
+          </a:xfrm>
+          <a:prstGeom prst="rect">
+            <a:avLst/>
+          </a:prstGeom>
+        </p:spPr>
+      </p:pic>
+      <p:sp>
+        <p:nvSpPr>
+          <p:cNvPr id="11" name="TextBox 10">
+            <a:extLst>
+              <a:ext uri="{FF2B5EF4-FFF2-40B4-BE49-F238E27FC236}">
+                <a16:creationId xmlns:a16="http://schemas.microsoft.com/office/drawing/2014/main" id="{90168B75-BF86-2D36-58ED-0D40355E94B8}"/>
+              </a:ext>
+            </a:extLst>
+          </p:cNvPr>
+          <p:cNvSpPr txBox="1"/>
+          <p:nvPr/>
+        </p:nvSpPr>
+        <p:spPr>
+          <a:xfrm>
+            <a:off x="9592089" y="1624790"/>
+            <a:ext cx="1236236" cy="369332"/>
+          </a:xfrm>
+          <a:prstGeom prst="rect">
+            <a:avLst/>
+          </a:prstGeom>
+          <a:noFill/>
+        </p:spPr>
+        <p:txBody>
+          <a:bodyPr wrap="none" rtlCol="0">
+            <a:spAutoFit/>
+          </a:bodyPr>
+          <a:lstStyle/>
+          <a:p>
+            <a:r>
+              <a:rPr lang="en-US" b="1" dirty="0"/>
+              <a:t>Fine Labels</a:t>
+            </a:r>
+          </a:p>
+        </p:txBody>
+      </p:sp>
+      <p:sp>
+        <p:nvSpPr>
+          <p:cNvPr id="12" name="TextBox 11">
+            <a:extLst>
+              <a:ext uri="{FF2B5EF4-FFF2-40B4-BE49-F238E27FC236}">
+                <a16:creationId xmlns:a16="http://schemas.microsoft.com/office/drawing/2014/main" id="{765A24B6-1711-E454-9E3B-C71A3860076F}"/>
+              </a:ext>
+            </a:extLst>
+          </p:cNvPr>
+          <p:cNvSpPr txBox="1"/>
+          <p:nvPr/>
+        </p:nvSpPr>
+        <p:spPr>
+          <a:xfrm>
+            <a:off x="5210760" y="4356112"/>
+            <a:ext cx="1340432" cy="338554"/>
+          </a:xfrm>
+          <a:prstGeom prst="rect">
+            <a:avLst/>
+          </a:prstGeom>
+          <a:noFill/>
+        </p:spPr>
+        <p:txBody>
+          <a:bodyPr wrap="none" rtlCol="0">
+            <a:spAutoFit/>
+          </a:bodyPr>
+          <a:lstStyle/>
+          <a:p>
+            <a:r>
+              <a:rPr lang="en-US" sz="1600" b="1" dirty="0"/>
+              <a:t>Simple Labels</a:t>
+            </a:r>
+          </a:p>
+        </p:txBody>
+      </p:sp>
+    </p:spTree>
+    <p:extLst>
+      <p:ext uri="{BB962C8B-B14F-4D97-AF65-F5344CB8AC3E}">
+        <p14:creationId xmlns:p14="http://schemas.microsoft.com/office/powerpoint/2010/main" val="1977982267"/>
+      </p:ext>
+    </p:extLst>
+  </p:cSld>
+  <p:clrMapOvr>
+    <a:masterClrMapping/>
+  </p:clrMapOvr>
+</p:sld>
+</file>
+
+<file path=ppt/slides/slide7.xml><?xml version="1.0" encoding="utf-8"?>
+<p:sld xmlns:a="http://schemas.openxmlformats.org/drawingml/2006/main" xmlns:r="http://schemas.openxmlformats.org/officeDocument/2006/relationships" xmlns:p="http://schemas.openxmlformats.org/presentationml/2006/main">
+  <p:cSld>
+    <p:spTree>
+      <p:nvGrpSpPr>
+        <p:cNvPr id="1" name=""/>
+        <p:cNvGrpSpPr/>
+        <p:nvPr/>
+      </p:nvGrpSpPr>
+      <p:grpSpPr>
+        <a:xfrm>
+          <a:off x="0" y="0"/>
+          <a:ext cx="0" cy="0"/>
+          <a:chOff x="0" y="0"/>
+          <a:chExt cx="0" cy="0"/>
+        </a:xfrm>
+      </p:grpSpPr>
+      <p:sp>
+        <p:nvSpPr>
+          <p:cNvPr id="2" name="Title 1">
+            <a:extLst>
+              <a:ext uri="{FF2B5EF4-FFF2-40B4-BE49-F238E27FC236}">
+                <a16:creationId xmlns:a16="http://schemas.microsoft.com/office/drawing/2014/main" id="{16A6C89E-64F5-F3C7-8FB8-4B03FDC5B489}"/>
+              </a:ext>
+            </a:extLst>
+          </p:cNvPr>
+          <p:cNvSpPr>
+            <a:spLocks noGrp="1"/>
+          </p:cNvSpPr>
+          <p:nvPr>
+            <p:ph type="title"/>
+          </p:nvPr>
+        </p:nvSpPr>
+        <p:spPr/>
+        <p:txBody>
+          <a:bodyPr/>
+          <a:lstStyle/>
+          <a:p>
+            <a:r>
+              <a:rPr lang="en-US" dirty="0" err="1"/>
+              <a:t>scAnnoteR</a:t>
+            </a:r>
+            <a:r>
+              <a:rPr lang="en-US" dirty="0"/>
+              <a:t>: Classification Based (default model)</a:t>
+            </a:r>
+          </a:p>
+        </p:txBody>
+      </p:sp>
+      <p:pic>
+        <p:nvPicPr>
+          <p:cNvPr id="4" name="Picture 3">
+            <a:extLst>
+              <a:ext uri="{FF2B5EF4-FFF2-40B4-BE49-F238E27FC236}">
+                <a16:creationId xmlns:a16="http://schemas.microsoft.com/office/drawing/2014/main" id="{C7A34AC9-61F6-1BE2-44A3-C37236665A70}"/>
+              </a:ext>
+            </a:extLst>
+          </p:cNvPr>
+          <p:cNvPicPr>
+            <a:picLocks noChangeAspect="1"/>
+          </p:cNvPicPr>
+          <p:nvPr/>
+        </p:nvPicPr>
+        <p:blipFill>
+          <a:blip r:embed="rId2"/>
+          <a:stretch>
+            <a:fillRect/>
+          </a:stretch>
+        </p:blipFill>
+        <p:spPr>
+          <a:xfrm>
+            <a:off x="364862" y="1001156"/>
+            <a:ext cx="4677428" cy="1600423"/>
+          </a:xfrm>
+          <a:prstGeom prst="rect">
+            <a:avLst/>
+          </a:prstGeom>
+        </p:spPr>
+      </p:pic>
+      <p:pic>
+        <p:nvPicPr>
+          <p:cNvPr id="1026" name="Picture 2" descr="Workflow of scAnnotate on a dataset with at most one rare cell population (at most one cell population less than 100 cells). The vertical grey dashed line separates training data (left) and test data (right) information">
+            <a:extLst>
+              <a:ext uri="{FF2B5EF4-FFF2-40B4-BE49-F238E27FC236}">
+                <a16:creationId xmlns:a16="http://schemas.microsoft.com/office/drawing/2014/main" id="{C275E2A4-1C90-16FF-A85A-599C42832AE9}"/>
+              </a:ext>
+            </a:extLst>
+          </p:cNvPr>
+          <p:cNvPicPr>
+            <a:picLocks noChangeAspect="1" noChangeArrowheads="1"/>
+          </p:cNvPicPr>
+          <p:nvPr/>
+        </p:nvPicPr>
+        <p:blipFill>
+          <a:blip r:embed="rId3">
+            <a:extLst>
+              <a:ext uri="{28A0092B-C50C-407E-A947-70E740481C1C}">
+                <a14:useLocalDpi xmlns:a14="http://schemas.microsoft.com/office/drawing/2010/main" val="0"/>
+              </a:ext>
+            </a:extLst>
+          </a:blip>
+          <a:srcRect/>
+          <a:stretch>
+            <a:fillRect/>
+          </a:stretch>
+        </p:blipFill>
+        <p:spPr bwMode="auto">
+          <a:xfrm>
+            <a:off x="7324344" y="896112"/>
+            <a:ext cx="3674669" cy="5377564"/>
+          </a:xfrm>
+          <a:prstGeom prst="rect">
+            <a:avLst/>
+          </a:prstGeom>
+          <a:noFill/>
+          <a:extLst>
+            <a:ext uri="{909E8E84-426E-40DD-AFC4-6F175D3DCCD1}">
+              <a14:hiddenFill xmlns:a14="http://schemas.microsoft.com/office/drawing/2010/main">
+                <a:solidFill>
+                  <a:srgbClr val="FFFFFF"/>
+                </a:solidFill>
+              </a14:hiddenFill>
+            </a:ext>
+          </a:extLst>
+        </p:spPr>
+      </p:pic>
+      <p:pic>
+        <p:nvPicPr>
+          <p:cNvPr id="6" name="Picture 5">
+            <a:extLst>
+              <a:ext uri="{FF2B5EF4-FFF2-40B4-BE49-F238E27FC236}">
+                <a16:creationId xmlns:a16="http://schemas.microsoft.com/office/drawing/2014/main" id="{AAB948B5-7973-4C00-2CFC-8D9D38FB981E}"/>
+              </a:ext>
+            </a:extLst>
+          </p:cNvPr>
+          <p:cNvPicPr>
+            <a:picLocks noChangeAspect="1"/>
+          </p:cNvPicPr>
+          <p:nvPr/>
+        </p:nvPicPr>
+        <p:blipFill>
+          <a:blip r:embed="rId4"/>
+          <a:stretch>
+            <a:fillRect/>
+          </a:stretch>
+        </p:blipFill>
+        <p:spPr>
+          <a:xfrm>
+            <a:off x="1764107" y="2856592"/>
+            <a:ext cx="4419210" cy="3417084"/>
+          </a:xfrm>
+          <a:prstGeom prst="rect">
+            <a:avLst/>
+          </a:prstGeom>
+        </p:spPr>
+      </p:pic>
+    </p:spTree>
+    <p:extLst>
+      <p:ext uri="{BB962C8B-B14F-4D97-AF65-F5344CB8AC3E}">
+        <p14:creationId xmlns:p14="http://schemas.microsoft.com/office/powerpoint/2010/main" val="2041570772"/>
+      </p:ext>
+    </p:extLst>
+  </p:cSld>
+  <p:clrMapOvr>
+    <a:masterClrMapping/>
+  </p:clrMapOvr>
+</p:sld>
+</file>
+
+<file path=ppt/slides/slide8.xml><?xml version="1.0" encoding="utf-8"?>
+<p:sld xmlns:a="http://schemas.openxmlformats.org/drawingml/2006/main" xmlns:r="http://schemas.openxmlformats.org/officeDocument/2006/relationships" xmlns:p="http://schemas.openxmlformats.org/presentationml/2006/main">
+  <p:cSld>
+    <p:spTree>
+      <p:nvGrpSpPr>
+        <p:cNvPr id="1" name=""/>
+        <p:cNvGrpSpPr/>
+        <p:nvPr/>
+      </p:nvGrpSpPr>
+      <p:grpSpPr>
+        <a:xfrm>
+          <a:off x="0" y="0"/>
+          <a:ext cx="0" cy="0"/>
+          <a:chOff x="0" y="0"/>
+          <a:chExt cx="0" cy="0"/>
+        </a:xfrm>
+      </p:grpSpPr>
+      <p:sp>
+        <p:nvSpPr>
+          <p:cNvPr id="2" name="Title 1">
+            <a:extLst>
+              <a:ext uri="{FF2B5EF4-FFF2-40B4-BE49-F238E27FC236}">
+                <a16:creationId xmlns:a16="http://schemas.microsoft.com/office/drawing/2014/main" id="{B64BC24A-6320-ACAE-D16F-90D79769B63C}"/>
+              </a:ext>
+            </a:extLst>
+          </p:cNvPr>
+          <p:cNvSpPr>
+            <a:spLocks noGrp="1"/>
+          </p:cNvSpPr>
+          <p:nvPr>
+            <p:ph type="title"/>
+          </p:nvPr>
+        </p:nvSpPr>
+        <p:spPr/>
+        <p:txBody>
+          <a:bodyPr/>
+          <a:lstStyle/>
+          <a:p>
+            <a:r>
+              <a:rPr lang="en-US" dirty="0"/>
+              <a:t>Classification Based: </a:t>
+            </a:r>
+            <a:r>
+              <a:rPr lang="en-US" dirty="0" err="1"/>
+              <a:t>scPred</a:t>
+            </a:r>
+            <a:r>
+              <a:rPr lang="en-US" dirty="0"/>
+              <a:t> with Trained Reference</a:t>
+            </a:r>
+          </a:p>
+        </p:txBody>
+      </p:sp>
+      <p:pic>
+        <p:nvPicPr>
+          <p:cNvPr id="5" name="Picture 4">
+            <a:extLst>
+              <a:ext uri="{FF2B5EF4-FFF2-40B4-BE49-F238E27FC236}">
+                <a16:creationId xmlns:a16="http://schemas.microsoft.com/office/drawing/2014/main" id="{B512517D-6901-E5F0-7504-54D2112C11FC}"/>
+              </a:ext>
+            </a:extLst>
+          </p:cNvPr>
+          <p:cNvPicPr>
+            <a:picLocks noChangeAspect="1"/>
+          </p:cNvPicPr>
+          <p:nvPr/>
+        </p:nvPicPr>
+        <p:blipFill>
+          <a:blip r:embed="rId2"/>
+          <a:stretch>
+            <a:fillRect/>
+          </a:stretch>
+        </p:blipFill>
+        <p:spPr>
+          <a:xfrm>
+            <a:off x="6580489" y="878633"/>
+            <a:ext cx="4443844" cy="2623054"/>
+          </a:xfrm>
+          <a:prstGeom prst="rect">
+            <a:avLst/>
+          </a:prstGeom>
+        </p:spPr>
+      </p:pic>
+      <p:pic>
+        <p:nvPicPr>
+          <p:cNvPr id="7" name="Picture 6">
+            <a:extLst>
+              <a:ext uri="{FF2B5EF4-FFF2-40B4-BE49-F238E27FC236}">
+                <a16:creationId xmlns:a16="http://schemas.microsoft.com/office/drawing/2014/main" id="{D3980AE6-4993-8831-6444-633133C66BEB}"/>
+              </a:ext>
+            </a:extLst>
+          </p:cNvPr>
+          <p:cNvPicPr>
+            <a:picLocks noChangeAspect="1"/>
+          </p:cNvPicPr>
+          <p:nvPr/>
+        </p:nvPicPr>
+        <p:blipFill>
+          <a:blip r:embed="rId3"/>
+          <a:stretch>
+            <a:fillRect/>
+          </a:stretch>
+        </p:blipFill>
+        <p:spPr>
+          <a:xfrm>
+            <a:off x="6864097" y="4144340"/>
+            <a:ext cx="4620594" cy="2639233"/>
+          </a:xfrm>
+          <a:prstGeom prst="rect">
+            <a:avLst/>
+          </a:prstGeom>
+        </p:spPr>
+      </p:pic>
+      <p:pic>
+        <p:nvPicPr>
+          <p:cNvPr id="9" name="Picture 8">
+            <a:extLst>
+              <a:ext uri="{FF2B5EF4-FFF2-40B4-BE49-F238E27FC236}">
+                <a16:creationId xmlns:a16="http://schemas.microsoft.com/office/drawing/2014/main" id="{1F7FF9BF-0170-E135-3AA4-D8D881640F43}"/>
+              </a:ext>
+            </a:extLst>
+          </p:cNvPr>
+          <p:cNvPicPr>
+            <a:picLocks noChangeAspect="1"/>
+          </p:cNvPicPr>
+          <p:nvPr/>
+        </p:nvPicPr>
+        <p:blipFill>
+          <a:blip r:embed="rId4"/>
+          <a:stretch>
+            <a:fillRect/>
+          </a:stretch>
+        </p:blipFill>
+        <p:spPr>
+          <a:xfrm>
+            <a:off x="207265" y="786840"/>
+            <a:ext cx="6144482" cy="4201111"/>
+          </a:xfrm>
+          <a:prstGeom prst="rect">
+            <a:avLst/>
+          </a:prstGeom>
+        </p:spPr>
+      </p:pic>
+      <p:sp>
+        <p:nvSpPr>
+          <p:cNvPr id="10" name="TextBox 9">
+            <a:extLst>
+              <a:ext uri="{FF2B5EF4-FFF2-40B4-BE49-F238E27FC236}">
+                <a16:creationId xmlns:a16="http://schemas.microsoft.com/office/drawing/2014/main" id="{73D7C881-92F5-D120-8A72-5F141F326C4A}"/>
+              </a:ext>
+            </a:extLst>
+          </p:cNvPr>
+          <p:cNvSpPr txBox="1"/>
+          <p:nvPr/>
+        </p:nvSpPr>
+        <p:spPr>
+          <a:xfrm>
+            <a:off x="371857" y="5641848"/>
+            <a:ext cx="5120640" cy="646331"/>
+          </a:xfrm>
+          <a:prstGeom prst="rect">
+            <a:avLst/>
+          </a:prstGeom>
+          <a:noFill/>
+        </p:spPr>
+        <p:txBody>
+          <a:bodyPr wrap="square" rtlCol="0">
+            <a:spAutoFit/>
+          </a:bodyPr>
+          <a:lstStyle/>
+          <a:p>
+            <a:r>
+              <a:rPr lang="en-US" i="1" dirty="0"/>
+              <a:t>Note: updates are required for this package to function with Seurat V5 (source() call on this slide).</a:t>
+            </a:r>
+          </a:p>
+        </p:txBody>
+      </p:sp>
+    </p:spTree>
+    <p:extLst>
+      <p:ext uri="{BB962C8B-B14F-4D97-AF65-F5344CB8AC3E}">
+        <p14:creationId xmlns:p14="http://schemas.microsoft.com/office/powerpoint/2010/main" val="1471061591"/>
+      </p:ext>
+    </p:extLst>
+  </p:cSld>
+  <p:clrMapOvr>
+    <a:masterClrMapping/>
+  </p:clrMapOvr>
+</p:sld>
+</file>
+
+<file path=ppt/slides/slide9.xml><?xml version="1.0" encoding="utf-8"?>
 <p:sld xmlns:a="http://schemas.openxmlformats.org/drawingml/2006/main" xmlns:r="http://schemas.openxmlformats.org/officeDocument/2006/relationships" xmlns:p="http://schemas.openxmlformats.org/presentationml/2006/main">
   <p:cSld>
     <p:spTree>
@@ -3151,2220 +5106,6 @@
     <p:extLst>
       <p:ext uri="{BB962C8B-B14F-4D97-AF65-F5344CB8AC3E}">
         <p14:creationId xmlns:p14="http://schemas.microsoft.com/office/powerpoint/2010/main" val="2785229109"/>
-      </p:ext>
-    </p:extLst>
-  </p:cSld>
-  <p:clrMapOvr>
-    <a:masterClrMapping/>
-  </p:clrMapOvr>
-</p:sld>
-</file>
-
-<file path=ppt/slides/slide2.xml><?xml version="1.0" encoding="utf-8"?>
-<p:sld xmlns:a="http://schemas.openxmlformats.org/drawingml/2006/main" xmlns:r="http://schemas.openxmlformats.org/officeDocument/2006/relationships" xmlns:p="http://schemas.openxmlformats.org/presentationml/2006/main">
-  <p:cSld>
-    <p:spTree>
-      <p:nvGrpSpPr>
-        <p:cNvPr id="1" name=""/>
-        <p:cNvGrpSpPr/>
-        <p:nvPr/>
-      </p:nvGrpSpPr>
-      <p:grpSpPr>
-        <a:xfrm>
-          <a:off x="0" y="0"/>
-          <a:ext cx="0" cy="0"/>
-          <a:chOff x="0" y="0"/>
-          <a:chExt cx="0" cy="0"/>
-        </a:xfrm>
-      </p:grpSpPr>
-      <p:sp>
-        <p:nvSpPr>
-          <p:cNvPr id="2" name="Title 1">
-            <a:extLst>
-              <a:ext uri="{FF2B5EF4-FFF2-40B4-BE49-F238E27FC236}">
-                <a16:creationId xmlns:a16="http://schemas.microsoft.com/office/drawing/2014/main" id="{ED0C5D33-6C3E-91C9-0986-E01DD15C1EAB}"/>
-              </a:ext>
-            </a:extLst>
-          </p:cNvPr>
-          <p:cNvSpPr>
-            <a:spLocks noGrp="1"/>
-          </p:cNvSpPr>
-          <p:nvPr>
-            <p:ph type="title"/>
-          </p:nvPr>
-        </p:nvSpPr>
-        <p:spPr/>
-        <p:txBody>
-          <a:bodyPr/>
-          <a:lstStyle/>
-          <a:p>
-            <a:r>
-              <a:rPr lang="en-US" dirty="0"/>
-              <a:t>Primary Methods of Cell Type Annotation</a:t>
-            </a:r>
-          </a:p>
-        </p:txBody>
-      </p:sp>
-      <p:pic>
-        <p:nvPicPr>
-          <p:cNvPr id="1026" name="Picture 2" descr="Figure thumbnail gr1">
-            <a:extLst>
-              <a:ext uri="{FF2B5EF4-FFF2-40B4-BE49-F238E27FC236}">
-                <a16:creationId xmlns:a16="http://schemas.microsoft.com/office/drawing/2014/main" id="{7006FC17-FA48-81FC-4678-61ABBB1E338A}"/>
-              </a:ext>
-            </a:extLst>
-          </p:cNvPr>
-          <p:cNvPicPr>
-            <a:picLocks noChangeAspect="1" noChangeArrowheads="1"/>
-          </p:cNvPicPr>
-          <p:nvPr/>
-        </p:nvPicPr>
-        <p:blipFill>
-          <a:blip r:embed="rId2">
-            <a:extLst>
-              <a:ext uri="{28A0092B-C50C-407E-A947-70E740481C1C}">
-                <a14:useLocalDpi xmlns:a14="http://schemas.microsoft.com/office/drawing/2010/main"/>
-              </a:ext>
-            </a:extLst>
-          </a:blip>
-          <a:srcRect/>
-          <a:stretch>
-            <a:fillRect/>
-          </a:stretch>
-        </p:blipFill>
-        <p:spPr bwMode="auto">
-          <a:xfrm>
-            <a:off x="450723" y="1312303"/>
-            <a:ext cx="6715125" cy="4751706"/>
-          </a:xfrm>
-          <a:prstGeom prst="rect">
-            <a:avLst/>
-          </a:prstGeom>
-          <a:noFill/>
-          <a:extLst>
-            <a:ext uri="{909E8E84-426E-40DD-AFC4-6F175D3DCCD1}">
-              <a14:hiddenFill xmlns:a14="http://schemas.microsoft.com/office/drawing/2010/main">
-                <a:solidFill>
-                  <a:srgbClr val="FFFFFF"/>
-                </a:solidFill>
-              </a14:hiddenFill>
-            </a:ext>
-          </a:extLst>
-        </p:spPr>
-      </p:pic>
-      <p:sp>
-        <p:nvSpPr>
-          <p:cNvPr id="4" name="TextBox 3">
-            <a:extLst>
-              <a:ext uri="{FF2B5EF4-FFF2-40B4-BE49-F238E27FC236}">
-                <a16:creationId xmlns:a16="http://schemas.microsoft.com/office/drawing/2014/main" id="{20557737-3B72-0ED7-B7C1-6068D7419E33}"/>
-              </a:ext>
-            </a:extLst>
-          </p:cNvPr>
-          <p:cNvSpPr txBox="1"/>
-          <p:nvPr/>
-        </p:nvSpPr>
-        <p:spPr>
-          <a:xfrm>
-            <a:off x="-137160" y="6627168"/>
-            <a:ext cx="2834640" cy="230832"/>
-          </a:xfrm>
-          <a:prstGeom prst="rect">
-            <a:avLst/>
-          </a:prstGeom>
-          <a:noFill/>
-        </p:spPr>
-        <p:txBody>
-          <a:bodyPr wrap="square">
-            <a:spAutoFit/>
-          </a:bodyPr>
-          <a:lstStyle/>
-          <a:p>
-            <a:pPr algn="r"/>
-            <a:r>
-              <a:rPr lang="en-US" sz="900" i="1" dirty="0"/>
-              <a:t> </a:t>
-            </a:r>
-            <a:r>
-              <a:rPr lang="en-US" sz="900" i="1" dirty="0" err="1"/>
-              <a:t>Pasquini</a:t>
-            </a:r>
-            <a:r>
-              <a:rPr lang="en-US" sz="900" i="1" dirty="0"/>
-              <a:t>. Comp. and Str. Biotech. J. (2021). 19:961-969.</a:t>
-            </a:r>
-          </a:p>
-        </p:txBody>
-      </p:sp>
-      <p:sp>
-        <p:nvSpPr>
-          <p:cNvPr id="6" name="Arrow: Right 5">
-            <a:extLst>
-              <a:ext uri="{FF2B5EF4-FFF2-40B4-BE49-F238E27FC236}">
-                <a16:creationId xmlns:a16="http://schemas.microsoft.com/office/drawing/2014/main" id="{65E0762D-3AB4-8D40-EB91-34ADF12DBA29}"/>
-              </a:ext>
-            </a:extLst>
-          </p:cNvPr>
-          <p:cNvSpPr/>
-          <p:nvPr/>
-        </p:nvSpPr>
-        <p:spPr>
-          <a:xfrm rot="5400000">
-            <a:off x="8993004" y="3229346"/>
-            <a:ext cx="474665" cy="683482"/>
-          </a:xfrm>
-          <a:prstGeom prst="rightArrow">
-            <a:avLst/>
-          </a:prstGeom>
-          <a:solidFill>
-            <a:srgbClr val="CBCBCB"/>
-          </a:solidFill>
-          <a:ln>
-            <a:noFill/>
-          </a:ln>
-        </p:spPr>
-        <p:style>
-          <a:lnRef idx="2">
-            <a:schemeClr val="accent1">
-              <a:shade val="15000"/>
-            </a:schemeClr>
-          </a:lnRef>
-          <a:fillRef idx="1">
-            <a:schemeClr val="accent1"/>
-          </a:fillRef>
-          <a:effectRef idx="0">
-            <a:schemeClr val="accent1"/>
-          </a:effectRef>
-          <a:fontRef idx="minor">
-            <a:schemeClr val="lt1"/>
-          </a:fontRef>
-        </p:style>
-        <p:txBody>
-          <a:bodyPr rtlCol="0" anchor="ctr"/>
-          <a:lstStyle/>
-          <a:p>
-            <a:pPr algn="ctr"/>
-            <a:endParaRPr lang="en-US" dirty="0"/>
-          </a:p>
-        </p:txBody>
-      </p:sp>
-      <p:sp>
-        <p:nvSpPr>
-          <p:cNvPr id="7" name="TextBox 6">
-            <a:extLst>
-              <a:ext uri="{FF2B5EF4-FFF2-40B4-BE49-F238E27FC236}">
-                <a16:creationId xmlns:a16="http://schemas.microsoft.com/office/drawing/2014/main" id="{EA27556E-E936-2125-8D29-523C4FC0DB89}"/>
-              </a:ext>
-            </a:extLst>
-          </p:cNvPr>
-          <p:cNvSpPr txBox="1"/>
-          <p:nvPr/>
-        </p:nvSpPr>
-        <p:spPr>
-          <a:xfrm>
-            <a:off x="8323711" y="810974"/>
-            <a:ext cx="1764201" cy="276999"/>
-          </a:xfrm>
-          <a:prstGeom prst="rect">
-            <a:avLst/>
-          </a:prstGeom>
-          <a:noFill/>
-        </p:spPr>
-        <p:txBody>
-          <a:bodyPr wrap="none" rtlCol="0">
-            <a:spAutoFit/>
-          </a:bodyPr>
-          <a:lstStyle/>
-          <a:p>
-            <a:r>
-              <a:rPr lang="en-US" sz="1200" b="1" dirty="0"/>
-              <a:t>UMAP Clustering Results</a:t>
-            </a:r>
-          </a:p>
-        </p:txBody>
-      </p:sp>
-      <p:pic>
-        <p:nvPicPr>
-          <p:cNvPr id="10" name="Picture 9">
-            <a:extLst>
-              <a:ext uri="{FF2B5EF4-FFF2-40B4-BE49-F238E27FC236}">
-                <a16:creationId xmlns:a16="http://schemas.microsoft.com/office/drawing/2014/main" id="{700615CE-B1DA-AA96-71C0-CA02DDEE92E2}"/>
-              </a:ext>
-            </a:extLst>
-          </p:cNvPr>
-          <p:cNvPicPr>
-            <a:picLocks noChangeAspect="1"/>
-          </p:cNvPicPr>
-          <p:nvPr/>
-        </p:nvPicPr>
-        <p:blipFill>
-          <a:blip r:embed="rId3"/>
-          <a:stretch>
-            <a:fillRect/>
-          </a:stretch>
-        </p:blipFill>
-        <p:spPr>
-          <a:xfrm>
-            <a:off x="7879393" y="3993959"/>
-            <a:ext cx="3483931" cy="2512747"/>
-          </a:xfrm>
-          <a:prstGeom prst="rect">
-            <a:avLst/>
-          </a:prstGeom>
-        </p:spPr>
-      </p:pic>
-      <p:pic>
-        <p:nvPicPr>
-          <p:cNvPr id="11" name="Picture 10">
-            <a:extLst>
-              <a:ext uri="{FF2B5EF4-FFF2-40B4-BE49-F238E27FC236}">
-                <a16:creationId xmlns:a16="http://schemas.microsoft.com/office/drawing/2014/main" id="{B8C186A1-BDA4-9043-FE8D-D1EB7A06C10C}"/>
-              </a:ext>
-            </a:extLst>
-          </p:cNvPr>
-          <p:cNvPicPr>
-            <a:picLocks noChangeAspect="1"/>
-          </p:cNvPicPr>
-          <p:nvPr/>
-        </p:nvPicPr>
-        <p:blipFill>
-          <a:blip r:embed="rId4"/>
-          <a:stretch>
-            <a:fillRect/>
-          </a:stretch>
-        </p:blipFill>
-        <p:spPr>
-          <a:xfrm>
-            <a:off x="7879393" y="1120937"/>
-            <a:ext cx="2701888" cy="2116733"/>
-          </a:xfrm>
-          <a:prstGeom prst="rect">
-            <a:avLst/>
-          </a:prstGeom>
-        </p:spPr>
-      </p:pic>
-    </p:spTree>
-    <p:extLst>
-      <p:ext uri="{BB962C8B-B14F-4D97-AF65-F5344CB8AC3E}">
-        <p14:creationId xmlns:p14="http://schemas.microsoft.com/office/powerpoint/2010/main" val="2790086309"/>
-      </p:ext>
-    </p:extLst>
-  </p:cSld>
-  <p:clrMapOvr>
-    <a:masterClrMapping/>
-  </p:clrMapOvr>
-</p:sld>
-</file>
-
-<file path=ppt/slides/slide3.xml><?xml version="1.0" encoding="utf-8"?>
-<p:sld xmlns:a="http://schemas.openxmlformats.org/drawingml/2006/main" xmlns:r="http://schemas.openxmlformats.org/officeDocument/2006/relationships" xmlns:p="http://schemas.openxmlformats.org/presentationml/2006/main">
-  <p:cSld>
-    <p:spTree>
-      <p:nvGrpSpPr>
-        <p:cNvPr id="1" name=""/>
-        <p:cNvGrpSpPr/>
-        <p:nvPr/>
-      </p:nvGrpSpPr>
-      <p:grpSpPr>
-        <a:xfrm>
-          <a:off x="0" y="0"/>
-          <a:ext cx="0" cy="0"/>
-          <a:chOff x="0" y="0"/>
-          <a:chExt cx="0" cy="0"/>
-        </a:xfrm>
-      </p:grpSpPr>
-      <p:sp>
-        <p:nvSpPr>
-          <p:cNvPr id="2" name="Title 1">
-            <a:extLst>
-              <a:ext uri="{FF2B5EF4-FFF2-40B4-BE49-F238E27FC236}">
-                <a16:creationId xmlns:a16="http://schemas.microsoft.com/office/drawing/2014/main" id="{ADF8E6B8-8A1F-CBA5-E3BB-A814E8D6E4F7}"/>
-              </a:ext>
-            </a:extLst>
-          </p:cNvPr>
-          <p:cNvSpPr>
-            <a:spLocks noGrp="1"/>
-          </p:cNvSpPr>
-          <p:nvPr>
-            <p:ph type="title"/>
-          </p:nvPr>
-        </p:nvSpPr>
-        <p:spPr/>
-        <p:txBody>
-          <a:bodyPr/>
-          <a:lstStyle/>
-          <a:p>
-            <a:r>
-              <a:rPr lang="en-US" dirty="0"/>
-              <a:t>Additional Pipeline Summaries</a:t>
-            </a:r>
-          </a:p>
-        </p:txBody>
-      </p:sp>
-      <p:pic>
-        <p:nvPicPr>
-          <p:cNvPr id="1026" name="Picture 2">
-            <a:extLst>
-              <a:ext uri="{FF2B5EF4-FFF2-40B4-BE49-F238E27FC236}">
-                <a16:creationId xmlns:a16="http://schemas.microsoft.com/office/drawing/2014/main" id="{8EAAE515-9CB3-AEF0-B466-C2CC88D478F0}"/>
-              </a:ext>
-            </a:extLst>
-          </p:cNvPr>
-          <p:cNvPicPr>
-            <a:picLocks noChangeAspect="1" noChangeArrowheads="1"/>
-          </p:cNvPicPr>
-          <p:nvPr/>
-        </p:nvPicPr>
-        <p:blipFill>
-          <a:blip r:embed="rId3" cstate="hqprint">
-            <a:extLst>
-              <a:ext uri="{28A0092B-C50C-407E-A947-70E740481C1C}">
-                <a14:useLocalDpi xmlns:a14="http://schemas.microsoft.com/office/drawing/2010/main"/>
-              </a:ext>
-            </a:extLst>
-          </a:blip>
-          <a:srcRect/>
-          <a:stretch>
-            <a:fillRect/>
-          </a:stretch>
-        </p:blipFill>
-        <p:spPr bwMode="auto">
-          <a:xfrm>
-            <a:off x="1722120" y="662442"/>
-            <a:ext cx="7118833" cy="6080142"/>
-          </a:xfrm>
-          <a:prstGeom prst="rect">
-            <a:avLst/>
-          </a:prstGeom>
-          <a:noFill/>
-          <a:extLst>
-            <a:ext uri="{909E8E84-426E-40DD-AFC4-6F175D3DCCD1}">
-              <a14:hiddenFill xmlns:a14="http://schemas.microsoft.com/office/drawing/2010/main">
-                <a:solidFill>
-                  <a:srgbClr val="FFFFFF"/>
-                </a:solidFill>
-              </a14:hiddenFill>
-            </a:ext>
-          </a:extLst>
-        </p:spPr>
-      </p:pic>
-      <p:sp>
-        <p:nvSpPr>
-          <p:cNvPr id="4" name="TextBox 3">
-            <a:extLst>
-              <a:ext uri="{FF2B5EF4-FFF2-40B4-BE49-F238E27FC236}">
-                <a16:creationId xmlns:a16="http://schemas.microsoft.com/office/drawing/2014/main" id="{AAAD712B-D70D-1377-6AEE-8C93CF7FB5C6}"/>
-              </a:ext>
-            </a:extLst>
-          </p:cNvPr>
-          <p:cNvSpPr txBox="1"/>
-          <p:nvPr/>
-        </p:nvSpPr>
-        <p:spPr>
-          <a:xfrm>
-            <a:off x="0" y="6627168"/>
-            <a:ext cx="2679192" cy="230832"/>
-          </a:xfrm>
-          <a:prstGeom prst="rect">
-            <a:avLst/>
-          </a:prstGeom>
-          <a:noFill/>
-        </p:spPr>
-        <p:txBody>
-          <a:bodyPr wrap="square">
-            <a:spAutoFit/>
-          </a:bodyPr>
-          <a:lstStyle/>
-          <a:p>
-            <a:pPr algn="r"/>
-            <a:r>
-              <a:rPr lang="fr-FR" sz="900" i="1" dirty="0"/>
-              <a:t>Xie. </a:t>
-            </a:r>
-            <a:r>
-              <a:rPr lang="fr-FR" sz="900" i="1" dirty="0" err="1"/>
-              <a:t>Comp</a:t>
-            </a:r>
-            <a:r>
-              <a:rPr lang="fr-FR" sz="900" i="1" dirty="0"/>
-              <a:t>. And </a:t>
-            </a:r>
-            <a:r>
-              <a:rPr lang="fr-FR" sz="900" i="1" dirty="0" err="1"/>
-              <a:t>Str</a:t>
-            </a:r>
-            <a:r>
-              <a:rPr lang="fr-FR" sz="900" i="1" dirty="0"/>
-              <a:t>. Biotech J. (2021). 19: 5874-5887</a:t>
-            </a:r>
-            <a:endParaRPr lang="en-US" sz="900" i="1" dirty="0"/>
-          </a:p>
-        </p:txBody>
-      </p:sp>
-    </p:spTree>
-    <p:extLst>
-      <p:ext uri="{BB962C8B-B14F-4D97-AF65-F5344CB8AC3E}">
-        <p14:creationId xmlns:p14="http://schemas.microsoft.com/office/powerpoint/2010/main" val="237000122"/>
-      </p:ext>
-    </p:extLst>
-  </p:cSld>
-  <p:clrMapOvr>
-    <a:masterClrMapping/>
-  </p:clrMapOvr>
-</p:sld>
-</file>
-
-<file path=ppt/slides/slide4.xml><?xml version="1.0" encoding="utf-8"?>
-<p:sld xmlns:a="http://schemas.openxmlformats.org/drawingml/2006/main" xmlns:r="http://schemas.openxmlformats.org/officeDocument/2006/relationships" xmlns:p="http://schemas.openxmlformats.org/presentationml/2006/main">
-  <p:cSld>
-    <p:spTree>
-      <p:nvGrpSpPr>
-        <p:cNvPr id="1" name=""/>
-        <p:cNvGrpSpPr/>
-        <p:nvPr/>
-      </p:nvGrpSpPr>
-      <p:grpSpPr>
-        <a:xfrm>
-          <a:off x="0" y="0"/>
-          <a:ext cx="0" cy="0"/>
-          <a:chOff x="0" y="0"/>
-          <a:chExt cx="0" cy="0"/>
-        </a:xfrm>
-      </p:grpSpPr>
-      <p:sp>
-        <p:nvSpPr>
-          <p:cNvPr id="2" name="Title 1">
-            <a:extLst>
-              <a:ext uri="{FF2B5EF4-FFF2-40B4-BE49-F238E27FC236}">
-                <a16:creationId xmlns:a16="http://schemas.microsoft.com/office/drawing/2014/main" id="{DCE24B9F-9985-9B06-0A2B-5D18E6FE8725}"/>
-              </a:ext>
-            </a:extLst>
-          </p:cNvPr>
-          <p:cNvSpPr>
-            <a:spLocks noGrp="1"/>
-          </p:cNvSpPr>
-          <p:nvPr>
-            <p:ph type="title"/>
-          </p:nvPr>
-        </p:nvSpPr>
-        <p:spPr/>
-        <p:txBody>
-          <a:bodyPr/>
-          <a:lstStyle/>
-          <a:p>
-            <a:r>
-              <a:rPr lang="en-US" dirty="0"/>
-              <a:t>Multitude of Packages Available for Cell Type Annotation</a:t>
-            </a:r>
-          </a:p>
-        </p:txBody>
-      </p:sp>
-      <p:pic>
-        <p:nvPicPr>
-          <p:cNvPr id="5" name="Picture 4">
-            <a:extLst>
-              <a:ext uri="{FF2B5EF4-FFF2-40B4-BE49-F238E27FC236}">
-                <a16:creationId xmlns:a16="http://schemas.microsoft.com/office/drawing/2014/main" id="{123C462D-E6E1-594F-477F-DA24D44EFC21}"/>
-              </a:ext>
-            </a:extLst>
-          </p:cNvPr>
-          <p:cNvPicPr>
-            <a:picLocks noChangeAspect="1"/>
-          </p:cNvPicPr>
-          <p:nvPr/>
-        </p:nvPicPr>
-        <p:blipFill>
-          <a:blip r:embed="rId2"/>
-          <a:stretch>
-            <a:fillRect/>
-          </a:stretch>
-        </p:blipFill>
-        <p:spPr>
-          <a:xfrm>
-            <a:off x="185737" y="743521"/>
-            <a:ext cx="6791325" cy="5914454"/>
-          </a:xfrm>
-          <a:prstGeom prst="rect">
-            <a:avLst/>
-          </a:prstGeom>
-        </p:spPr>
-      </p:pic>
-      <p:sp>
-        <p:nvSpPr>
-          <p:cNvPr id="7" name="TextBox 6">
-            <a:extLst>
-              <a:ext uri="{FF2B5EF4-FFF2-40B4-BE49-F238E27FC236}">
-                <a16:creationId xmlns:a16="http://schemas.microsoft.com/office/drawing/2014/main" id="{670AC158-02B7-8D40-5600-BE055BC92744}"/>
-              </a:ext>
-            </a:extLst>
-          </p:cNvPr>
-          <p:cNvSpPr txBox="1"/>
-          <p:nvPr/>
-        </p:nvSpPr>
-        <p:spPr>
-          <a:xfrm>
-            <a:off x="9449717" y="6126956"/>
-            <a:ext cx="2742283" cy="230832"/>
-          </a:xfrm>
-          <a:prstGeom prst="rect">
-            <a:avLst/>
-          </a:prstGeom>
-          <a:noFill/>
-        </p:spPr>
-        <p:txBody>
-          <a:bodyPr wrap="square">
-            <a:spAutoFit/>
-          </a:bodyPr>
-          <a:lstStyle/>
-          <a:p>
-            <a:pPr algn="r"/>
-            <a:r>
-              <a:rPr lang="en-US" sz="900" i="1" dirty="0" err="1"/>
-              <a:t>Pasquini</a:t>
-            </a:r>
-            <a:r>
-              <a:rPr lang="en-US" sz="900" i="1" dirty="0"/>
-              <a:t>. Comp. &amp; Str. Biotech. J. (2021). 19:P961-969.</a:t>
-            </a:r>
-          </a:p>
-        </p:txBody>
-      </p:sp>
-      <p:sp>
-        <p:nvSpPr>
-          <p:cNvPr id="8" name="TextBox 7">
-            <a:extLst>
-              <a:ext uri="{FF2B5EF4-FFF2-40B4-BE49-F238E27FC236}">
-                <a16:creationId xmlns:a16="http://schemas.microsoft.com/office/drawing/2014/main" id="{3900B111-2A85-7E57-3931-941BE78E5176}"/>
-              </a:ext>
-            </a:extLst>
-          </p:cNvPr>
-          <p:cNvSpPr txBox="1"/>
-          <p:nvPr/>
-        </p:nvSpPr>
-        <p:spPr>
-          <a:xfrm>
-            <a:off x="7261174" y="1377209"/>
-            <a:ext cx="4644978" cy="4247317"/>
-          </a:xfrm>
-          <a:prstGeom prst="rect">
-            <a:avLst/>
-          </a:prstGeom>
-          <a:noFill/>
-        </p:spPr>
-        <p:txBody>
-          <a:bodyPr wrap="square" rtlCol="0">
-            <a:spAutoFit/>
-          </a:bodyPr>
-          <a:lstStyle/>
-          <a:p>
-            <a:r>
-              <a:rPr lang="en-US" b="1" dirty="0"/>
-              <a:t>Marker Gene</a:t>
-            </a:r>
-            <a:r>
-              <a:rPr lang="en-US" dirty="0"/>
-              <a:t>: highly expressed genes are identified for each cluster, compare against databases of reference cell type hierarchies and marker lists.</a:t>
-            </a:r>
-          </a:p>
-          <a:p>
-            <a:endParaRPr lang="en-US" dirty="0"/>
-          </a:p>
-          <a:p>
-            <a:endParaRPr lang="en-US" dirty="0"/>
-          </a:p>
-          <a:p>
-            <a:r>
-              <a:rPr lang="en-US" b="1" dirty="0"/>
-              <a:t>Correlation</a:t>
-            </a:r>
-            <a:r>
-              <a:rPr lang="en-US" dirty="0"/>
-              <a:t>: uses correlation measures to compare gene expression profiles to reference dataset, uses “average cell” (centroid) for each cluster as a reference point.</a:t>
-            </a:r>
-          </a:p>
-          <a:p>
-            <a:endParaRPr lang="en-US" dirty="0"/>
-          </a:p>
-          <a:p>
-            <a:endParaRPr lang="en-US" dirty="0"/>
-          </a:p>
-          <a:p>
-            <a:r>
-              <a:rPr lang="en-US" b="1" dirty="0"/>
-              <a:t>Supervised Classification</a:t>
-            </a:r>
-            <a:r>
-              <a:rPr lang="en-US" dirty="0"/>
-              <a:t>: uses machine learning techniques to train a classifier based on reference labeled </a:t>
-            </a:r>
-            <a:r>
-              <a:rPr lang="en-US" dirty="0" err="1"/>
-              <a:t>scRNA</a:t>
-            </a:r>
-            <a:r>
-              <a:rPr lang="en-US" dirty="0"/>
-              <a:t>-Seq datasets.</a:t>
-            </a:r>
-          </a:p>
-        </p:txBody>
-      </p:sp>
-    </p:spTree>
-    <p:extLst>
-      <p:ext uri="{BB962C8B-B14F-4D97-AF65-F5344CB8AC3E}">
-        <p14:creationId xmlns:p14="http://schemas.microsoft.com/office/powerpoint/2010/main" val="2805963317"/>
-      </p:ext>
-    </p:extLst>
-  </p:cSld>
-  <p:clrMapOvr>
-    <a:masterClrMapping/>
-  </p:clrMapOvr>
-</p:sld>
-</file>
-
-<file path=ppt/slides/slide5.xml><?xml version="1.0" encoding="utf-8"?>
-<p:sld xmlns:a="http://schemas.openxmlformats.org/drawingml/2006/main" xmlns:r="http://schemas.openxmlformats.org/officeDocument/2006/relationships" xmlns:p="http://schemas.openxmlformats.org/presentationml/2006/main">
-  <p:cSld>
-    <p:spTree>
-      <p:nvGrpSpPr>
-        <p:cNvPr id="1" name=""/>
-        <p:cNvGrpSpPr/>
-        <p:nvPr/>
-      </p:nvGrpSpPr>
-      <p:grpSpPr>
-        <a:xfrm>
-          <a:off x="0" y="0"/>
-          <a:ext cx="0" cy="0"/>
-          <a:chOff x="0" y="0"/>
-          <a:chExt cx="0" cy="0"/>
-        </a:xfrm>
-      </p:grpSpPr>
-      <p:sp>
-        <p:nvSpPr>
-          <p:cNvPr id="2" name="Title 1">
-            <a:extLst>
-              <a:ext uri="{FF2B5EF4-FFF2-40B4-BE49-F238E27FC236}">
-                <a16:creationId xmlns:a16="http://schemas.microsoft.com/office/drawing/2014/main" id="{BAD3AB3B-3C2F-D093-2359-0093BFF48672}"/>
-              </a:ext>
-            </a:extLst>
-          </p:cNvPr>
-          <p:cNvSpPr>
-            <a:spLocks noGrp="1"/>
-          </p:cNvSpPr>
-          <p:nvPr>
-            <p:ph type="title"/>
-          </p:nvPr>
-        </p:nvSpPr>
-        <p:spPr/>
-        <p:txBody>
-          <a:bodyPr/>
-          <a:lstStyle/>
-          <a:p>
-            <a:r>
-              <a:rPr lang="en-US" dirty="0"/>
-              <a:t>Types of DGE</a:t>
-            </a:r>
-          </a:p>
-        </p:txBody>
-      </p:sp>
-      <p:sp>
-        <p:nvSpPr>
-          <p:cNvPr id="4" name="TextBox 3">
-            <a:extLst>
-              <a:ext uri="{FF2B5EF4-FFF2-40B4-BE49-F238E27FC236}">
-                <a16:creationId xmlns:a16="http://schemas.microsoft.com/office/drawing/2014/main" id="{F21BEFAD-BA96-D476-EDE6-7D0E561E1B64}"/>
-              </a:ext>
-            </a:extLst>
-          </p:cNvPr>
-          <p:cNvSpPr txBox="1"/>
-          <p:nvPr/>
-        </p:nvSpPr>
-        <p:spPr>
-          <a:xfrm>
-            <a:off x="671703" y="889843"/>
-            <a:ext cx="8577072" cy="4801314"/>
-          </a:xfrm>
-          <a:prstGeom prst="rect">
-            <a:avLst/>
-          </a:prstGeom>
-          <a:noFill/>
-        </p:spPr>
-        <p:txBody>
-          <a:bodyPr wrap="square">
-            <a:spAutoFit/>
-          </a:bodyPr>
-          <a:lstStyle/>
-          <a:p>
-            <a:pPr algn="l">
-              <a:buFont typeface="+mj-lt"/>
-              <a:buAutoNum type="arabicPeriod"/>
-            </a:pPr>
-            <a:r>
-              <a:rPr lang="en-US" b="1" i="0" dirty="0">
-                <a:effectLst/>
-                <a:latin typeface="Open Sans" panose="020B0606030504020204" pitchFamily="34" charset="0"/>
-              </a:rPr>
-              <a:t> Identification of all markers for each cluster:</a:t>
-            </a:r>
-            <a:r>
-              <a:rPr lang="en-US" b="0" i="0" dirty="0">
-                <a:effectLst/>
-                <a:latin typeface="Open Sans" panose="020B0606030504020204" pitchFamily="34" charset="0"/>
-              </a:rPr>
-              <a:t> this analysis compares each cluster against all others and outputs the genes that are differentially </a:t>
-            </a:r>
-            <a:r>
-              <a:rPr lang="en-US" b="0" i="0">
-                <a:effectLst/>
-                <a:latin typeface="Open Sans" panose="020B0606030504020204" pitchFamily="34" charset="0"/>
-              </a:rPr>
-              <a:t>expressed.</a:t>
-            </a:r>
-            <a:r>
-              <a:rPr lang="en-US">
-                <a:latin typeface="Open Sans" panose="020B0606030504020204" pitchFamily="34" charset="0"/>
-              </a:rPr>
-              <a:t> </a:t>
-            </a:r>
-            <a:r>
-              <a:rPr lang="en-US" dirty="0">
-                <a:latin typeface="Open Sans" panose="020B0606030504020204" pitchFamily="34" charset="0"/>
-              </a:rPr>
-              <a:t> </a:t>
-            </a:r>
-            <a:r>
-              <a:rPr lang="en-US" b="0" i="1">
-                <a:effectLst/>
-                <a:latin typeface="Open Sans" panose="020B0606030504020204" pitchFamily="34" charset="0"/>
-              </a:rPr>
-              <a:t>Useful </a:t>
-            </a:r>
-            <a:r>
-              <a:rPr lang="en-US" b="0" i="1" dirty="0">
-                <a:effectLst/>
-                <a:latin typeface="Open Sans" panose="020B0606030504020204" pitchFamily="34" charset="0"/>
-              </a:rPr>
-              <a:t>for identifying unknown clusters and improving confidence in hypothesized cell types.</a:t>
-            </a:r>
-          </a:p>
-          <a:p>
-            <a:pPr marL="742950" lvl="1" indent="-285750" algn="l">
-              <a:buFont typeface="+mj-lt"/>
-              <a:buAutoNum type="arabicPeriod"/>
-            </a:pPr>
-            <a:endParaRPr lang="en-US" b="0" i="0" dirty="0">
-              <a:effectLst/>
-              <a:latin typeface="Open Sans" panose="020B0606030504020204" pitchFamily="34" charset="0"/>
-            </a:endParaRPr>
-          </a:p>
-          <a:p>
-            <a:pPr algn="l">
-              <a:buFont typeface="+mj-lt"/>
-              <a:buAutoNum type="arabicPeriod"/>
-            </a:pPr>
-            <a:r>
-              <a:rPr lang="en-US" b="1" i="0" dirty="0">
-                <a:effectLst/>
-                <a:latin typeface="Open Sans" panose="020B0606030504020204" pitchFamily="34" charset="0"/>
-              </a:rPr>
-              <a:t> Identification of conserved markers for each cluster:</a:t>
-            </a:r>
-            <a:r>
-              <a:rPr lang="en-US" b="0" i="0" dirty="0">
-                <a:effectLst/>
-                <a:latin typeface="Open Sans" panose="020B0606030504020204" pitchFamily="34" charset="0"/>
-              </a:rPr>
-              <a:t> This analysis looks for genes that are differentially expressed/present within each condition first, and then reports those genes that are conserved in the cluster across all conditions. These genes can help to figure out the identity for the cluster.</a:t>
-            </a:r>
-          </a:p>
-          <a:p>
-            <a:pPr marL="742950" lvl="1" indent="-285750" algn="l">
-              <a:buFont typeface="+mj-lt"/>
-              <a:buAutoNum type="arabicPeriod"/>
-            </a:pPr>
-            <a:r>
-              <a:rPr lang="en-US" b="0" i="1" dirty="0">
-                <a:effectLst/>
-                <a:latin typeface="Open Sans" panose="020B0606030504020204" pitchFamily="34" charset="0"/>
-              </a:rPr>
-              <a:t>Useful with more than one condition to identify cell type markers that are conserved across conditions.</a:t>
-            </a:r>
-          </a:p>
-          <a:p>
-            <a:pPr marL="742950" lvl="1" indent="-285750" algn="l">
-              <a:buFont typeface="+mj-lt"/>
-              <a:buAutoNum type="arabicPeriod"/>
-            </a:pPr>
-            <a:endParaRPr lang="en-US" b="0" i="0" dirty="0">
-              <a:effectLst/>
-              <a:latin typeface="Open Sans" panose="020B0606030504020204" pitchFamily="34" charset="0"/>
-            </a:endParaRPr>
-          </a:p>
-          <a:p>
-            <a:pPr algn="l">
-              <a:buFont typeface="+mj-lt"/>
-              <a:buAutoNum type="arabicPeriod"/>
-            </a:pPr>
-            <a:r>
-              <a:rPr lang="en-US" b="1" i="0" dirty="0">
-                <a:effectLst/>
-                <a:latin typeface="Open Sans" panose="020B0606030504020204" pitchFamily="34" charset="0"/>
-              </a:rPr>
-              <a:t> Marker identification between specific clusters:</a:t>
-            </a:r>
-            <a:r>
-              <a:rPr lang="en-US" b="0" i="0" dirty="0">
-                <a:effectLst/>
-                <a:latin typeface="Open Sans" panose="020B0606030504020204" pitchFamily="34" charset="0"/>
-              </a:rPr>
-              <a:t> this analysis explores differentially expressed genes between specific clusters.</a:t>
-            </a:r>
-          </a:p>
-          <a:p>
-            <a:pPr marL="742950" lvl="1" indent="-285750" algn="l">
-              <a:buFont typeface="+mj-lt"/>
-              <a:buAutoNum type="arabicPeriod"/>
-            </a:pPr>
-            <a:r>
-              <a:rPr lang="en-US" b="0" i="1" dirty="0">
-                <a:effectLst/>
-                <a:latin typeface="Open Sans" panose="020B0606030504020204" pitchFamily="34" charset="0"/>
-              </a:rPr>
-              <a:t>Useful for determining differences in gene expression between clusters that appear to be representing the same </a:t>
-            </a:r>
-            <a:r>
-              <a:rPr lang="en-US" b="0" i="1" dirty="0" err="1">
-                <a:effectLst/>
-                <a:latin typeface="Open Sans" panose="020B0606030504020204" pitchFamily="34" charset="0"/>
-              </a:rPr>
-              <a:t>celltype</a:t>
-            </a:r>
-            <a:r>
-              <a:rPr lang="en-US" b="0" i="1" dirty="0">
-                <a:effectLst/>
-                <a:latin typeface="Open Sans" panose="020B0606030504020204" pitchFamily="34" charset="0"/>
-              </a:rPr>
-              <a:t> (</a:t>
-            </a:r>
-            <a:r>
-              <a:rPr lang="en-US" b="0" i="1" dirty="0" err="1">
-                <a:effectLst/>
-                <a:latin typeface="Open Sans" panose="020B0606030504020204" pitchFamily="34" charset="0"/>
-              </a:rPr>
-              <a:t>i.e</a:t>
-            </a:r>
-            <a:r>
-              <a:rPr lang="en-US" b="0" i="1" dirty="0">
-                <a:effectLst/>
-                <a:latin typeface="Open Sans" panose="020B0606030504020204" pitchFamily="34" charset="0"/>
-              </a:rPr>
-              <a:t> with markers that are similar) from the above analyses.</a:t>
-            </a:r>
-            <a:endParaRPr lang="en-US" b="0" i="0" dirty="0">
-              <a:effectLst/>
-              <a:latin typeface="Open Sans" panose="020B0606030504020204" pitchFamily="34" charset="0"/>
-            </a:endParaRPr>
-          </a:p>
-        </p:txBody>
-      </p:sp>
-    </p:spTree>
-    <p:extLst>
-      <p:ext uri="{BB962C8B-B14F-4D97-AF65-F5344CB8AC3E}">
-        <p14:creationId xmlns:p14="http://schemas.microsoft.com/office/powerpoint/2010/main" val="1192252857"/>
-      </p:ext>
-    </p:extLst>
-  </p:cSld>
-  <p:clrMapOvr>
-    <a:masterClrMapping/>
-  </p:clrMapOvr>
-</p:sld>
-</file>
-
-<file path=ppt/slides/slide6.xml><?xml version="1.0" encoding="utf-8"?>
-<p:sld xmlns:a="http://schemas.openxmlformats.org/drawingml/2006/main" xmlns:r="http://schemas.openxmlformats.org/officeDocument/2006/relationships" xmlns:p="http://schemas.openxmlformats.org/presentationml/2006/main">
-  <p:cSld>
-    <p:spTree>
-      <p:nvGrpSpPr>
-        <p:cNvPr id="1" name=""/>
-        <p:cNvGrpSpPr/>
-        <p:nvPr/>
-      </p:nvGrpSpPr>
-      <p:grpSpPr>
-        <a:xfrm>
-          <a:off x="0" y="0"/>
-          <a:ext cx="0" cy="0"/>
-          <a:chOff x="0" y="0"/>
-          <a:chExt cx="0" cy="0"/>
-        </a:xfrm>
-      </p:grpSpPr>
-      <p:pic>
-        <p:nvPicPr>
-          <p:cNvPr id="20" name="Picture 19">
-            <a:extLst>
-              <a:ext uri="{FF2B5EF4-FFF2-40B4-BE49-F238E27FC236}">
-                <a16:creationId xmlns:a16="http://schemas.microsoft.com/office/drawing/2014/main" id="{A61D144F-C489-3B78-12E3-8F7EB7CC958F}"/>
-              </a:ext>
-            </a:extLst>
-          </p:cNvPr>
-          <p:cNvPicPr>
-            <a:picLocks noChangeAspect="1"/>
-          </p:cNvPicPr>
-          <p:nvPr/>
-        </p:nvPicPr>
-        <p:blipFill rotWithShape="1">
-          <a:blip r:embed="rId2"/>
-          <a:srcRect l="54324" t="41934" r="31539" b="43098"/>
-          <a:stretch/>
-        </p:blipFill>
-        <p:spPr>
-          <a:xfrm>
-            <a:off x="3181967" y="841025"/>
-            <a:ext cx="423863" cy="317868"/>
-          </a:xfrm>
-          <a:prstGeom prst="rect">
-            <a:avLst/>
-          </a:prstGeom>
-        </p:spPr>
-      </p:pic>
-      <p:sp>
-        <p:nvSpPr>
-          <p:cNvPr id="2" name="Title 1">
-            <a:extLst>
-              <a:ext uri="{FF2B5EF4-FFF2-40B4-BE49-F238E27FC236}">
-                <a16:creationId xmlns:a16="http://schemas.microsoft.com/office/drawing/2014/main" id="{93A572DC-EE19-56B7-CDBE-3FA665E3CCD8}"/>
-              </a:ext>
-            </a:extLst>
-          </p:cNvPr>
-          <p:cNvSpPr>
-            <a:spLocks noGrp="1"/>
-          </p:cNvSpPr>
-          <p:nvPr>
-            <p:ph type="title"/>
-          </p:nvPr>
-        </p:nvSpPr>
-        <p:spPr/>
-        <p:txBody>
-          <a:bodyPr>
-            <a:normAutofit/>
-          </a:bodyPr>
-          <a:lstStyle/>
-          <a:p>
-            <a:r>
-              <a:rPr lang="en-US" dirty="0"/>
-              <a:t>Marker Based: </a:t>
-            </a:r>
-            <a:r>
-              <a:rPr lang="en-US" dirty="0" err="1"/>
-              <a:t>ScType</a:t>
-            </a:r>
-            <a:endParaRPr lang="en-US" dirty="0"/>
-          </a:p>
-        </p:txBody>
-      </p:sp>
-      <p:pic>
-        <p:nvPicPr>
-          <p:cNvPr id="9" name="Picture 8">
-            <a:extLst>
-              <a:ext uri="{FF2B5EF4-FFF2-40B4-BE49-F238E27FC236}">
-                <a16:creationId xmlns:a16="http://schemas.microsoft.com/office/drawing/2014/main" id="{CE2D70E3-F916-D873-A43B-320C521CC0DF}"/>
-              </a:ext>
-            </a:extLst>
-          </p:cNvPr>
-          <p:cNvPicPr>
-            <a:picLocks noChangeAspect="1"/>
-          </p:cNvPicPr>
-          <p:nvPr/>
-        </p:nvPicPr>
-        <p:blipFill>
-          <a:blip r:embed="rId3"/>
-          <a:stretch>
-            <a:fillRect/>
-          </a:stretch>
-        </p:blipFill>
-        <p:spPr>
-          <a:xfrm>
-            <a:off x="188714" y="2036051"/>
-            <a:ext cx="5486400" cy="596348"/>
-          </a:xfrm>
-          <a:prstGeom prst="rect">
-            <a:avLst/>
-          </a:prstGeom>
-        </p:spPr>
-      </p:pic>
-      <p:pic>
-        <p:nvPicPr>
-          <p:cNvPr id="13" name="Picture 12">
-            <a:extLst>
-              <a:ext uri="{FF2B5EF4-FFF2-40B4-BE49-F238E27FC236}">
-                <a16:creationId xmlns:a16="http://schemas.microsoft.com/office/drawing/2014/main" id="{6D71AB60-609A-44B6-175F-71F78FFB373B}"/>
-              </a:ext>
-            </a:extLst>
-          </p:cNvPr>
-          <p:cNvPicPr>
-            <a:picLocks noChangeAspect="1"/>
-          </p:cNvPicPr>
-          <p:nvPr/>
-        </p:nvPicPr>
-        <p:blipFill rotWithShape="1">
-          <a:blip r:embed="rId4"/>
-          <a:srcRect l="347"/>
-          <a:stretch/>
-        </p:blipFill>
-        <p:spPr>
-          <a:xfrm>
-            <a:off x="145413" y="2772862"/>
-            <a:ext cx="5467354" cy="2119938"/>
-          </a:xfrm>
-          <a:prstGeom prst="rect">
-            <a:avLst/>
-          </a:prstGeom>
-        </p:spPr>
-      </p:pic>
-      <p:pic>
-        <p:nvPicPr>
-          <p:cNvPr id="15" name="Picture 14">
-            <a:extLst>
-              <a:ext uri="{FF2B5EF4-FFF2-40B4-BE49-F238E27FC236}">
-                <a16:creationId xmlns:a16="http://schemas.microsoft.com/office/drawing/2014/main" id="{D97593AD-DBEE-D584-9B7C-49CBA1EEBDA9}"/>
-              </a:ext>
-            </a:extLst>
-          </p:cNvPr>
-          <p:cNvPicPr>
-            <a:picLocks noChangeAspect="1"/>
-          </p:cNvPicPr>
-          <p:nvPr/>
-        </p:nvPicPr>
-        <p:blipFill>
-          <a:blip r:embed="rId5"/>
-          <a:stretch>
-            <a:fillRect/>
-          </a:stretch>
-        </p:blipFill>
-        <p:spPr>
-          <a:xfrm>
-            <a:off x="188714" y="5104652"/>
-            <a:ext cx="5486400" cy="1550504"/>
-          </a:xfrm>
-          <a:prstGeom prst="rect">
-            <a:avLst/>
-          </a:prstGeom>
-        </p:spPr>
-      </p:pic>
-      <p:pic>
-        <p:nvPicPr>
-          <p:cNvPr id="17" name="Picture 16">
-            <a:extLst>
-              <a:ext uri="{FF2B5EF4-FFF2-40B4-BE49-F238E27FC236}">
-                <a16:creationId xmlns:a16="http://schemas.microsoft.com/office/drawing/2014/main" id="{76F30A2C-80E1-37A1-46A0-E5F21509606F}"/>
-              </a:ext>
-            </a:extLst>
-          </p:cNvPr>
-          <p:cNvPicPr>
-            <a:picLocks noChangeAspect="1"/>
-          </p:cNvPicPr>
-          <p:nvPr/>
-        </p:nvPicPr>
-        <p:blipFill>
-          <a:blip r:embed="rId6"/>
-          <a:stretch>
-            <a:fillRect/>
-          </a:stretch>
-        </p:blipFill>
-        <p:spPr>
-          <a:xfrm>
-            <a:off x="5913622" y="710615"/>
-            <a:ext cx="5486400" cy="3884406"/>
-          </a:xfrm>
-          <a:prstGeom prst="rect">
-            <a:avLst/>
-          </a:prstGeom>
-        </p:spPr>
-      </p:pic>
-      <p:pic>
-        <p:nvPicPr>
-          <p:cNvPr id="18" name="Picture 17">
-            <a:extLst>
-              <a:ext uri="{FF2B5EF4-FFF2-40B4-BE49-F238E27FC236}">
-                <a16:creationId xmlns:a16="http://schemas.microsoft.com/office/drawing/2014/main" id="{5F27AFEF-5F2E-96F6-6CE7-61ADBB0F3202}"/>
-              </a:ext>
-            </a:extLst>
-          </p:cNvPr>
-          <p:cNvPicPr>
-            <a:picLocks noChangeAspect="1"/>
-          </p:cNvPicPr>
-          <p:nvPr/>
-        </p:nvPicPr>
-        <p:blipFill>
-          <a:blip r:embed="rId7"/>
-          <a:stretch>
-            <a:fillRect/>
-          </a:stretch>
-        </p:blipFill>
-        <p:spPr>
-          <a:xfrm>
-            <a:off x="5813784" y="3308588"/>
-            <a:ext cx="4921272" cy="3549412"/>
-          </a:xfrm>
-          <a:prstGeom prst="rect">
-            <a:avLst/>
-          </a:prstGeom>
-        </p:spPr>
-      </p:pic>
-      <p:pic>
-        <p:nvPicPr>
-          <p:cNvPr id="19" name="Picture 18">
-            <a:extLst>
-              <a:ext uri="{FF2B5EF4-FFF2-40B4-BE49-F238E27FC236}">
-                <a16:creationId xmlns:a16="http://schemas.microsoft.com/office/drawing/2014/main" id="{46525A3B-47BC-3A53-91F8-984C5BD3F241}"/>
-              </a:ext>
-            </a:extLst>
-          </p:cNvPr>
-          <p:cNvPicPr>
-            <a:picLocks noChangeAspect="1"/>
-          </p:cNvPicPr>
-          <p:nvPr/>
-        </p:nvPicPr>
-        <p:blipFill rotWithShape="1">
-          <a:blip r:embed="rId2"/>
-          <a:srcRect l="6096" t="59506"/>
-          <a:stretch/>
-        </p:blipFill>
-        <p:spPr>
-          <a:xfrm>
-            <a:off x="2998271" y="1177980"/>
-            <a:ext cx="2815513" cy="859993"/>
-          </a:xfrm>
-          <a:prstGeom prst="rect">
-            <a:avLst/>
-          </a:prstGeom>
-        </p:spPr>
-      </p:pic>
-      <p:sp>
-        <p:nvSpPr>
-          <p:cNvPr id="21" name="Freeform: Shape 20">
-            <a:extLst>
-              <a:ext uri="{FF2B5EF4-FFF2-40B4-BE49-F238E27FC236}">
-                <a16:creationId xmlns:a16="http://schemas.microsoft.com/office/drawing/2014/main" id="{08C07257-D98B-7C61-C737-04604A33C1DB}"/>
-              </a:ext>
-            </a:extLst>
-          </p:cNvPr>
-          <p:cNvSpPr/>
-          <p:nvPr/>
-        </p:nvSpPr>
-        <p:spPr>
-          <a:xfrm>
-            <a:off x="2917031" y="1010198"/>
-            <a:ext cx="302419" cy="20883"/>
-          </a:xfrm>
-          <a:custGeom>
-            <a:avLst/>
-            <a:gdLst>
-              <a:gd name="connsiteX0" fmla="*/ 302419 w 302419"/>
-              <a:gd name="connsiteY0" fmla="*/ 1833 h 20883"/>
-              <a:gd name="connsiteX1" fmla="*/ 128588 w 302419"/>
-              <a:gd name="connsiteY1" fmla="*/ 1833 h 20883"/>
-              <a:gd name="connsiteX2" fmla="*/ 0 w 302419"/>
-              <a:gd name="connsiteY2" fmla="*/ 20883 h 20883"/>
-            </a:gdLst>
-            <a:ahLst/>
-            <a:cxnLst>
-              <a:cxn ang="0">
-                <a:pos x="connsiteX0" y="connsiteY0"/>
-              </a:cxn>
-              <a:cxn ang="0">
-                <a:pos x="connsiteX1" y="connsiteY1"/>
-              </a:cxn>
-              <a:cxn ang="0">
-                <a:pos x="connsiteX2" y="connsiteY2"/>
-              </a:cxn>
-            </a:cxnLst>
-            <a:rect l="l" t="t" r="r" b="b"/>
-            <a:pathLst>
-              <a:path w="302419" h="20883">
-                <a:moveTo>
-                  <a:pt x="302419" y="1833"/>
-                </a:moveTo>
-                <a:cubicBezTo>
-                  <a:pt x="240705" y="245"/>
-                  <a:pt x="178991" y="-1342"/>
-                  <a:pt x="128588" y="1833"/>
-                </a:cubicBezTo>
-                <a:cubicBezTo>
-                  <a:pt x="78185" y="5008"/>
-                  <a:pt x="39092" y="12945"/>
-                  <a:pt x="0" y="20883"/>
-                </a:cubicBezTo>
-              </a:path>
-            </a:pathLst>
-          </a:custGeom>
-          <a:noFill/>
-          <a:ln w="6350"/>
-        </p:spPr>
-        <p:style>
-          <a:lnRef idx="2">
-            <a:schemeClr val="accent1">
-              <a:shade val="15000"/>
-            </a:schemeClr>
-          </a:lnRef>
-          <a:fillRef idx="1">
-            <a:schemeClr val="accent1"/>
-          </a:fillRef>
-          <a:effectRef idx="0">
-            <a:schemeClr val="accent1"/>
-          </a:effectRef>
-          <a:fontRef idx="minor">
-            <a:schemeClr val="lt1"/>
-          </a:fontRef>
-        </p:style>
-        <p:txBody>
-          <a:bodyPr rtlCol="0" anchor="ctr"/>
-          <a:lstStyle/>
-          <a:p>
-            <a:pPr algn="ctr"/>
-            <a:endParaRPr lang="en-US"/>
-          </a:p>
-        </p:txBody>
-      </p:sp>
-      <p:grpSp>
-        <p:nvGrpSpPr>
-          <p:cNvPr id="24" name="Group 23">
-            <a:extLst>
-              <a:ext uri="{FF2B5EF4-FFF2-40B4-BE49-F238E27FC236}">
-                <a16:creationId xmlns:a16="http://schemas.microsoft.com/office/drawing/2014/main" id="{7CA62410-A0F1-22F5-9D9D-94BA90161353}"/>
-              </a:ext>
-            </a:extLst>
-          </p:cNvPr>
-          <p:cNvGrpSpPr/>
-          <p:nvPr/>
-        </p:nvGrpSpPr>
-        <p:grpSpPr>
-          <a:xfrm>
-            <a:off x="0" y="629173"/>
-            <a:ext cx="2998271" cy="1035806"/>
-            <a:chOff x="0" y="629173"/>
-            <a:chExt cx="2998271" cy="1035806"/>
-          </a:xfrm>
-        </p:grpSpPr>
-        <p:pic>
-          <p:nvPicPr>
-            <p:cNvPr id="4" name="Picture 3">
-              <a:extLst>
-                <a:ext uri="{FF2B5EF4-FFF2-40B4-BE49-F238E27FC236}">
-                  <a16:creationId xmlns:a16="http://schemas.microsoft.com/office/drawing/2014/main" id="{06B7ACAC-B034-3107-910A-3CB1994A85AA}"/>
-                </a:ext>
-              </a:extLst>
-            </p:cNvPr>
-            <p:cNvPicPr>
-              <a:picLocks noChangeAspect="1"/>
-            </p:cNvPicPr>
-            <p:nvPr/>
-          </p:nvPicPr>
-          <p:blipFill rotWithShape="1">
-            <a:blip r:embed="rId2"/>
-            <a:srcRect b="54492"/>
-            <a:stretch/>
-          </p:blipFill>
-          <p:spPr>
-            <a:xfrm>
-              <a:off x="0" y="629173"/>
-              <a:ext cx="2998271" cy="966487"/>
-            </a:xfrm>
-            <a:prstGeom prst="rect">
-              <a:avLst/>
-            </a:prstGeom>
-          </p:spPr>
-        </p:pic>
-        <p:sp>
-          <p:nvSpPr>
-            <p:cNvPr id="23" name="Rectangle 22">
-              <a:extLst>
-                <a:ext uri="{FF2B5EF4-FFF2-40B4-BE49-F238E27FC236}">
-                  <a16:creationId xmlns:a16="http://schemas.microsoft.com/office/drawing/2014/main" id="{45C0BB0E-9CF3-F15E-96C0-5D4CF60C2305}"/>
-                </a:ext>
-              </a:extLst>
-            </p:cNvPr>
-            <p:cNvSpPr/>
-            <p:nvPr/>
-          </p:nvSpPr>
-          <p:spPr>
-            <a:xfrm>
-              <a:off x="1606431" y="1488281"/>
-              <a:ext cx="477163" cy="176698"/>
-            </a:xfrm>
-            <a:prstGeom prst="rect">
-              <a:avLst/>
-            </a:prstGeom>
-            <a:solidFill>
-              <a:schemeClr val="bg1"/>
-            </a:solidFill>
-            <a:ln>
-              <a:noFill/>
-            </a:ln>
-          </p:spPr>
-          <p:style>
-            <a:lnRef idx="2">
-              <a:schemeClr val="accent1">
-                <a:shade val="15000"/>
-              </a:schemeClr>
-            </a:lnRef>
-            <a:fillRef idx="1">
-              <a:schemeClr val="accent1"/>
-            </a:fillRef>
-            <a:effectRef idx="0">
-              <a:schemeClr val="accent1"/>
-            </a:effectRef>
-            <a:fontRef idx="minor">
-              <a:schemeClr val="lt1"/>
-            </a:fontRef>
-          </p:style>
-          <p:txBody>
-            <a:bodyPr rtlCol="0" anchor="ctr"/>
-            <a:lstStyle/>
-            <a:p>
-              <a:pPr algn="ctr"/>
-              <a:endParaRPr lang="en-US"/>
-            </a:p>
-          </p:txBody>
-        </p:sp>
-      </p:grpSp>
-      <p:sp>
-        <p:nvSpPr>
-          <p:cNvPr id="25" name="Rectangle 24">
-            <a:extLst>
-              <a:ext uri="{FF2B5EF4-FFF2-40B4-BE49-F238E27FC236}">
-                <a16:creationId xmlns:a16="http://schemas.microsoft.com/office/drawing/2014/main" id="{A41B4AAC-F805-C30E-E806-4CC2E129D4F2}"/>
-              </a:ext>
-            </a:extLst>
-          </p:cNvPr>
-          <p:cNvSpPr/>
-          <p:nvPr/>
-        </p:nvSpPr>
-        <p:spPr>
-          <a:xfrm>
-            <a:off x="3521966" y="962182"/>
-            <a:ext cx="121347" cy="84185"/>
-          </a:xfrm>
-          <a:prstGeom prst="rect">
-            <a:avLst/>
-          </a:prstGeom>
-          <a:solidFill>
-            <a:schemeClr val="bg1"/>
-          </a:solidFill>
-          <a:ln>
-            <a:noFill/>
-          </a:ln>
-        </p:spPr>
-        <p:style>
-          <a:lnRef idx="2">
-            <a:schemeClr val="accent1">
-              <a:shade val="15000"/>
-            </a:schemeClr>
-          </a:lnRef>
-          <a:fillRef idx="1">
-            <a:schemeClr val="accent1"/>
-          </a:fillRef>
-          <a:effectRef idx="0">
-            <a:schemeClr val="accent1"/>
-          </a:effectRef>
-          <a:fontRef idx="minor">
-            <a:schemeClr val="lt1"/>
-          </a:fontRef>
-        </p:style>
-        <p:txBody>
-          <a:bodyPr rtlCol="0" anchor="ctr"/>
-          <a:lstStyle/>
-          <a:p>
-            <a:pPr algn="ctr"/>
-            <a:endParaRPr lang="en-US"/>
-          </a:p>
-        </p:txBody>
-      </p:sp>
-      <p:sp>
-        <p:nvSpPr>
-          <p:cNvPr id="22" name="Freeform: Shape 21">
-            <a:extLst>
-              <a:ext uri="{FF2B5EF4-FFF2-40B4-BE49-F238E27FC236}">
-                <a16:creationId xmlns:a16="http://schemas.microsoft.com/office/drawing/2014/main" id="{45CD23C5-1D9C-EAEE-E55D-16FEC3E281A6}"/>
-              </a:ext>
-            </a:extLst>
-          </p:cNvPr>
-          <p:cNvSpPr/>
-          <p:nvPr/>
-        </p:nvSpPr>
-        <p:spPr>
-          <a:xfrm>
-            <a:off x="3519487" y="1057278"/>
-            <a:ext cx="197643" cy="197644"/>
-          </a:xfrm>
-          <a:custGeom>
-            <a:avLst/>
-            <a:gdLst>
-              <a:gd name="connsiteX0" fmla="*/ 0 w 212108"/>
-              <a:gd name="connsiteY0" fmla="*/ 0 h 208785"/>
-              <a:gd name="connsiteX1" fmla="*/ 197643 w 212108"/>
-              <a:gd name="connsiteY1" fmla="*/ 66675 h 208785"/>
-              <a:gd name="connsiteX2" fmla="*/ 197643 w 212108"/>
-              <a:gd name="connsiteY2" fmla="*/ 197644 h 208785"/>
-              <a:gd name="connsiteX3" fmla="*/ 202406 w 212108"/>
-              <a:gd name="connsiteY3" fmla="*/ 192881 h 208785"/>
-              <a:gd name="connsiteX0" fmla="*/ 0 w 212108"/>
-              <a:gd name="connsiteY0" fmla="*/ 372 h 209157"/>
-              <a:gd name="connsiteX1" fmla="*/ 197643 w 212108"/>
-              <a:gd name="connsiteY1" fmla="*/ 67047 h 209157"/>
-              <a:gd name="connsiteX2" fmla="*/ 197643 w 212108"/>
-              <a:gd name="connsiteY2" fmla="*/ 198016 h 209157"/>
-              <a:gd name="connsiteX3" fmla="*/ 202406 w 212108"/>
-              <a:gd name="connsiteY3" fmla="*/ 193253 h 209157"/>
-              <a:gd name="connsiteX0" fmla="*/ 0 w 212108"/>
-              <a:gd name="connsiteY0" fmla="*/ 0 h 208785"/>
-              <a:gd name="connsiteX1" fmla="*/ 197643 w 212108"/>
-              <a:gd name="connsiteY1" fmla="*/ 66675 h 208785"/>
-              <a:gd name="connsiteX2" fmla="*/ 197643 w 212108"/>
-              <a:gd name="connsiteY2" fmla="*/ 197644 h 208785"/>
-              <a:gd name="connsiteX3" fmla="*/ 202406 w 212108"/>
-              <a:gd name="connsiteY3" fmla="*/ 192881 h 208785"/>
-              <a:gd name="connsiteX0" fmla="*/ 0 w 202406"/>
-              <a:gd name="connsiteY0" fmla="*/ 0 h 208785"/>
-              <a:gd name="connsiteX1" fmla="*/ 161924 w 202406"/>
-              <a:gd name="connsiteY1" fmla="*/ 90487 h 208785"/>
-              <a:gd name="connsiteX2" fmla="*/ 197643 w 202406"/>
-              <a:gd name="connsiteY2" fmla="*/ 197644 h 208785"/>
-              <a:gd name="connsiteX3" fmla="*/ 202406 w 202406"/>
-              <a:gd name="connsiteY3" fmla="*/ 192881 h 208785"/>
-              <a:gd name="connsiteX0" fmla="*/ 0 w 207169"/>
-              <a:gd name="connsiteY0" fmla="*/ 0 h 209614"/>
-              <a:gd name="connsiteX1" fmla="*/ 161924 w 207169"/>
-              <a:gd name="connsiteY1" fmla="*/ 90487 h 209614"/>
-              <a:gd name="connsiteX2" fmla="*/ 197643 w 207169"/>
-              <a:gd name="connsiteY2" fmla="*/ 197644 h 209614"/>
-              <a:gd name="connsiteX3" fmla="*/ 207169 w 207169"/>
-              <a:gd name="connsiteY3" fmla="*/ 195262 h 209614"/>
-              <a:gd name="connsiteX0" fmla="*/ 0 w 197643"/>
-              <a:gd name="connsiteY0" fmla="*/ 0 h 197644"/>
-              <a:gd name="connsiteX1" fmla="*/ 161924 w 197643"/>
-              <a:gd name="connsiteY1" fmla="*/ 90487 h 197644"/>
-              <a:gd name="connsiteX2" fmla="*/ 197643 w 197643"/>
-              <a:gd name="connsiteY2" fmla="*/ 197644 h 197644"/>
-            </a:gdLst>
-            <a:ahLst/>
-            <a:cxnLst>
-              <a:cxn ang="0">
-                <a:pos x="connsiteX0" y="connsiteY0"/>
-              </a:cxn>
-              <a:cxn ang="0">
-                <a:pos x="connsiteX1" y="connsiteY1"/>
-              </a:cxn>
-              <a:cxn ang="0">
-                <a:pos x="connsiteX2" y="connsiteY2"/>
-              </a:cxn>
-            </a:cxnLst>
-            <a:rect l="l" t="t" r="r" b="b"/>
-            <a:pathLst>
-              <a:path w="197643" h="197644">
-                <a:moveTo>
-                  <a:pt x="0" y="0"/>
-                </a:moveTo>
-                <a:cubicBezTo>
-                  <a:pt x="113307" y="43061"/>
-                  <a:pt x="128984" y="57546"/>
-                  <a:pt x="161924" y="90487"/>
-                </a:cubicBezTo>
-                <a:cubicBezTo>
-                  <a:pt x="194864" y="123428"/>
-                  <a:pt x="196849" y="176610"/>
-                  <a:pt x="197643" y="197644"/>
-                </a:cubicBezTo>
-              </a:path>
-            </a:pathLst>
-          </a:custGeom>
-          <a:noFill/>
-          <a:ln w="6350"/>
-        </p:spPr>
-        <p:style>
-          <a:lnRef idx="2">
-            <a:schemeClr val="accent1">
-              <a:shade val="15000"/>
-            </a:schemeClr>
-          </a:lnRef>
-          <a:fillRef idx="1">
-            <a:schemeClr val="accent1"/>
-          </a:fillRef>
-          <a:effectRef idx="0">
-            <a:schemeClr val="accent1"/>
-          </a:effectRef>
-          <a:fontRef idx="minor">
-            <a:schemeClr val="lt1"/>
-          </a:fontRef>
-        </p:style>
-        <p:txBody>
-          <a:bodyPr rtlCol="0" anchor="ctr"/>
-          <a:lstStyle/>
-          <a:p>
-            <a:pPr algn="ctr"/>
-            <a:endParaRPr lang="en-US" dirty="0"/>
-          </a:p>
-        </p:txBody>
-      </p:sp>
-    </p:spTree>
-    <p:extLst>
-      <p:ext uri="{BB962C8B-B14F-4D97-AF65-F5344CB8AC3E}">
-        <p14:creationId xmlns:p14="http://schemas.microsoft.com/office/powerpoint/2010/main" val="1957359433"/>
-      </p:ext>
-    </p:extLst>
-  </p:cSld>
-  <p:clrMapOvr>
-    <a:masterClrMapping/>
-  </p:clrMapOvr>
-  <p:timing>
-    <p:tnLst>
-      <p:par>
-        <p:cTn id="1" dur="indefinite" restart="never" nodeType="tmRoot">
-          <p:childTnLst>
-            <p:seq concurrent="1" nextAc="seek">
-              <p:cTn id="2" dur="indefinite" nodeType="mainSeq">
-                <p:childTnLst>
-                  <p:par>
-                    <p:cTn id="3" fill="hold">
-                      <p:stCondLst>
-                        <p:cond delay="indefinite"/>
-                      </p:stCondLst>
-                      <p:childTnLst>
-                        <p:par>
-                          <p:cTn id="4" fill="hold">
-                            <p:stCondLst>
-                              <p:cond delay="0"/>
-                            </p:stCondLst>
-                            <p:childTnLst>
-                              <p:par>
-                                <p:cTn id="5" presetID="1" presetClass="entr" presetSubtype="0" fill="hold" nodeType="clickEffect">
-                                  <p:stCondLst>
-                                    <p:cond delay="0"/>
-                                  </p:stCondLst>
-                                  <p:childTnLst>
-                                    <p:set>
-                                      <p:cBhvr>
-                                        <p:cTn id="6" dur="1" fill="hold">
-                                          <p:stCondLst>
-                                            <p:cond delay="0"/>
-                                          </p:stCondLst>
-                                        </p:cTn>
-                                        <p:tgtEl>
-                                          <p:spTgt spid="18"/>
-                                        </p:tgtEl>
-                                        <p:attrNameLst>
-                                          <p:attrName>style.visibility</p:attrName>
-                                        </p:attrNameLst>
-                                      </p:cBhvr>
-                                      <p:to>
-                                        <p:strVal val="visible"/>
-                                      </p:to>
-                                    </p:set>
-                                  </p:childTnLst>
-                                </p:cTn>
-                              </p:par>
-                            </p:childTnLst>
-                          </p:cTn>
-                        </p:par>
-                      </p:childTnLst>
-                    </p:cTn>
-                  </p:par>
-                </p:childTnLst>
-              </p:cTn>
-              <p:prevCondLst>
-                <p:cond evt="onPrev" delay="0">
-                  <p:tgtEl>
-                    <p:sldTgt/>
-                  </p:tgtEl>
-                </p:cond>
-              </p:prevCondLst>
-              <p:nextCondLst>
-                <p:cond evt="onNext" delay="0">
-                  <p:tgtEl>
-                    <p:sldTgt/>
-                  </p:tgtEl>
-                </p:cond>
-              </p:nextCondLst>
-            </p:seq>
-          </p:childTnLst>
-        </p:cTn>
-      </p:par>
-    </p:tnLst>
-  </p:timing>
-</p:sld>
-</file>
-
-<file path=ppt/slides/slide7.xml><?xml version="1.0" encoding="utf-8"?>
-<p:sld xmlns:a="http://schemas.openxmlformats.org/drawingml/2006/main" xmlns:r="http://schemas.openxmlformats.org/officeDocument/2006/relationships" xmlns:p="http://schemas.openxmlformats.org/presentationml/2006/main">
-  <p:cSld>
-    <p:spTree>
-      <p:nvGrpSpPr>
-        <p:cNvPr id="1" name=""/>
-        <p:cNvGrpSpPr/>
-        <p:nvPr/>
-      </p:nvGrpSpPr>
-      <p:grpSpPr>
-        <a:xfrm>
-          <a:off x="0" y="0"/>
-          <a:ext cx="0" cy="0"/>
-          <a:chOff x="0" y="0"/>
-          <a:chExt cx="0" cy="0"/>
-        </a:xfrm>
-      </p:grpSpPr>
-      <p:sp>
-        <p:nvSpPr>
-          <p:cNvPr id="2" name="Title 1">
-            <a:extLst>
-              <a:ext uri="{FF2B5EF4-FFF2-40B4-BE49-F238E27FC236}">
-                <a16:creationId xmlns:a16="http://schemas.microsoft.com/office/drawing/2014/main" id="{4B9B733D-AA85-3582-42D9-0955A32E00FE}"/>
-              </a:ext>
-            </a:extLst>
-          </p:cNvPr>
-          <p:cNvSpPr>
-            <a:spLocks noGrp="1"/>
-          </p:cNvSpPr>
-          <p:nvPr>
-            <p:ph type="title"/>
-          </p:nvPr>
-        </p:nvSpPr>
-        <p:spPr/>
-        <p:txBody>
-          <a:bodyPr/>
-          <a:lstStyle/>
-          <a:p>
-            <a:r>
-              <a:rPr lang="en-US" dirty="0" err="1"/>
-              <a:t>SingleR</a:t>
-            </a:r>
-            <a:r>
-              <a:rPr lang="en-US" dirty="0"/>
-              <a:t>: Correlation Based Annotation</a:t>
-            </a:r>
-          </a:p>
-        </p:txBody>
-      </p:sp>
-      <p:pic>
-        <p:nvPicPr>
-          <p:cNvPr id="4" name="Picture 3">
-            <a:extLst>
-              <a:ext uri="{FF2B5EF4-FFF2-40B4-BE49-F238E27FC236}">
-                <a16:creationId xmlns:a16="http://schemas.microsoft.com/office/drawing/2014/main" id="{47FA1686-35CF-8F34-8E6F-A30C30D11232}"/>
-              </a:ext>
-            </a:extLst>
-          </p:cNvPr>
-          <p:cNvPicPr>
-            <a:picLocks noChangeAspect="1"/>
-          </p:cNvPicPr>
-          <p:nvPr/>
-        </p:nvPicPr>
-        <p:blipFill>
-          <a:blip r:embed="rId2"/>
-          <a:stretch>
-            <a:fillRect/>
-          </a:stretch>
-        </p:blipFill>
-        <p:spPr>
-          <a:xfrm>
-            <a:off x="1461343" y="3720120"/>
-            <a:ext cx="4735242" cy="2910048"/>
-          </a:xfrm>
-          <a:prstGeom prst="rect">
-            <a:avLst/>
-          </a:prstGeom>
-        </p:spPr>
-      </p:pic>
-      <p:pic>
-        <p:nvPicPr>
-          <p:cNvPr id="6" name="Picture 5">
-            <a:extLst>
-              <a:ext uri="{FF2B5EF4-FFF2-40B4-BE49-F238E27FC236}">
-                <a16:creationId xmlns:a16="http://schemas.microsoft.com/office/drawing/2014/main" id="{022FEB95-D2AF-B7D3-0111-D0BE595C1A71}"/>
-              </a:ext>
-            </a:extLst>
-          </p:cNvPr>
-          <p:cNvPicPr>
-            <a:picLocks noChangeAspect="1"/>
-          </p:cNvPicPr>
-          <p:nvPr/>
-        </p:nvPicPr>
-        <p:blipFill>
-          <a:blip r:embed="rId3"/>
-          <a:stretch>
-            <a:fillRect/>
-          </a:stretch>
-        </p:blipFill>
-        <p:spPr>
-          <a:xfrm>
-            <a:off x="515354" y="980733"/>
-            <a:ext cx="6106377" cy="2448267"/>
-          </a:xfrm>
-          <a:prstGeom prst="rect">
-            <a:avLst/>
-          </a:prstGeom>
-        </p:spPr>
-      </p:pic>
-      <p:pic>
-        <p:nvPicPr>
-          <p:cNvPr id="10" name="Picture 9">
-            <a:extLst>
-              <a:ext uri="{FF2B5EF4-FFF2-40B4-BE49-F238E27FC236}">
-                <a16:creationId xmlns:a16="http://schemas.microsoft.com/office/drawing/2014/main" id="{A7E4442F-4EE8-F881-9B1B-E8B29755BDBD}"/>
-              </a:ext>
-            </a:extLst>
-          </p:cNvPr>
-          <p:cNvPicPr>
-            <a:picLocks noChangeAspect="1"/>
-          </p:cNvPicPr>
-          <p:nvPr/>
-        </p:nvPicPr>
-        <p:blipFill>
-          <a:blip r:embed="rId4"/>
-          <a:stretch>
-            <a:fillRect/>
-          </a:stretch>
-        </p:blipFill>
-        <p:spPr>
-          <a:xfrm>
-            <a:off x="6403116" y="1716207"/>
-            <a:ext cx="4754521" cy="2547064"/>
-          </a:xfrm>
-          <a:prstGeom prst="rect">
-            <a:avLst/>
-          </a:prstGeom>
-        </p:spPr>
-      </p:pic>
-      <p:sp>
-        <p:nvSpPr>
-          <p:cNvPr id="11" name="TextBox 10">
-            <a:extLst>
-              <a:ext uri="{FF2B5EF4-FFF2-40B4-BE49-F238E27FC236}">
-                <a16:creationId xmlns:a16="http://schemas.microsoft.com/office/drawing/2014/main" id="{90168B75-BF86-2D36-58ED-0D40355E94B8}"/>
-              </a:ext>
-            </a:extLst>
-          </p:cNvPr>
-          <p:cNvSpPr txBox="1"/>
-          <p:nvPr/>
-        </p:nvSpPr>
-        <p:spPr>
-          <a:xfrm>
-            <a:off x="9592089" y="1624790"/>
-            <a:ext cx="1236236" cy="369332"/>
-          </a:xfrm>
-          <a:prstGeom prst="rect">
-            <a:avLst/>
-          </a:prstGeom>
-          <a:noFill/>
-        </p:spPr>
-        <p:txBody>
-          <a:bodyPr wrap="none" rtlCol="0">
-            <a:spAutoFit/>
-          </a:bodyPr>
-          <a:lstStyle/>
-          <a:p>
-            <a:r>
-              <a:rPr lang="en-US" b="1" dirty="0"/>
-              <a:t>Fine Labels</a:t>
-            </a:r>
-          </a:p>
-        </p:txBody>
-      </p:sp>
-      <p:sp>
-        <p:nvSpPr>
-          <p:cNvPr id="12" name="TextBox 11">
-            <a:extLst>
-              <a:ext uri="{FF2B5EF4-FFF2-40B4-BE49-F238E27FC236}">
-                <a16:creationId xmlns:a16="http://schemas.microsoft.com/office/drawing/2014/main" id="{765A24B6-1711-E454-9E3B-C71A3860076F}"/>
-              </a:ext>
-            </a:extLst>
-          </p:cNvPr>
-          <p:cNvSpPr txBox="1"/>
-          <p:nvPr/>
-        </p:nvSpPr>
-        <p:spPr>
-          <a:xfrm>
-            <a:off x="5210760" y="4356112"/>
-            <a:ext cx="1340432" cy="338554"/>
-          </a:xfrm>
-          <a:prstGeom prst="rect">
-            <a:avLst/>
-          </a:prstGeom>
-          <a:noFill/>
-        </p:spPr>
-        <p:txBody>
-          <a:bodyPr wrap="none" rtlCol="0">
-            <a:spAutoFit/>
-          </a:bodyPr>
-          <a:lstStyle/>
-          <a:p>
-            <a:r>
-              <a:rPr lang="en-US" sz="1600" b="1" dirty="0"/>
-              <a:t>Simple Labels</a:t>
-            </a:r>
-          </a:p>
-        </p:txBody>
-      </p:sp>
-    </p:spTree>
-    <p:extLst>
-      <p:ext uri="{BB962C8B-B14F-4D97-AF65-F5344CB8AC3E}">
-        <p14:creationId xmlns:p14="http://schemas.microsoft.com/office/powerpoint/2010/main" val="1977982267"/>
-      </p:ext>
-    </p:extLst>
-  </p:cSld>
-  <p:clrMapOvr>
-    <a:masterClrMapping/>
-  </p:clrMapOvr>
-</p:sld>
-</file>
-
-<file path=ppt/slides/slide8.xml><?xml version="1.0" encoding="utf-8"?>
-<p:sld xmlns:a="http://schemas.openxmlformats.org/drawingml/2006/main" xmlns:r="http://schemas.openxmlformats.org/officeDocument/2006/relationships" xmlns:p="http://schemas.openxmlformats.org/presentationml/2006/main">
-  <p:cSld>
-    <p:spTree>
-      <p:nvGrpSpPr>
-        <p:cNvPr id="1" name=""/>
-        <p:cNvGrpSpPr/>
-        <p:nvPr/>
-      </p:nvGrpSpPr>
-      <p:grpSpPr>
-        <a:xfrm>
-          <a:off x="0" y="0"/>
-          <a:ext cx="0" cy="0"/>
-          <a:chOff x="0" y="0"/>
-          <a:chExt cx="0" cy="0"/>
-        </a:xfrm>
-      </p:grpSpPr>
-      <p:sp>
-        <p:nvSpPr>
-          <p:cNvPr id="2" name="Title 1">
-            <a:extLst>
-              <a:ext uri="{FF2B5EF4-FFF2-40B4-BE49-F238E27FC236}">
-                <a16:creationId xmlns:a16="http://schemas.microsoft.com/office/drawing/2014/main" id="{16A6C89E-64F5-F3C7-8FB8-4B03FDC5B489}"/>
-              </a:ext>
-            </a:extLst>
-          </p:cNvPr>
-          <p:cNvSpPr>
-            <a:spLocks noGrp="1"/>
-          </p:cNvSpPr>
-          <p:nvPr>
-            <p:ph type="title"/>
-          </p:nvPr>
-        </p:nvSpPr>
-        <p:spPr/>
-        <p:txBody>
-          <a:bodyPr/>
-          <a:lstStyle/>
-          <a:p>
-            <a:r>
-              <a:rPr lang="en-US" dirty="0" err="1"/>
-              <a:t>scAnnoteR</a:t>
-            </a:r>
-            <a:r>
-              <a:rPr lang="en-US" dirty="0"/>
-              <a:t>: Classification Based (default model)</a:t>
-            </a:r>
-          </a:p>
-        </p:txBody>
-      </p:sp>
-      <p:pic>
-        <p:nvPicPr>
-          <p:cNvPr id="4" name="Picture 3">
-            <a:extLst>
-              <a:ext uri="{FF2B5EF4-FFF2-40B4-BE49-F238E27FC236}">
-                <a16:creationId xmlns:a16="http://schemas.microsoft.com/office/drawing/2014/main" id="{C7A34AC9-61F6-1BE2-44A3-C37236665A70}"/>
-              </a:ext>
-            </a:extLst>
-          </p:cNvPr>
-          <p:cNvPicPr>
-            <a:picLocks noChangeAspect="1"/>
-          </p:cNvPicPr>
-          <p:nvPr/>
-        </p:nvPicPr>
-        <p:blipFill>
-          <a:blip r:embed="rId2"/>
-          <a:stretch>
-            <a:fillRect/>
-          </a:stretch>
-        </p:blipFill>
-        <p:spPr>
-          <a:xfrm>
-            <a:off x="364862" y="1001156"/>
-            <a:ext cx="4677428" cy="1600423"/>
-          </a:xfrm>
-          <a:prstGeom prst="rect">
-            <a:avLst/>
-          </a:prstGeom>
-        </p:spPr>
-      </p:pic>
-      <p:pic>
-        <p:nvPicPr>
-          <p:cNvPr id="1026" name="Picture 2" descr="Workflow of scAnnotate on a dataset with at most one rare cell population (at most one cell population less than 100 cells). The vertical grey dashed line separates training data (left) and test data (right) information">
-            <a:extLst>
-              <a:ext uri="{FF2B5EF4-FFF2-40B4-BE49-F238E27FC236}">
-                <a16:creationId xmlns:a16="http://schemas.microsoft.com/office/drawing/2014/main" id="{C275E2A4-1C90-16FF-A85A-599C42832AE9}"/>
-              </a:ext>
-            </a:extLst>
-          </p:cNvPr>
-          <p:cNvPicPr>
-            <a:picLocks noChangeAspect="1" noChangeArrowheads="1"/>
-          </p:cNvPicPr>
-          <p:nvPr/>
-        </p:nvPicPr>
-        <p:blipFill>
-          <a:blip r:embed="rId3">
-            <a:extLst>
-              <a:ext uri="{28A0092B-C50C-407E-A947-70E740481C1C}">
-                <a14:useLocalDpi xmlns:a14="http://schemas.microsoft.com/office/drawing/2010/main" val="0"/>
-              </a:ext>
-            </a:extLst>
-          </a:blip>
-          <a:srcRect/>
-          <a:stretch>
-            <a:fillRect/>
-          </a:stretch>
-        </p:blipFill>
-        <p:spPr bwMode="auto">
-          <a:xfrm>
-            <a:off x="7324344" y="896112"/>
-            <a:ext cx="3674669" cy="5377564"/>
-          </a:xfrm>
-          <a:prstGeom prst="rect">
-            <a:avLst/>
-          </a:prstGeom>
-          <a:noFill/>
-          <a:extLst>
-            <a:ext uri="{909E8E84-426E-40DD-AFC4-6F175D3DCCD1}">
-              <a14:hiddenFill xmlns:a14="http://schemas.microsoft.com/office/drawing/2010/main">
-                <a:solidFill>
-                  <a:srgbClr val="FFFFFF"/>
-                </a:solidFill>
-              </a14:hiddenFill>
-            </a:ext>
-          </a:extLst>
-        </p:spPr>
-      </p:pic>
-      <p:pic>
-        <p:nvPicPr>
-          <p:cNvPr id="6" name="Picture 5">
-            <a:extLst>
-              <a:ext uri="{FF2B5EF4-FFF2-40B4-BE49-F238E27FC236}">
-                <a16:creationId xmlns:a16="http://schemas.microsoft.com/office/drawing/2014/main" id="{AAB948B5-7973-4C00-2CFC-8D9D38FB981E}"/>
-              </a:ext>
-            </a:extLst>
-          </p:cNvPr>
-          <p:cNvPicPr>
-            <a:picLocks noChangeAspect="1"/>
-          </p:cNvPicPr>
-          <p:nvPr/>
-        </p:nvPicPr>
-        <p:blipFill>
-          <a:blip r:embed="rId4"/>
-          <a:stretch>
-            <a:fillRect/>
-          </a:stretch>
-        </p:blipFill>
-        <p:spPr>
-          <a:xfrm>
-            <a:off x="2008632" y="2973562"/>
-            <a:ext cx="4419210" cy="3417084"/>
-          </a:xfrm>
-          <a:prstGeom prst="rect">
-            <a:avLst/>
-          </a:prstGeom>
-        </p:spPr>
-      </p:pic>
-    </p:spTree>
-    <p:extLst>
-      <p:ext uri="{BB962C8B-B14F-4D97-AF65-F5344CB8AC3E}">
-        <p14:creationId xmlns:p14="http://schemas.microsoft.com/office/powerpoint/2010/main" val="2041570772"/>
-      </p:ext>
-    </p:extLst>
-  </p:cSld>
-  <p:clrMapOvr>
-    <a:masterClrMapping/>
-  </p:clrMapOvr>
-</p:sld>
-</file>
-
-<file path=ppt/slides/slide9.xml><?xml version="1.0" encoding="utf-8"?>
-<p:sld xmlns:a="http://schemas.openxmlformats.org/drawingml/2006/main" xmlns:r="http://schemas.openxmlformats.org/officeDocument/2006/relationships" xmlns:p="http://schemas.openxmlformats.org/presentationml/2006/main">
-  <p:cSld>
-    <p:spTree>
-      <p:nvGrpSpPr>
-        <p:cNvPr id="1" name=""/>
-        <p:cNvGrpSpPr/>
-        <p:nvPr/>
-      </p:nvGrpSpPr>
-      <p:grpSpPr>
-        <a:xfrm>
-          <a:off x="0" y="0"/>
-          <a:ext cx="0" cy="0"/>
-          <a:chOff x="0" y="0"/>
-          <a:chExt cx="0" cy="0"/>
-        </a:xfrm>
-      </p:grpSpPr>
-      <p:sp>
-        <p:nvSpPr>
-          <p:cNvPr id="2" name="Title 1">
-            <a:extLst>
-              <a:ext uri="{FF2B5EF4-FFF2-40B4-BE49-F238E27FC236}">
-                <a16:creationId xmlns:a16="http://schemas.microsoft.com/office/drawing/2014/main" id="{B64BC24A-6320-ACAE-D16F-90D79769B63C}"/>
-              </a:ext>
-            </a:extLst>
-          </p:cNvPr>
-          <p:cNvSpPr>
-            <a:spLocks noGrp="1"/>
-          </p:cNvSpPr>
-          <p:nvPr>
-            <p:ph type="title"/>
-          </p:nvPr>
-        </p:nvSpPr>
-        <p:spPr/>
-        <p:txBody>
-          <a:bodyPr/>
-          <a:lstStyle/>
-          <a:p>
-            <a:r>
-              <a:rPr lang="en-US" dirty="0"/>
-              <a:t>Classification Based: </a:t>
-            </a:r>
-            <a:r>
-              <a:rPr lang="en-US" dirty="0" err="1"/>
-              <a:t>scPred</a:t>
-            </a:r>
-            <a:r>
-              <a:rPr lang="en-US" dirty="0"/>
-              <a:t> with Trained Reference</a:t>
-            </a:r>
-          </a:p>
-        </p:txBody>
-      </p:sp>
-      <p:pic>
-        <p:nvPicPr>
-          <p:cNvPr id="5" name="Picture 4">
-            <a:extLst>
-              <a:ext uri="{FF2B5EF4-FFF2-40B4-BE49-F238E27FC236}">
-                <a16:creationId xmlns:a16="http://schemas.microsoft.com/office/drawing/2014/main" id="{B512517D-6901-E5F0-7504-54D2112C11FC}"/>
-              </a:ext>
-            </a:extLst>
-          </p:cNvPr>
-          <p:cNvPicPr>
-            <a:picLocks noChangeAspect="1"/>
-          </p:cNvPicPr>
-          <p:nvPr/>
-        </p:nvPicPr>
-        <p:blipFill>
-          <a:blip r:embed="rId2"/>
-          <a:stretch>
-            <a:fillRect/>
-          </a:stretch>
-        </p:blipFill>
-        <p:spPr>
-          <a:xfrm>
-            <a:off x="6580489" y="878633"/>
-            <a:ext cx="4443844" cy="2623054"/>
-          </a:xfrm>
-          <a:prstGeom prst="rect">
-            <a:avLst/>
-          </a:prstGeom>
-        </p:spPr>
-      </p:pic>
-      <p:pic>
-        <p:nvPicPr>
-          <p:cNvPr id="7" name="Picture 6">
-            <a:extLst>
-              <a:ext uri="{FF2B5EF4-FFF2-40B4-BE49-F238E27FC236}">
-                <a16:creationId xmlns:a16="http://schemas.microsoft.com/office/drawing/2014/main" id="{D3980AE6-4993-8831-6444-633133C66BEB}"/>
-              </a:ext>
-            </a:extLst>
-          </p:cNvPr>
-          <p:cNvPicPr>
-            <a:picLocks noChangeAspect="1"/>
-          </p:cNvPicPr>
-          <p:nvPr/>
-        </p:nvPicPr>
-        <p:blipFill>
-          <a:blip r:embed="rId3"/>
-          <a:stretch>
-            <a:fillRect/>
-          </a:stretch>
-        </p:blipFill>
-        <p:spPr>
-          <a:xfrm>
-            <a:off x="6864097" y="4144340"/>
-            <a:ext cx="4620594" cy="2639233"/>
-          </a:xfrm>
-          <a:prstGeom prst="rect">
-            <a:avLst/>
-          </a:prstGeom>
-        </p:spPr>
-      </p:pic>
-      <p:pic>
-        <p:nvPicPr>
-          <p:cNvPr id="9" name="Picture 8">
-            <a:extLst>
-              <a:ext uri="{FF2B5EF4-FFF2-40B4-BE49-F238E27FC236}">
-                <a16:creationId xmlns:a16="http://schemas.microsoft.com/office/drawing/2014/main" id="{1F7FF9BF-0170-E135-3AA4-D8D881640F43}"/>
-              </a:ext>
-            </a:extLst>
-          </p:cNvPr>
-          <p:cNvPicPr>
-            <a:picLocks noChangeAspect="1"/>
-          </p:cNvPicPr>
-          <p:nvPr/>
-        </p:nvPicPr>
-        <p:blipFill>
-          <a:blip r:embed="rId4"/>
-          <a:stretch>
-            <a:fillRect/>
-          </a:stretch>
-        </p:blipFill>
-        <p:spPr>
-          <a:xfrm>
-            <a:off x="207265" y="786840"/>
-            <a:ext cx="6144482" cy="4201111"/>
-          </a:xfrm>
-          <a:prstGeom prst="rect">
-            <a:avLst/>
-          </a:prstGeom>
-        </p:spPr>
-      </p:pic>
-      <p:sp>
-        <p:nvSpPr>
-          <p:cNvPr id="10" name="TextBox 9">
-            <a:extLst>
-              <a:ext uri="{FF2B5EF4-FFF2-40B4-BE49-F238E27FC236}">
-                <a16:creationId xmlns:a16="http://schemas.microsoft.com/office/drawing/2014/main" id="{73D7C881-92F5-D120-8A72-5F141F326C4A}"/>
-              </a:ext>
-            </a:extLst>
-          </p:cNvPr>
-          <p:cNvSpPr txBox="1"/>
-          <p:nvPr/>
-        </p:nvSpPr>
-        <p:spPr>
-          <a:xfrm>
-            <a:off x="207265" y="5614416"/>
-            <a:ext cx="5120640" cy="646331"/>
-          </a:xfrm>
-          <a:prstGeom prst="rect">
-            <a:avLst/>
-          </a:prstGeom>
-          <a:noFill/>
-        </p:spPr>
-        <p:txBody>
-          <a:bodyPr wrap="square" rtlCol="0">
-            <a:spAutoFit/>
-          </a:bodyPr>
-          <a:lstStyle/>
-          <a:p>
-            <a:r>
-              <a:rPr lang="en-US" i="1" dirty="0"/>
-              <a:t>Note: updates are required for this package to function with Seurat V5</a:t>
-            </a:r>
-          </a:p>
-        </p:txBody>
-      </p:sp>
-    </p:spTree>
-    <p:extLst>
-      <p:ext uri="{BB962C8B-B14F-4D97-AF65-F5344CB8AC3E}">
-        <p14:creationId xmlns:p14="http://schemas.microsoft.com/office/powerpoint/2010/main" val="1471061591"/>
       </p:ext>
     </p:extLst>
   </p:cSld>

</xml_diff>

<commit_message>
Updates to M4 and M5 clarifying some plots.
</commit_message>
<xml_diff>
--- a/M4_Seurat_CellType/M4_Seurat_CellType.pptx
+++ b/M4_Seurat_CellType/M4_Seurat_CellType.pptx
@@ -4423,16 +4423,12 @@
           <a:lstStyle/>
           <a:p>
             <a:r>
-              <a:rPr lang="en-US" dirty="0"/>
-              <a:t>Classification Based: </a:t>
-            </a:r>
-            <a:r>
               <a:rPr lang="en-US" dirty="0" err="1"/>
               <a:t>scPred</a:t>
             </a:r>
             <a:r>
               <a:rPr lang="en-US" dirty="0"/>
-              <a:t> with Trained Reference</a:t>
+              <a:t>: Classification Based (Trained Reference)</a:t>
             </a:r>
           </a:p>
         </p:txBody>
@@ -4778,10 +4774,6 @@
           <a:bodyPr/>
           <a:lstStyle/>
           <a:p>
-            <a:r>
-              <a:rPr lang="en-US"/>
-              <a:t>Questions?</a:t>
-            </a:r>
             <a:endParaRPr lang="en-US" dirty="0"/>
           </a:p>
         </p:txBody>

</xml_diff>